<commit_message>
Web : var remplacer par let
</commit_message>
<xml_diff>
--- a/web/4-JS/JavaScript.pptx
+++ b/web/4-JS/JavaScript.pptx
@@ -226,7 +226,7 @@
           <a:p>
             <a:fld id="{5EB47243-285B-2741-8C7D-C88258D9CCFA}" type="datetimeFigureOut">
               <a:rPr lang="fr-FR" smtClean="0"/>
-              <a:t>06/06/2019</a:t>
+              <a:t>07/06/2019</a:t>
             </a:fld>
             <a:endParaRPr lang="fr-FR"/>
           </a:p>
@@ -292,7 +292,7 @@
           <a:p>
             <a:fld id="{C5CA9166-BC48-2C47-B9BF-6F57720E77B8}" type="slidenum">
               <a:rPr lang="fr-FR" smtClean="0"/>
-              <a:t>‹N°›</a:t>
+              <a:t>‹#›</a:t>
             </a:fld>
             <a:endParaRPr lang="fr-FR"/>
           </a:p>
@@ -392,7 +392,7 @@
           <a:p>
             <a:fld id="{7D088D39-B4EA-D24B-B9C3-6A64886EABE2}" type="datetimeFigureOut">
               <a:rPr lang="fr-FR" smtClean="0"/>
-              <a:t>06/06/2019</a:t>
+              <a:t>07/06/2019</a:t>
             </a:fld>
             <a:endParaRPr lang="fr-FR"/>
           </a:p>
@@ -550,7 +550,7 @@
           <a:p>
             <a:fld id="{1C0E2CBA-6097-B848-A7DA-4D7BD6EB303B}" type="slidenum">
               <a:rPr lang="fr-FR" smtClean="0"/>
-              <a:t>‹N°›</a:t>
+              <a:t>‹#›</a:t>
             </a:fld>
             <a:endParaRPr lang="fr-FR"/>
           </a:p>
@@ -718,7 +718,7 @@
             </a:r>
           </a:p>
           <a:p>
-            <a:r>
+            <a:br>
               <a:rPr lang="fr-FR" sz="1200" b="0" kern="1200" dirty="0">
                 <a:solidFill>
                   <a:schemeClr val="tx1"/>
@@ -728,9 +728,8 @@
                 <a:ea typeface="+mn-ea"/>
                 <a:cs typeface="+mn-cs"/>
               </a:rPr>
-              <a:t/>
-            </a:r>
-            <a:br>
+            </a:br>
+            <a:r>
               <a:rPr lang="fr-FR" sz="1200" b="0" kern="1200" dirty="0">
                 <a:solidFill>
                   <a:schemeClr val="tx1"/>
@@ -740,9 +739,10 @@
                 <a:ea typeface="+mn-ea"/>
                 <a:cs typeface="+mn-cs"/>
               </a:rPr>
-            </a:br>
-            <a:r>
-              <a:rPr lang="fr-FR" sz="1200" b="0" kern="1200" dirty="0">
+              <a:t>Le texte contient ensuite des balises ouvrantes et fermantes (`&lt;html&gt;` et `&lt;/html&gt;`) ou encore (`&lt;/</a:t>
+            </a:r>
+            <a:r>
+              <a:rPr lang="fr-FR" sz="1200" b="0" kern="1200" dirty="0" err="1">
                 <a:solidFill>
                   <a:schemeClr val="tx1"/>
                 </a:solidFill>
@@ -751,10 +751,10 @@
                 <a:ea typeface="+mn-ea"/>
                 <a:cs typeface="+mn-cs"/>
               </a:rPr>
-              <a:t>Le texte contient ensuite des balises ouvrantes et fermantes (`&lt;html&gt;` et `&lt;/html&gt;`) ou encore (`&lt;/</a:t>
-            </a:r>
-            <a:r>
-              <a:rPr lang="fr-FR" sz="1200" b="0" kern="1200" dirty="0" err="1">
+              <a:t>title</a:t>
+            </a:r>
+            <a:r>
+              <a:rPr lang="fr-FR" sz="1200" b="0" kern="1200" dirty="0">
                 <a:solidFill>
                   <a:schemeClr val="tx1"/>
                 </a:solidFill>
@@ -763,10 +763,10 @@
                 <a:ea typeface="+mn-ea"/>
                 <a:cs typeface="+mn-cs"/>
               </a:rPr>
-              <a:t>title</a:t>
-            </a:r>
-            <a:r>
-              <a:rPr lang="fr-FR" sz="1200" b="0" kern="1200" dirty="0">
+              <a:t>&gt;` et `&lt;/</a:t>
+            </a:r>
+            <a:r>
+              <a:rPr lang="fr-FR" sz="1200" b="0" kern="1200" dirty="0" err="1">
                 <a:solidFill>
                   <a:schemeClr val="tx1"/>
                 </a:solidFill>
@@ -775,10 +775,10 @@
                 <a:ea typeface="+mn-ea"/>
                 <a:cs typeface="+mn-cs"/>
               </a:rPr>
-              <a:t>&gt;` et `&lt;/</a:t>
-            </a:r>
-            <a:r>
-              <a:rPr lang="fr-FR" sz="1200" b="0" kern="1200" dirty="0" err="1">
+              <a:t>title</a:t>
+            </a:r>
+            <a:r>
+              <a:rPr lang="fr-FR" sz="1200" b="0" kern="1200" dirty="0">
                 <a:solidFill>
                   <a:schemeClr val="tx1"/>
                 </a:solidFill>
@@ -787,9 +787,11 @@
                 <a:ea typeface="+mn-ea"/>
                 <a:cs typeface="+mn-cs"/>
               </a:rPr>
-              <a:t>title</a:t>
-            </a:r>
-            <a:r>
+              <a:t>&gt;`.</a:t>
+            </a:r>
+          </a:p>
+          <a:p>
+            <a:br>
               <a:rPr lang="fr-FR" sz="1200" b="0" kern="1200" dirty="0">
                 <a:solidFill>
                   <a:schemeClr val="tx1"/>
@@ -799,10 +801,7 @@
                 <a:ea typeface="+mn-ea"/>
                 <a:cs typeface="+mn-cs"/>
               </a:rPr>
-              <a:t>&gt;`.</a:t>
-            </a:r>
-          </a:p>
-          <a:p>
+            </a:br>
             <a:r>
               <a:rPr lang="fr-FR" sz="1200" b="0" kern="1200" dirty="0">
                 <a:solidFill>
@@ -813,45 +812,10 @@
                 <a:ea typeface="+mn-ea"/>
                 <a:cs typeface="+mn-cs"/>
               </a:rPr>
-              <a:t/>
-            </a:r>
-            <a:br>
-              <a:rPr lang="fr-FR" sz="1200" b="0" kern="1200" dirty="0">
-                <a:solidFill>
-                  <a:schemeClr val="tx1"/>
-                </a:solidFill>
-                <a:effectLst/>
-                <a:latin typeface="+mn-lt"/>
-                <a:ea typeface="+mn-ea"/>
-                <a:cs typeface="+mn-cs"/>
-              </a:rPr>
-            </a:br>
-            <a:r>
-              <a:rPr lang="fr-FR" sz="1200" b="0" kern="1200" dirty="0">
-                <a:solidFill>
-                  <a:schemeClr val="tx1"/>
-                </a:solidFill>
-                <a:effectLst/>
-                <a:latin typeface="+mn-lt"/>
-                <a:ea typeface="+mn-ea"/>
-                <a:cs typeface="+mn-cs"/>
-              </a:rPr>
               <a:t>L'imbrication des balises ouvrantes et fermantes constitue un arbre (qui est marqué ici par l'indentation du texte mais ce n'est pas obligatoire).</a:t>
             </a:r>
           </a:p>
           <a:p>
-            <a:r>
-              <a:rPr lang="fr-FR" sz="1200" b="0" kern="1200" dirty="0">
-                <a:solidFill>
-                  <a:schemeClr val="tx1"/>
-                </a:solidFill>
-                <a:effectLst/>
-                <a:latin typeface="+mn-lt"/>
-                <a:ea typeface="+mn-ea"/>
-                <a:cs typeface="+mn-cs"/>
-              </a:rPr>
-              <a:t/>
-            </a:r>
             <a:br>
               <a:rPr lang="fr-FR" sz="1200" b="0" kern="1200" dirty="0">
                 <a:solidFill>
@@ -1103,7 +1067,7 @@
             </a:r>
           </a:p>
           <a:p>
-            <a:r>
+            <a:br>
               <a:rPr lang="fr-FR" sz="1200" b="0" kern="1200" dirty="0">
                 <a:solidFill>
                   <a:schemeClr val="tx1"/>
@@ -1113,9 +1077,8 @@
                 <a:ea typeface="+mn-ea"/>
                 <a:cs typeface="+mn-cs"/>
               </a:rPr>
-              <a:t/>
-            </a:r>
-            <a:br>
+            </a:br>
+            <a:r>
               <a:rPr lang="fr-FR" sz="1200" b="0" kern="1200" dirty="0">
                 <a:solidFill>
                   <a:schemeClr val="tx1"/>
@@ -1125,9 +1088,10 @@
                 <a:ea typeface="+mn-ea"/>
                 <a:cs typeface="+mn-cs"/>
               </a:rPr>
-            </a:br>
-            <a:r>
-              <a:rPr lang="fr-FR" sz="1200" b="0" kern="1200" dirty="0">
+              <a:t>Le texte contient ensuite des balises ouvrantes et fermantes (`&lt;html&gt;` et `&lt;/html&gt;`) ou encore (`&lt;/</a:t>
+            </a:r>
+            <a:r>
+              <a:rPr lang="fr-FR" sz="1200" b="0" kern="1200" dirty="0" err="1">
                 <a:solidFill>
                   <a:schemeClr val="tx1"/>
                 </a:solidFill>
@@ -1136,10 +1100,10 @@
                 <a:ea typeface="+mn-ea"/>
                 <a:cs typeface="+mn-cs"/>
               </a:rPr>
-              <a:t>Le texte contient ensuite des balises ouvrantes et fermantes (`&lt;html&gt;` et `&lt;/html&gt;`) ou encore (`&lt;/</a:t>
-            </a:r>
-            <a:r>
-              <a:rPr lang="fr-FR" sz="1200" b="0" kern="1200" dirty="0" err="1">
+              <a:t>title</a:t>
+            </a:r>
+            <a:r>
+              <a:rPr lang="fr-FR" sz="1200" b="0" kern="1200" dirty="0">
                 <a:solidFill>
                   <a:schemeClr val="tx1"/>
                 </a:solidFill>
@@ -1148,10 +1112,10 @@
                 <a:ea typeface="+mn-ea"/>
                 <a:cs typeface="+mn-cs"/>
               </a:rPr>
-              <a:t>title</a:t>
-            </a:r>
-            <a:r>
-              <a:rPr lang="fr-FR" sz="1200" b="0" kern="1200" dirty="0">
+              <a:t>&gt;` et `&lt;/</a:t>
+            </a:r>
+            <a:r>
+              <a:rPr lang="fr-FR" sz="1200" b="0" kern="1200" dirty="0" err="1">
                 <a:solidFill>
                   <a:schemeClr val="tx1"/>
                 </a:solidFill>
@@ -1160,10 +1124,10 @@
                 <a:ea typeface="+mn-ea"/>
                 <a:cs typeface="+mn-cs"/>
               </a:rPr>
-              <a:t>&gt;` et `&lt;/</a:t>
-            </a:r>
-            <a:r>
-              <a:rPr lang="fr-FR" sz="1200" b="0" kern="1200" dirty="0" err="1">
+              <a:t>title</a:t>
+            </a:r>
+            <a:r>
+              <a:rPr lang="fr-FR" sz="1200" b="0" kern="1200" dirty="0">
                 <a:solidFill>
                   <a:schemeClr val="tx1"/>
                 </a:solidFill>
@@ -1172,9 +1136,11 @@
                 <a:ea typeface="+mn-ea"/>
                 <a:cs typeface="+mn-cs"/>
               </a:rPr>
-              <a:t>title</a:t>
-            </a:r>
-            <a:r>
+              <a:t>&gt;`.</a:t>
+            </a:r>
+          </a:p>
+          <a:p>
+            <a:br>
               <a:rPr lang="fr-FR" sz="1200" b="0" kern="1200" dirty="0">
                 <a:solidFill>
                   <a:schemeClr val="tx1"/>
@@ -1184,10 +1150,7 @@
                 <a:ea typeface="+mn-ea"/>
                 <a:cs typeface="+mn-cs"/>
               </a:rPr>
-              <a:t>&gt;`.</a:t>
-            </a:r>
-          </a:p>
-          <a:p>
+            </a:br>
             <a:r>
               <a:rPr lang="fr-FR" sz="1200" b="0" kern="1200" dirty="0">
                 <a:solidFill>
@@ -1198,45 +1161,10 @@
                 <a:ea typeface="+mn-ea"/>
                 <a:cs typeface="+mn-cs"/>
               </a:rPr>
-              <a:t/>
-            </a:r>
-            <a:br>
-              <a:rPr lang="fr-FR" sz="1200" b="0" kern="1200" dirty="0">
-                <a:solidFill>
-                  <a:schemeClr val="tx1"/>
-                </a:solidFill>
-                <a:effectLst/>
-                <a:latin typeface="+mn-lt"/>
-                <a:ea typeface="+mn-ea"/>
-                <a:cs typeface="+mn-cs"/>
-              </a:rPr>
-            </a:br>
-            <a:r>
-              <a:rPr lang="fr-FR" sz="1200" b="0" kern="1200" dirty="0">
-                <a:solidFill>
-                  <a:schemeClr val="tx1"/>
-                </a:solidFill>
-                <a:effectLst/>
-                <a:latin typeface="+mn-lt"/>
-                <a:ea typeface="+mn-ea"/>
-                <a:cs typeface="+mn-cs"/>
-              </a:rPr>
               <a:t>L'imbrication des balises ouvrantes et fermantes constitue un arbre (qui est marqué ici par l'indentation du texte mais ce n'est pas obligatoire).</a:t>
             </a:r>
           </a:p>
           <a:p>
-            <a:r>
-              <a:rPr lang="fr-FR" sz="1200" b="0" kern="1200" dirty="0">
-                <a:solidFill>
-                  <a:schemeClr val="tx1"/>
-                </a:solidFill>
-                <a:effectLst/>
-                <a:latin typeface="+mn-lt"/>
-                <a:ea typeface="+mn-ea"/>
-                <a:cs typeface="+mn-cs"/>
-              </a:rPr>
-              <a:t/>
-            </a:r>
             <a:br>
               <a:rPr lang="fr-FR" sz="1200" b="0" kern="1200" dirty="0">
                 <a:solidFill>
@@ -2383,7 +2311,7 @@
           <a:p>
             <a:fld id="{BB2FA04C-1355-4CE6-8050-4BD994E23BD5}" type="datetime4">
               <a:rPr lang="fr-FR" smtClean="0"/>
-              <a:t>6 juin 2019</a:t>
+              <a:t>7 juin 2019</a:t>
             </a:fld>
             <a:endParaRPr lang="fr-FR" dirty="0"/>
           </a:p>
@@ -2461,7 +2389,7 @@
             <a:fld id="{DCE37727-CC04-7A46-938D-2CCFF056F773}" type="slidenum">
               <a:rPr lang="fr-FR" smtClean="0"/>
               <a:pPr/>
-              <a:t>‹N°›</a:t>
+              <a:t>‹#›</a:t>
             </a:fld>
             <a:endParaRPr lang="fr-FR"/>
           </a:p>
@@ -2873,7 +2801,7 @@
           <a:p>
             <a:fld id="{A81C4219-47FF-4375-968D-EABA4A212953}" type="datetime4">
               <a:rPr lang="fr-FR" smtClean="0"/>
-              <a:t>6 juin 2019</a:t>
+              <a:t>7 juin 2019</a:t>
             </a:fld>
             <a:endParaRPr lang="fr-FR" dirty="0"/>
           </a:p>
@@ -2951,7 +2879,7 @@
             <a:fld id="{DCE37727-CC04-7A46-938D-2CCFF056F773}" type="slidenum">
               <a:rPr lang="fr-FR" smtClean="0"/>
               <a:pPr/>
-              <a:t>‹N°›</a:t>
+              <a:t>‹#›</a:t>
             </a:fld>
             <a:endParaRPr lang="fr-FR"/>
           </a:p>
@@ -4709,7 +4637,7 @@
           <a:p>
             <a:fld id="{81E3CCF4-D669-4BB6-B0BE-EE495E88AE6B}" type="datetime4">
               <a:rPr lang="fr-FR" smtClean="0"/>
-              <a:t>6 juin 2019</a:t>
+              <a:t>7 juin 2019</a:t>
             </a:fld>
             <a:endParaRPr lang="fr-FR" dirty="0"/>
           </a:p>
@@ -4787,7 +4715,7 @@
             <a:fld id="{DCE37727-CC04-7A46-938D-2CCFF056F773}" type="slidenum">
               <a:rPr lang="fr-FR" smtClean="0"/>
               <a:pPr/>
-              <a:t>‹N°›</a:t>
+              <a:t>‹#›</a:t>
             </a:fld>
             <a:endParaRPr lang="fr-FR"/>
           </a:p>
@@ -5645,7 +5573,7 @@
           <a:p>
             <a:fld id="{2E52B8B1-858B-4633-AE57-5B6CA9292F2B}" type="datetime4">
               <a:rPr lang="fr-FR" smtClean="0"/>
-              <a:t>6 juin 2019</a:t>
+              <a:t>7 juin 2019</a:t>
             </a:fld>
             <a:endParaRPr lang="fr-FR" dirty="0"/>
           </a:p>
@@ -5723,7 +5651,7 @@
             <a:fld id="{DCE37727-CC04-7A46-938D-2CCFF056F773}" type="slidenum">
               <a:rPr lang="fr-FR" smtClean="0"/>
               <a:pPr/>
-              <a:t>‹N°›</a:t>
+              <a:t>‹#›</a:t>
             </a:fld>
             <a:endParaRPr lang="fr-FR"/>
           </a:p>
@@ -6453,24 +6381,12 @@
             <a:br>
               <a:rPr lang="fr-FR" dirty="0"/>
             </a:br>
-            <a:r>
-              <a:rPr lang="fr-FR" sz="2400" dirty="0"/>
-              <a:t/>
-            </a:r>
             <a:br>
               <a:rPr lang="fr-FR" sz="2400" dirty="0"/>
             </a:br>
-            <a:r>
-              <a:rPr lang="fr-FR" sz="2400" dirty="0"/>
-              <a:t/>
-            </a:r>
             <a:br>
               <a:rPr lang="fr-FR" sz="2400" dirty="0"/>
             </a:br>
-            <a:r>
-              <a:rPr lang="fr-FR" sz="2400" dirty="0"/>
-              <a:t/>
-            </a:r>
             <a:br>
               <a:rPr lang="fr-FR" sz="2400" dirty="0"/>
             </a:br>
@@ -6526,7 +6442,7 @@
           <a:p>
             <a:fld id="{BB2FA04C-1355-4CE6-8050-4BD994E23BD5}" type="datetime4">
               <a:rPr lang="fr-FR" smtClean="0"/>
-              <a:t>6 juin 2019</a:t>
+              <a:t>7 juin 2019</a:t>
             </a:fld>
             <a:endParaRPr lang="fr-FR" dirty="0"/>
           </a:p>
@@ -6583,7 +6499,7 @@
           <p:cNvPr id="19" name="Rectangle 18">
             <a:extLst>
               <a:ext uri="{FF2B5EF4-FFF2-40B4-BE49-F238E27FC236}">
-                <a16:creationId xmlns:a16="http://schemas.microsoft.com/office/drawing/2014/main" xmlns="" id="{99D6AB73-3556-6845-9EF8-9024C2407A0D}"/>
+                <a16:creationId xmlns:a16="http://schemas.microsoft.com/office/drawing/2014/main" id="{99D6AB73-3556-6845-9EF8-9024C2407A0D}"/>
               </a:ext>
             </a:extLst>
           </p:cNvPr>
@@ -6676,7 +6592,7 @@
           <p:cNvPr id="12" name="Rectangle 11">
             <a:extLst>
               <a:ext uri="{FF2B5EF4-FFF2-40B4-BE49-F238E27FC236}">
-                <a16:creationId xmlns:a16="http://schemas.microsoft.com/office/drawing/2014/main" xmlns="" id="{ECED5231-2525-CD45-A28E-5EE4CDC138F5}"/>
+                <a16:creationId xmlns:a16="http://schemas.microsoft.com/office/drawing/2014/main" id="{ECED5231-2525-CD45-A28E-5EE4CDC138F5}"/>
               </a:ext>
             </a:extLst>
           </p:cNvPr>
@@ -7298,7 +7214,7 @@
           <a:p>
             <a:fld id="{BB2FA04C-1355-4CE6-8050-4BD994E23BD5}" type="datetime4">
               <a:rPr lang="fr-FR" smtClean="0"/>
-              <a:t>6 juin 2019</a:t>
+              <a:t>7 juin 2019</a:t>
             </a:fld>
             <a:endParaRPr lang="fr-FR" dirty="0"/>
           </a:p>
@@ -7355,7 +7271,7 @@
           <p:cNvPr id="8" name="Rectangle 7">
             <a:extLst>
               <a:ext uri="{FF2B5EF4-FFF2-40B4-BE49-F238E27FC236}">
-                <a16:creationId xmlns:a16="http://schemas.microsoft.com/office/drawing/2014/main" xmlns="" id="{99D6AB73-3556-6845-9EF8-9024C2407A0D}"/>
+                <a16:creationId xmlns:a16="http://schemas.microsoft.com/office/drawing/2014/main" id="{99D6AB73-3556-6845-9EF8-9024C2407A0D}"/>
               </a:ext>
             </a:extLst>
           </p:cNvPr>
@@ -7395,7 +7311,7 @@
                 </a:solidFill>
                 <a:latin typeface="Source Code Pro" panose="020B0509030403020204"/>
               </a:rPr>
-              <a:t>var</a:t>
+              <a:t>let</a:t>
             </a:r>
             <a:r>
               <a:rPr lang="fr-FR" altLang="fr-FR" dirty="0">
@@ -7485,7 +7401,7 @@
                 </a:solidFill>
                 <a:latin typeface="Source Code Pro" panose="020B0509030403020204"/>
               </a:rPr>
-              <a:t>var</a:t>
+              <a:t>let</a:t>
             </a:r>
             <a:r>
               <a:rPr lang="fr-FR" altLang="fr-FR" dirty="0">
@@ -7772,7 +7688,7 @@
           <a:p>
             <a:fld id="{BB2FA04C-1355-4CE6-8050-4BD994E23BD5}" type="datetime4">
               <a:rPr lang="fr-FR" smtClean="0"/>
-              <a:t>6 juin 2019</a:t>
+              <a:t>7 juin 2019</a:t>
             </a:fld>
             <a:endParaRPr lang="fr-FR" dirty="0"/>
           </a:p>
@@ -8274,7 +8190,7 @@
           <a:p>
             <a:fld id="{BB2FA04C-1355-4CE6-8050-4BD994E23BD5}" type="datetime4">
               <a:rPr lang="fr-FR" smtClean="0"/>
-              <a:t>6 juin 2019</a:t>
+              <a:t>7 juin 2019</a:t>
             </a:fld>
             <a:endParaRPr lang="fr-FR" dirty="0"/>
           </a:p>
@@ -8605,7 +8521,7 @@
           <p:cNvPr id="10" name="Rectangle 9">
             <a:extLst>
               <a:ext uri="{FF2B5EF4-FFF2-40B4-BE49-F238E27FC236}">
-                <a16:creationId xmlns:a16="http://schemas.microsoft.com/office/drawing/2014/main" xmlns="" id="{99D6AB73-3556-6845-9EF8-9024C2407A0D}"/>
+                <a16:creationId xmlns:a16="http://schemas.microsoft.com/office/drawing/2014/main" id="{99D6AB73-3556-6845-9EF8-9024C2407A0D}"/>
               </a:ext>
             </a:extLst>
           </p:cNvPr>
@@ -8705,10 +8621,9 @@
             <a:r>
               <a:rPr lang="fr-FR" altLang="fr-FR" sz="1600" dirty="0">
                 <a:solidFill>
-                  <a:srgbClr val="D73A49"/>
-                </a:solidFill>
-                <a:latin typeface="Source Code Pro" panose="020B0509030403020204" pitchFamily="49" charset="0"/>
-                <a:ea typeface="Source Code Pro" panose="020B0509030403020204" pitchFamily="49" charset="0"/>
+                  <a:srgbClr val="00B050"/>
+                </a:solidFill>
+                <a:latin typeface="Source Code Pro" panose="020B0509030403020204"/>
               </a:rPr>
               <a:t>let</a:t>
             </a:r>
@@ -9299,7 +9214,7 @@
           <a:p>
             <a:fld id="{BB2FA04C-1355-4CE6-8050-4BD994E23BD5}" type="datetime4">
               <a:rPr lang="fr-FR" smtClean="0"/>
-              <a:t>6 juin 2019</a:t>
+              <a:t>7 juin 2019</a:t>
             </a:fld>
             <a:endParaRPr lang="fr-FR" dirty="0"/>
           </a:p>
@@ -10034,7 +9949,7 @@
           <p:cNvPr id="9" name="Rectangle 8">
             <a:extLst>
               <a:ext uri="{FF2B5EF4-FFF2-40B4-BE49-F238E27FC236}">
-                <a16:creationId xmlns:a16="http://schemas.microsoft.com/office/drawing/2014/main" xmlns="" id="{B154AA04-DABC-F44F-AFCE-D2E2CCE699F0}"/>
+                <a16:creationId xmlns:a16="http://schemas.microsoft.com/office/drawing/2014/main" id="{B154AA04-DABC-F44F-AFCE-D2E2CCE699F0}"/>
               </a:ext>
             </a:extLst>
           </p:cNvPr>
@@ -10308,7 +10223,7 @@
           <a:p>
             <a:fld id="{BB2FA04C-1355-4CE6-8050-4BD994E23BD5}" type="datetime4">
               <a:rPr lang="fr-FR" smtClean="0"/>
-              <a:t>6 juin 2019</a:t>
+              <a:t>7 juin 2019</a:t>
             </a:fld>
             <a:endParaRPr lang="fr-FR" dirty="0"/>
           </a:p>
@@ -10830,7 +10745,7 @@
           <p:cNvPr id="10" name="Rectangle 9">
             <a:extLst>
               <a:ext uri="{FF2B5EF4-FFF2-40B4-BE49-F238E27FC236}">
-                <a16:creationId xmlns:a16="http://schemas.microsoft.com/office/drawing/2014/main" xmlns="" id="{99D6AB73-3556-6845-9EF8-9024C2407A0D}"/>
+                <a16:creationId xmlns:a16="http://schemas.microsoft.com/office/drawing/2014/main" id="{99D6AB73-3556-6845-9EF8-9024C2407A0D}"/>
               </a:ext>
             </a:extLst>
           </p:cNvPr>
@@ -10862,7 +10777,7 @@
           </a:bodyPr>
           <a:lstStyle/>
           <a:p>
-            <a:pPr lvl="0" defTabSz="914400" eaLnBrk="0" fontAlgn="base" hangingPunct="0">
+            <a:pPr defTabSz="914400" eaLnBrk="0" fontAlgn="base" hangingPunct="0">
               <a:spcBef>
                 <a:spcPct val="0"/>
               </a:spcBef>
@@ -10977,13 +10892,6 @@
                 <a:ea typeface="Source Code Pro" panose="020B0509030403020204" pitchFamily="49" charset="0"/>
               </a:rPr>
             </a:br>
-            <a:r>
-              <a:rPr lang="fr-FR" sz="1600" dirty="0">
-                <a:latin typeface="Source Code Pro" panose="020B0509030403020204" pitchFamily="49" charset="0"/>
-                <a:ea typeface="Source Code Pro" panose="020B0509030403020204" pitchFamily="49" charset="0"/>
-              </a:rPr>
-              <a:t/>
-            </a:r>
             <a:br>
               <a:rPr lang="fr-FR" sz="1600" dirty="0">
                 <a:latin typeface="Source Code Pro" panose="020B0509030403020204" pitchFamily="49" charset="0"/>
@@ -11151,13 +11059,6 @@
                 <a:ea typeface="Source Code Pro" panose="020B0509030403020204" pitchFamily="49" charset="0"/>
               </a:rPr>
             </a:br>
-            <a:r>
-              <a:rPr lang="fr-FR" sz="1600" dirty="0">
-                <a:latin typeface="Source Code Pro" panose="020B0509030403020204" pitchFamily="49" charset="0"/>
-                <a:ea typeface="Source Code Pro" panose="020B0509030403020204" pitchFamily="49" charset="0"/>
-              </a:rPr>
-              <a:t/>
-            </a:r>
             <a:br>
               <a:rPr lang="fr-FR" sz="1600" dirty="0">
                 <a:latin typeface="Source Code Pro" panose="020B0509030403020204" pitchFamily="49" charset="0"/>
@@ -11273,14 +11174,14 @@
                 <a:latin typeface="Source Code Pro" panose="020B0509030403020204" pitchFamily="49" charset="0"/>
                 <a:ea typeface="Source Code Pro" panose="020B0509030403020204" pitchFamily="49" charset="0"/>
               </a:rPr>
-              <a:t>var</a:t>
+              <a:t>let </a:t>
             </a:r>
             <a:r>
               <a:rPr lang="fr-FR" sz="1600" dirty="0">
                 <a:latin typeface="Source Code Pro" panose="020B0509030403020204" pitchFamily="49" charset="0"/>
                 <a:ea typeface="Source Code Pro" panose="020B0509030403020204" pitchFamily="49" charset="0"/>
               </a:rPr>
-              <a:t> data = </a:t>
+              <a:t>data = </a:t>
             </a:r>
             <a:r>
               <a:rPr lang="fr-FR" sz="1600" dirty="0" err="1">
@@ -11449,7 +11350,7 @@
           <p:cNvPr id="11" name="Rectangle 10">
             <a:extLst>
               <a:ext uri="{FF2B5EF4-FFF2-40B4-BE49-F238E27FC236}">
-                <a16:creationId xmlns:a16="http://schemas.microsoft.com/office/drawing/2014/main" xmlns="" id="{8DA60F79-BEA6-4A4D-97CF-13A847623086}"/>
+                <a16:creationId xmlns:a16="http://schemas.microsoft.com/office/drawing/2014/main" id="{8DA60F79-BEA6-4A4D-97CF-13A847623086}"/>
               </a:ext>
             </a:extLst>
           </p:cNvPr>
@@ -11693,13 +11594,6 @@
                 <a:ea typeface="Source Code Pro" panose="020B0509030403020204" pitchFamily="49" charset="0"/>
               </a:rPr>
             </a:br>
-            <a:r>
-              <a:rPr lang="fr-FR" sz="1600" dirty="0">
-                <a:latin typeface="Source Code Pro" panose="020B0509030403020204" pitchFamily="49" charset="0"/>
-                <a:ea typeface="Source Code Pro" panose="020B0509030403020204" pitchFamily="49" charset="0"/>
-              </a:rPr>
-              <a:t/>
-            </a:r>
             <a:br>
               <a:rPr lang="fr-FR" sz="1600" dirty="0">
                 <a:latin typeface="Source Code Pro" panose="020B0509030403020204" pitchFamily="49" charset="0"/>
@@ -11960,7 +11854,7 @@
           <p:cNvPr id="9" name="TextBox 8">
             <a:extLst>
               <a:ext uri="{FF2B5EF4-FFF2-40B4-BE49-F238E27FC236}">
-                <a16:creationId xmlns:a16="http://schemas.microsoft.com/office/drawing/2014/main" xmlns="" id="{0310CF36-F93A-404C-A8B2-4AF7950F69AC}"/>
+                <a16:creationId xmlns:a16="http://schemas.microsoft.com/office/drawing/2014/main" id="{0310CF36-F93A-404C-A8B2-4AF7950F69AC}"/>
               </a:ext>
             </a:extLst>
           </p:cNvPr>
@@ -11999,7 +11893,7 @@
           <p:cNvPr id="13" name="TextBox 12">
             <a:extLst>
               <a:ext uri="{FF2B5EF4-FFF2-40B4-BE49-F238E27FC236}">
-                <a16:creationId xmlns:a16="http://schemas.microsoft.com/office/drawing/2014/main" xmlns="" id="{19EB4010-9653-D64C-ADC9-7FF6C55A289D}"/>
+                <a16:creationId xmlns:a16="http://schemas.microsoft.com/office/drawing/2014/main" id="{19EB4010-9653-D64C-ADC9-7FF6C55A289D}"/>
               </a:ext>
             </a:extLst>
           </p:cNvPr>
@@ -12102,7 +11996,7 @@
           <a:p>
             <a:fld id="{BB2FA04C-1355-4CE6-8050-4BD994E23BD5}" type="datetime4">
               <a:rPr lang="fr-FR" smtClean="0"/>
-              <a:t>6 juin 2019</a:t>
+              <a:t>7 juin 2019</a:t>
             </a:fld>
             <a:endParaRPr lang="fr-FR" dirty="0"/>
           </a:p>
@@ -12198,10 +12092,6 @@
             <a:r>
               <a:rPr lang="fr-FR" sz="2400" b="1" dirty="0"/>
               <a:t> asynchrone</a:t>
-            </a:r>
-            <a:r>
-              <a:rPr lang="fr-FR" sz="2400" dirty="0"/>
-              <a:t/>
             </a:r>
             <a:br>
               <a:rPr lang="fr-FR" sz="2400" dirty="0"/>
@@ -12419,7 +12309,7 @@
           <a:p>
             <a:fld id="{1AC11C67-BE04-4C5F-B0EE-E01220C9093A}" type="datetime4">
               <a:rPr lang="fr-FR" smtClean="0"/>
-              <a:t>6 juin 2019</a:t>
+              <a:t>7 juin 2019</a:t>
             </a:fld>
             <a:endParaRPr lang="fr-FR" dirty="0"/>
           </a:p>
@@ -12839,7 +12729,7 @@
           <p:cNvPr id="2" name="Title 1">
             <a:extLst>
               <a:ext uri="{FF2B5EF4-FFF2-40B4-BE49-F238E27FC236}">
-                <a16:creationId xmlns:a16="http://schemas.microsoft.com/office/drawing/2014/main" xmlns="" id="{197F391B-D1BC-1E4C-B310-969ADCAC9C86}"/>
+                <a16:creationId xmlns:a16="http://schemas.microsoft.com/office/drawing/2014/main" id="{197F391B-D1BC-1E4C-B310-969ADCAC9C86}"/>
               </a:ext>
             </a:extLst>
           </p:cNvPr>
@@ -12867,7 +12757,7 @@
           <p:cNvPr id="3" name="Content Placeholder 2">
             <a:extLst>
               <a:ext uri="{FF2B5EF4-FFF2-40B4-BE49-F238E27FC236}">
-                <a16:creationId xmlns:a16="http://schemas.microsoft.com/office/drawing/2014/main" xmlns="" id="{793FEC66-363B-3545-8E61-92AAFF0AFF62}"/>
+                <a16:creationId xmlns:a16="http://schemas.microsoft.com/office/drawing/2014/main" id="{793FEC66-363B-3545-8E61-92AAFF0AFF62}"/>
               </a:ext>
             </a:extLst>
           </p:cNvPr>
@@ -12918,7 +12808,7 @@
           <p:cNvPr id="4" name="Date Placeholder 3">
             <a:extLst>
               <a:ext uri="{FF2B5EF4-FFF2-40B4-BE49-F238E27FC236}">
-                <a16:creationId xmlns:a16="http://schemas.microsoft.com/office/drawing/2014/main" xmlns="" id="{8C2262F1-3C28-E94C-B574-356F02FF4906}"/>
+                <a16:creationId xmlns:a16="http://schemas.microsoft.com/office/drawing/2014/main" id="{8C2262F1-3C28-E94C-B574-356F02FF4906}"/>
               </a:ext>
             </a:extLst>
           </p:cNvPr>
@@ -12936,7 +12826,7 @@
           <a:p>
             <a:fld id="{BB2FA04C-1355-4CE6-8050-4BD994E23BD5}" type="datetime4">
               <a:rPr lang="fr-FR" smtClean="0"/>
-              <a:t>6 juin 2019</a:t>
+              <a:t>7 juin 2019</a:t>
             </a:fld>
             <a:endParaRPr lang="fr-FR" dirty="0"/>
           </a:p>
@@ -12947,7 +12837,7 @@
           <p:cNvPr id="5" name="Footer Placeholder 4">
             <a:extLst>
               <a:ext uri="{FF2B5EF4-FFF2-40B4-BE49-F238E27FC236}">
-                <a16:creationId xmlns:a16="http://schemas.microsoft.com/office/drawing/2014/main" xmlns="" id="{770F343B-DF3F-094C-B705-4F41FD53029B}"/>
+                <a16:creationId xmlns:a16="http://schemas.microsoft.com/office/drawing/2014/main" id="{770F343B-DF3F-094C-B705-4F41FD53029B}"/>
               </a:ext>
             </a:extLst>
           </p:cNvPr>
@@ -12975,7 +12865,7 @@
           <p:cNvPr id="6" name="Slide Number Placeholder 5">
             <a:extLst>
               <a:ext uri="{FF2B5EF4-FFF2-40B4-BE49-F238E27FC236}">
-                <a16:creationId xmlns:a16="http://schemas.microsoft.com/office/drawing/2014/main" xmlns="" id="{127D60BA-7D2C-1548-8CB9-81CA238BB53C}"/>
+                <a16:creationId xmlns:a16="http://schemas.microsoft.com/office/drawing/2014/main" id="{127D60BA-7D2C-1548-8CB9-81CA238BB53C}"/>
               </a:ext>
             </a:extLst>
           </p:cNvPr>
@@ -13005,7 +12895,7 @@
           <p:cNvPr id="8" name="Rectangle 7">
             <a:extLst>
               <a:ext uri="{FF2B5EF4-FFF2-40B4-BE49-F238E27FC236}">
-                <a16:creationId xmlns:a16="http://schemas.microsoft.com/office/drawing/2014/main" xmlns="" id="{D45207C1-55BB-DB4B-990B-7E41DAF9E310}"/>
+                <a16:creationId xmlns:a16="http://schemas.microsoft.com/office/drawing/2014/main" id="{D45207C1-55BB-DB4B-990B-7E41DAF9E310}"/>
               </a:ext>
             </a:extLst>
           </p:cNvPr>
@@ -13045,7 +12935,7 @@
                 </a:solidFill>
                 <a:latin typeface="Source Code Pro" panose="020B0509030403020204"/>
               </a:rPr>
-              <a:t>var</a:t>
+              <a:t>let</a:t>
             </a:r>
             <a:r>
               <a:rPr lang="fr-FR" altLang="fr-FR" dirty="0">
@@ -13064,7 +12954,7 @@
                 </a:solidFill>
                 <a:latin typeface="Source Code Pro" panose="020B0509030403020204"/>
               </a:rPr>
-              <a:t>var</a:t>
+              <a:t>let</a:t>
             </a:r>
             <a:r>
               <a:rPr lang="fr-FR" altLang="fr-FR" dirty="0">
@@ -13177,7 +13067,7 @@
                 </a:solidFill>
                 <a:latin typeface="Source Code Pro" panose="020B0509030403020204"/>
               </a:rPr>
-              <a:t>var</a:t>
+              <a:t>let</a:t>
             </a:r>
             <a:r>
               <a:rPr lang="fr-FR" altLang="fr-FR" dirty="0">
@@ -13321,7 +13211,7 @@
           <p:cNvPr id="2" name="Title 1">
             <a:extLst>
               <a:ext uri="{FF2B5EF4-FFF2-40B4-BE49-F238E27FC236}">
-                <a16:creationId xmlns:a16="http://schemas.microsoft.com/office/drawing/2014/main" xmlns="" id="{197F391B-D1BC-1E4C-B310-969ADCAC9C86}"/>
+                <a16:creationId xmlns:a16="http://schemas.microsoft.com/office/drawing/2014/main" id="{197F391B-D1BC-1E4C-B310-969ADCAC9C86}"/>
               </a:ext>
             </a:extLst>
           </p:cNvPr>
@@ -13349,7 +13239,7 @@
           <p:cNvPr id="3" name="Content Placeholder 2">
             <a:extLst>
               <a:ext uri="{FF2B5EF4-FFF2-40B4-BE49-F238E27FC236}">
-                <a16:creationId xmlns:a16="http://schemas.microsoft.com/office/drawing/2014/main" xmlns="" id="{793FEC66-363B-3545-8E61-92AAFF0AFF62}"/>
+                <a16:creationId xmlns:a16="http://schemas.microsoft.com/office/drawing/2014/main" id="{793FEC66-363B-3545-8E61-92AAFF0AFF62}"/>
               </a:ext>
             </a:extLst>
           </p:cNvPr>
@@ -13409,7 +13299,7 @@
           <p:cNvPr id="4" name="Date Placeholder 3">
             <a:extLst>
               <a:ext uri="{FF2B5EF4-FFF2-40B4-BE49-F238E27FC236}">
-                <a16:creationId xmlns:a16="http://schemas.microsoft.com/office/drawing/2014/main" xmlns="" id="{8C2262F1-3C28-E94C-B574-356F02FF4906}"/>
+                <a16:creationId xmlns:a16="http://schemas.microsoft.com/office/drawing/2014/main" id="{8C2262F1-3C28-E94C-B574-356F02FF4906}"/>
               </a:ext>
             </a:extLst>
           </p:cNvPr>
@@ -13427,7 +13317,7 @@
           <a:p>
             <a:fld id="{BB2FA04C-1355-4CE6-8050-4BD994E23BD5}" type="datetime4">
               <a:rPr lang="fr-FR" smtClean="0"/>
-              <a:t>6 juin 2019</a:t>
+              <a:t>7 juin 2019</a:t>
             </a:fld>
             <a:endParaRPr lang="fr-FR" dirty="0"/>
           </a:p>
@@ -13438,7 +13328,7 @@
           <p:cNvPr id="5" name="Footer Placeholder 4">
             <a:extLst>
               <a:ext uri="{FF2B5EF4-FFF2-40B4-BE49-F238E27FC236}">
-                <a16:creationId xmlns:a16="http://schemas.microsoft.com/office/drawing/2014/main" xmlns="" id="{770F343B-DF3F-094C-B705-4F41FD53029B}"/>
+                <a16:creationId xmlns:a16="http://schemas.microsoft.com/office/drawing/2014/main" id="{770F343B-DF3F-094C-B705-4F41FD53029B}"/>
               </a:ext>
             </a:extLst>
           </p:cNvPr>
@@ -13466,7 +13356,7 @@
           <p:cNvPr id="6" name="Slide Number Placeholder 5">
             <a:extLst>
               <a:ext uri="{FF2B5EF4-FFF2-40B4-BE49-F238E27FC236}">
-                <a16:creationId xmlns:a16="http://schemas.microsoft.com/office/drawing/2014/main" xmlns="" id="{127D60BA-7D2C-1548-8CB9-81CA238BB53C}"/>
+                <a16:creationId xmlns:a16="http://schemas.microsoft.com/office/drawing/2014/main" id="{127D60BA-7D2C-1548-8CB9-81CA238BB53C}"/>
               </a:ext>
             </a:extLst>
           </p:cNvPr>
@@ -13496,7 +13386,7 @@
           <p:cNvPr id="8" name="Rectangle 7">
             <a:extLst>
               <a:ext uri="{FF2B5EF4-FFF2-40B4-BE49-F238E27FC236}">
-                <a16:creationId xmlns:a16="http://schemas.microsoft.com/office/drawing/2014/main" xmlns="" id="{D45207C1-55BB-DB4B-990B-7E41DAF9E310}"/>
+                <a16:creationId xmlns:a16="http://schemas.microsoft.com/office/drawing/2014/main" id="{D45207C1-55BB-DB4B-990B-7E41DAF9E310}"/>
               </a:ext>
             </a:extLst>
           </p:cNvPr>
@@ -13536,7 +13426,7 @@
                 </a:solidFill>
                 <a:latin typeface="Source Code Pro" panose="020B0509030403020204"/>
               </a:rPr>
-              <a:t>var</a:t>
+              <a:t>let</a:t>
             </a:r>
             <a:r>
               <a:rPr lang="fr-FR" altLang="fr-FR" dirty="0">
@@ -13676,7 +13566,7 @@
           <p:cNvPr id="2" name="Title 1">
             <a:extLst>
               <a:ext uri="{FF2B5EF4-FFF2-40B4-BE49-F238E27FC236}">
-                <a16:creationId xmlns:a16="http://schemas.microsoft.com/office/drawing/2014/main" xmlns="" id="{197F391B-D1BC-1E4C-B310-969ADCAC9C86}"/>
+                <a16:creationId xmlns:a16="http://schemas.microsoft.com/office/drawing/2014/main" id="{197F391B-D1BC-1E4C-B310-969ADCAC9C86}"/>
               </a:ext>
             </a:extLst>
           </p:cNvPr>
@@ -13704,7 +13594,7 @@
           <p:cNvPr id="3" name="Content Placeholder 2">
             <a:extLst>
               <a:ext uri="{FF2B5EF4-FFF2-40B4-BE49-F238E27FC236}">
-                <a16:creationId xmlns:a16="http://schemas.microsoft.com/office/drawing/2014/main" xmlns="" id="{793FEC66-363B-3545-8E61-92AAFF0AFF62}"/>
+                <a16:creationId xmlns:a16="http://schemas.microsoft.com/office/drawing/2014/main" id="{793FEC66-363B-3545-8E61-92AAFF0AFF62}"/>
               </a:ext>
             </a:extLst>
           </p:cNvPr>
@@ -13814,7 +13704,7 @@
           <p:cNvPr id="4" name="Date Placeholder 3">
             <a:extLst>
               <a:ext uri="{FF2B5EF4-FFF2-40B4-BE49-F238E27FC236}">
-                <a16:creationId xmlns:a16="http://schemas.microsoft.com/office/drawing/2014/main" xmlns="" id="{8C2262F1-3C28-E94C-B574-356F02FF4906}"/>
+                <a16:creationId xmlns:a16="http://schemas.microsoft.com/office/drawing/2014/main" id="{8C2262F1-3C28-E94C-B574-356F02FF4906}"/>
               </a:ext>
             </a:extLst>
           </p:cNvPr>
@@ -13832,7 +13722,7 @@
           <a:p>
             <a:fld id="{BB2FA04C-1355-4CE6-8050-4BD994E23BD5}" type="datetime4">
               <a:rPr lang="fr-FR" smtClean="0"/>
-              <a:t>6 juin 2019</a:t>
+              <a:t>7 juin 2019</a:t>
             </a:fld>
             <a:endParaRPr lang="fr-FR" dirty="0"/>
           </a:p>
@@ -13843,7 +13733,7 @@
           <p:cNvPr id="5" name="Footer Placeholder 4">
             <a:extLst>
               <a:ext uri="{FF2B5EF4-FFF2-40B4-BE49-F238E27FC236}">
-                <a16:creationId xmlns:a16="http://schemas.microsoft.com/office/drawing/2014/main" xmlns="" id="{770F343B-DF3F-094C-B705-4F41FD53029B}"/>
+                <a16:creationId xmlns:a16="http://schemas.microsoft.com/office/drawing/2014/main" id="{770F343B-DF3F-094C-B705-4F41FD53029B}"/>
               </a:ext>
             </a:extLst>
           </p:cNvPr>
@@ -13871,7 +13761,7 @@
           <p:cNvPr id="6" name="Slide Number Placeholder 5">
             <a:extLst>
               <a:ext uri="{FF2B5EF4-FFF2-40B4-BE49-F238E27FC236}">
-                <a16:creationId xmlns:a16="http://schemas.microsoft.com/office/drawing/2014/main" xmlns="" id="{127D60BA-7D2C-1548-8CB9-81CA238BB53C}"/>
+                <a16:creationId xmlns:a16="http://schemas.microsoft.com/office/drawing/2014/main" id="{127D60BA-7D2C-1548-8CB9-81CA238BB53C}"/>
               </a:ext>
             </a:extLst>
           </p:cNvPr>
@@ -13901,7 +13791,7 @@
           <p:cNvPr id="8" name="Rectangle 7">
             <a:extLst>
               <a:ext uri="{FF2B5EF4-FFF2-40B4-BE49-F238E27FC236}">
-                <a16:creationId xmlns:a16="http://schemas.microsoft.com/office/drawing/2014/main" xmlns="" id="{D45207C1-55BB-DB4B-990B-7E41DAF9E310}"/>
+                <a16:creationId xmlns:a16="http://schemas.microsoft.com/office/drawing/2014/main" id="{D45207C1-55BB-DB4B-990B-7E41DAF9E310}"/>
               </a:ext>
             </a:extLst>
           </p:cNvPr>
@@ -13941,7 +13831,7 @@
                 </a:solidFill>
                 <a:latin typeface="Source Code Pro" panose="020B0509030403020204"/>
               </a:rPr>
-              <a:t>var </a:t>
+              <a:t>let </a:t>
             </a:r>
             <a:r>
               <a:rPr lang="fr-FR" altLang="fr-FR" dirty="0" err="1">
@@ -14158,7 +14048,7 @@
           <p:cNvPr id="2" name="Title 1">
             <a:extLst>
               <a:ext uri="{FF2B5EF4-FFF2-40B4-BE49-F238E27FC236}">
-                <a16:creationId xmlns:a16="http://schemas.microsoft.com/office/drawing/2014/main" xmlns="" id="{197F391B-D1BC-1E4C-B310-969ADCAC9C86}"/>
+                <a16:creationId xmlns:a16="http://schemas.microsoft.com/office/drawing/2014/main" id="{197F391B-D1BC-1E4C-B310-969ADCAC9C86}"/>
               </a:ext>
             </a:extLst>
           </p:cNvPr>
@@ -14186,7 +14076,7 @@
           <p:cNvPr id="3" name="Content Placeholder 2">
             <a:extLst>
               <a:ext uri="{FF2B5EF4-FFF2-40B4-BE49-F238E27FC236}">
-                <a16:creationId xmlns:a16="http://schemas.microsoft.com/office/drawing/2014/main" xmlns="" id="{793FEC66-363B-3545-8E61-92AAFF0AFF62}"/>
+                <a16:creationId xmlns:a16="http://schemas.microsoft.com/office/drawing/2014/main" id="{793FEC66-363B-3545-8E61-92AAFF0AFF62}"/>
               </a:ext>
             </a:extLst>
           </p:cNvPr>
@@ -14277,7 +14167,7 @@
           <p:cNvPr id="4" name="Date Placeholder 3">
             <a:extLst>
               <a:ext uri="{FF2B5EF4-FFF2-40B4-BE49-F238E27FC236}">
-                <a16:creationId xmlns:a16="http://schemas.microsoft.com/office/drawing/2014/main" xmlns="" id="{8C2262F1-3C28-E94C-B574-356F02FF4906}"/>
+                <a16:creationId xmlns:a16="http://schemas.microsoft.com/office/drawing/2014/main" id="{8C2262F1-3C28-E94C-B574-356F02FF4906}"/>
               </a:ext>
             </a:extLst>
           </p:cNvPr>
@@ -14295,7 +14185,7 @@
           <a:p>
             <a:fld id="{BB2FA04C-1355-4CE6-8050-4BD994E23BD5}" type="datetime4">
               <a:rPr lang="fr-FR" smtClean="0"/>
-              <a:t>6 juin 2019</a:t>
+              <a:t>7 juin 2019</a:t>
             </a:fld>
             <a:endParaRPr lang="fr-FR" dirty="0"/>
           </a:p>
@@ -14306,7 +14196,7 @@
           <p:cNvPr id="5" name="Footer Placeholder 4">
             <a:extLst>
               <a:ext uri="{FF2B5EF4-FFF2-40B4-BE49-F238E27FC236}">
-                <a16:creationId xmlns:a16="http://schemas.microsoft.com/office/drawing/2014/main" xmlns="" id="{770F343B-DF3F-094C-B705-4F41FD53029B}"/>
+                <a16:creationId xmlns:a16="http://schemas.microsoft.com/office/drawing/2014/main" id="{770F343B-DF3F-094C-B705-4F41FD53029B}"/>
               </a:ext>
             </a:extLst>
           </p:cNvPr>
@@ -14334,7 +14224,7 @@
           <p:cNvPr id="6" name="Slide Number Placeholder 5">
             <a:extLst>
               <a:ext uri="{FF2B5EF4-FFF2-40B4-BE49-F238E27FC236}">
-                <a16:creationId xmlns:a16="http://schemas.microsoft.com/office/drawing/2014/main" xmlns="" id="{127D60BA-7D2C-1548-8CB9-81CA238BB53C}"/>
+                <a16:creationId xmlns:a16="http://schemas.microsoft.com/office/drawing/2014/main" id="{127D60BA-7D2C-1548-8CB9-81CA238BB53C}"/>
               </a:ext>
             </a:extLst>
           </p:cNvPr>
@@ -14364,7 +14254,7 @@
           <p:cNvPr id="8" name="Rectangle 7">
             <a:extLst>
               <a:ext uri="{FF2B5EF4-FFF2-40B4-BE49-F238E27FC236}">
-                <a16:creationId xmlns:a16="http://schemas.microsoft.com/office/drawing/2014/main" xmlns="" id="{D45207C1-55BB-DB4B-990B-7E41DAF9E310}"/>
+                <a16:creationId xmlns:a16="http://schemas.microsoft.com/office/drawing/2014/main" id="{D45207C1-55BB-DB4B-990B-7E41DAF9E310}"/>
               </a:ext>
             </a:extLst>
           </p:cNvPr>
@@ -14404,7 +14294,7 @@
                 </a:solidFill>
                 <a:latin typeface="Source Code Pro" panose="020B0509030403020204"/>
               </a:rPr>
-              <a:t>var </a:t>
+              <a:t>let </a:t>
             </a:r>
             <a:r>
               <a:rPr lang="fr-FR" altLang="fr-FR" dirty="0" err="1">
@@ -14756,7 +14646,7 @@
           <a:p>
             <a:fld id="{1AC11C67-BE04-4C5F-B0EE-E01220C9093A}" type="datetime4">
               <a:rPr lang="fr-FR" smtClean="0"/>
-              <a:t>6 juin 2019</a:t>
+              <a:t>7 juin 2019</a:t>
             </a:fld>
             <a:endParaRPr lang="fr-FR" dirty="0"/>
           </a:p>
@@ -15043,7 +14933,7 @@
           <p:cNvPr id="9" name="Graphic 8">
             <a:extLst>
               <a:ext uri="{FF2B5EF4-FFF2-40B4-BE49-F238E27FC236}">
-                <a16:creationId xmlns:a16="http://schemas.microsoft.com/office/drawing/2014/main" xmlns="" id="{6F3E1559-D605-C945-85DB-066CD93FEA04}"/>
+                <a16:creationId xmlns:a16="http://schemas.microsoft.com/office/drawing/2014/main" id="{6F3E1559-D605-C945-85DB-066CD93FEA04}"/>
               </a:ext>
             </a:extLst>
           </p:cNvPr>
@@ -15056,7 +14946,7 @@
           <a:blip r:embed="rId3">
             <a:extLst>
               <a:ext uri="{96DAC541-7B7A-43D3-8B79-37D633B846F1}">
-                <asvg:svgBlip xmlns:asvg="http://schemas.microsoft.com/office/drawing/2016/SVG/main" xmlns="" r:embed="rId4"/>
+                <asvg:svgBlip xmlns:asvg="http://schemas.microsoft.com/office/drawing/2016/SVG/main" r:embed="rId4"/>
               </a:ext>
             </a:extLst>
           </a:blip>
@@ -15079,7 +14969,7 @@
           <p:cNvPr id="12" name="Rectangle 11">
             <a:extLst>
               <a:ext uri="{FF2B5EF4-FFF2-40B4-BE49-F238E27FC236}">
-                <a16:creationId xmlns:a16="http://schemas.microsoft.com/office/drawing/2014/main" xmlns="" id="{6EC37172-BD25-FF4A-8EF0-B0746183C81E}"/>
+                <a16:creationId xmlns:a16="http://schemas.microsoft.com/office/drawing/2014/main" id="{6EC37172-BD25-FF4A-8EF0-B0746183C81E}"/>
               </a:ext>
             </a:extLst>
           </p:cNvPr>
@@ -15149,16 +15039,6 @@
                 <a:latin typeface="Helvetica" pitchFamily="2" charset="0"/>
               </a:rPr>
               <a:t>File:DOM-model.svg</a:t>
-            </a:r>
-            <a:r>
-              <a:rPr lang="fr-FR" sz="800" dirty="0">
-                <a:solidFill>
-                  <a:schemeClr val="bg1">
-                    <a:lumMod val="50000"/>
-                  </a:schemeClr>
-                </a:solidFill>
-              </a:rPr>
-              <a:t/>
             </a:r>
             <a:br>
               <a:rPr lang="fr-FR" sz="800" dirty="0">
@@ -15496,10 +15376,6 @@
             <a:pPr marL="0" indent="0">
               <a:buNone/>
             </a:pPr>
-            <a:r>
-              <a:rPr lang="fr-FR" sz="2400" dirty="0"/>
-              <a:t/>
-            </a:r>
             <a:br>
               <a:rPr lang="fr-FR" sz="2400" dirty="0"/>
             </a:br>
@@ -15548,7 +15424,7 @@
           <a:p>
             <a:fld id="{BB2FA04C-1355-4CE6-8050-4BD994E23BD5}" type="datetime4">
               <a:rPr lang="fr-FR" smtClean="0"/>
-              <a:t>6 juin 2019</a:t>
+              <a:t>7 juin 2019</a:t>
             </a:fld>
             <a:endParaRPr lang="fr-FR" dirty="0"/>
           </a:p>
@@ -15605,7 +15481,7 @@
           <p:cNvPr id="8" name="Rectangle 7">
             <a:extLst>
               <a:ext uri="{FF2B5EF4-FFF2-40B4-BE49-F238E27FC236}">
-                <a16:creationId xmlns:a16="http://schemas.microsoft.com/office/drawing/2014/main" xmlns="" id="{99D6AB73-3556-6845-9EF8-9024C2407A0D}"/>
+                <a16:creationId xmlns:a16="http://schemas.microsoft.com/office/drawing/2014/main" id="{99D6AB73-3556-6845-9EF8-9024C2407A0D}"/>
               </a:ext>
             </a:extLst>
           </p:cNvPr>

</xml_diff>

<commit_message>
Typo HTTP + slide supplémentaire objet JavaScript
</commit_message>
<xml_diff>
--- a/web/4-JS/JavaScript.pptx
+++ b/web/4-JS/JavaScript.pptx
@@ -5,10 +5,10 @@
     <p:sldMasterId id="2147483648" r:id="rId1"/>
   </p:sldMasterIdLst>
   <p:notesMasterIdLst>
-    <p:notesMasterId r:id="rId18"/>
+    <p:notesMasterId r:id="rId19"/>
   </p:notesMasterIdLst>
   <p:handoutMasterIdLst>
-    <p:handoutMasterId r:id="rId19"/>
+    <p:handoutMasterId r:id="rId20"/>
   </p:handoutMasterIdLst>
   <p:sldIdLst>
     <p:sldId id="257" r:id="rId2"/>
@@ -18,15 +18,16 @@
     <p:sldId id="273" r:id="rId6"/>
     <p:sldId id="274" r:id="rId7"/>
     <p:sldId id="275" r:id="rId8"/>
-    <p:sldId id="258" r:id="rId9"/>
-    <p:sldId id="260" r:id="rId10"/>
-    <p:sldId id="267" r:id="rId11"/>
-    <p:sldId id="261" r:id="rId12"/>
-    <p:sldId id="266" r:id="rId13"/>
-    <p:sldId id="271" r:id="rId14"/>
-    <p:sldId id="264" r:id="rId15"/>
-    <p:sldId id="268" r:id="rId16"/>
-    <p:sldId id="269" r:id="rId17"/>
+    <p:sldId id="276" r:id="rId9"/>
+    <p:sldId id="258" r:id="rId10"/>
+    <p:sldId id="260" r:id="rId11"/>
+    <p:sldId id="267" r:id="rId12"/>
+    <p:sldId id="261" r:id="rId13"/>
+    <p:sldId id="266" r:id="rId14"/>
+    <p:sldId id="271" r:id="rId15"/>
+    <p:sldId id="264" r:id="rId16"/>
+    <p:sldId id="268" r:id="rId17"/>
+    <p:sldId id="269" r:id="rId18"/>
   </p:sldIdLst>
   <p:sldSz cx="9144000" cy="6858000" type="screen4x3"/>
   <p:notesSz cx="6858000" cy="9144000"/>
@@ -730,15 +731,7 @@
             </a:r>
             <a:r>
               <a:rPr lang="fr-FR" dirty="0"/>
-              <a:t> (Microsoft) </a:t>
-            </a:r>
-            <a:r>
-              <a:rPr lang="fr-FR"/>
-              <a:t>sont d’autres </a:t>
-            </a:r>
-            <a:r>
-              <a:rPr lang="fr-FR" dirty="0"/>
-              <a:t>implémentations du standard.</a:t>
+              <a:t> (Microsoft) sont d’autres implémentations du standard.</a:t>
             </a:r>
           </a:p>
         </p:txBody>
@@ -844,7 +837,7 @@
           <a:p>
             <a:fld id="{1C0E2CBA-6097-B848-A7DA-4D7BD6EB303B}" type="slidenum">
               <a:rPr lang="fr-FR" smtClean="0"/>
-              <a:t>8</a:t>
+              <a:t>9</a:t>
             </a:fld>
             <a:endParaRPr lang="fr-FR"/>
           </a:p>
@@ -928,7 +921,7 @@
           <a:p>
             <a:fld id="{1C0E2CBA-6097-B848-A7DA-4D7BD6EB303B}" type="slidenum">
               <a:rPr lang="fr-FR" smtClean="0"/>
-              <a:t>9</a:t>
+              <a:t>10</a:t>
             </a:fld>
             <a:endParaRPr lang="fr-FR"/>
           </a:p>
@@ -5953,36 +5946,58 @@
             <a:pPr marL="400050" indent="-400050"/>
             <a:r>
               <a:rPr lang="fr-FR" sz="2400" dirty="0"/>
-              <a:t>Mettre le code JavaScript  dans un fichier externe </a:t>
-            </a:r>
-            <a:r>
-              <a:rPr lang="fr-FR" dirty="0"/>
-              <a:t>(.</a:t>
-            </a:r>
-            <a:r>
-              <a:rPr lang="fr-FR" dirty="0" err="1"/>
-              <a:t>js</a:t>
-            </a:r>
-            <a:r>
-              <a:rPr lang="fr-FR" dirty="0"/>
-              <a:t>) </a:t>
-            </a:r>
-            <a:br>
-              <a:rPr lang="fr-FR" dirty="0"/>
-            </a:br>
+              <a:t>Ajouter le code JavaScript dans la page HTML </a:t>
+            </a:r>
             <a:br>
               <a:rPr lang="fr-FR" sz="2400" dirty="0"/>
             </a:br>
-            <a:br>
+            <a:r>
               <a:rPr lang="fr-FR" sz="2400" dirty="0"/>
-            </a:br>
-            <a:br>
-              <a:rPr lang="fr-FR" sz="2400" dirty="0"/>
-            </a:br>
-            <a:r>
-              <a:rPr lang="fr-FR" sz="2400" dirty="0"/>
-              <a:t>et pointer ce fichier depuis le HTML :</a:t>
-            </a:r>
+              <a:t>à l'intérieur d'une balise </a:t>
+            </a:r>
+            <a:r>
+              <a:rPr lang="fr-FR" sz="2400" dirty="0">
+                <a:solidFill>
+                  <a:srgbClr val="990000"/>
+                </a:solidFill>
+                <a:latin typeface="Source Code Pro" panose="020B0509030403020204" pitchFamily="49" charset="0"/>
+                <a:ea typeface="Source Code Pro" panose="020B0509030403020204" pitchFamily="49" charset="0"/>
+              </a:rPr>
+              <a:t>&lt;script&gt;</a:t>
+            </a:r>
+            <a:r>
+              <a:rPr lang="fr-FR" sz="2400" b="1" dirty="0">
+                <a:solidFill>
+                  <a:srgbClr val="990000"/>
+                </a:solidFill>
+                <a:latin typeface="+mj-lt"/>
+                <a:ea typeface="Source Code Pro" panose="020B0509030403020204" pitchFamily="49" charset="0"/>
+              </a:rPr>
+              <a:t> </a:t>
+            </a:r>
+            <a:r>
+              <a:rPr lang="fr-FR" sz="2400" dirty="0">
+                <a:latin typeface="+mj-lt"/>
+              </a:rPr>
+              <a:t>:</a:t>
+            </a:r>
+          </a:p>
+          <a:p>
+            <a:pPr marL="400050" indent="-400050"/>
+            <a:endParaRPr lang="fr-FR" sz="2400" dirty="0"/>
+          </a:p>
+          <a:p>
+            <a:pPr marL="400050" indent="-400050"/>
+            <a:endParaRPr lang="fr-FR" sz="2400" dirty="0"/>
+          </a:p>
+          <a:p>
+            <a:pPr marL="400050" indent="-400050"/>
+            <a:endParaRPr lang="fr-FR" sz="2400" dirty="0"/>
+          </a:p>
+          <a:p>
+            <a:pPr marL="0" indent="0">
+              <a:buNone/>
+            </a:pPr>
             <a:br>
               <a:rPr lang="fr-FR" sz="2400" dirty="0"/>
             </a:br>
@@ -6009,7 +6024,7 @@
           <a:p>
             <a:r>
               <a:rPr lang="fr-FR" b="1" dirty="0"/>
-              <a:t>HTML et JavaScript (3/3)</a:t>
+              <a:t>HTML et JavaScript (2/3)</a:t>
             </a:r>
           </a:p>
         </p:txBody>
@@ -6078,6 +6093,858 @@
               <a:rPr lang="fr-FR" smtClean="0"/>
               <a:pPr/>
               <a:t>10</a:t>
+            </a:fld>
+            <a:endParaRPr lang="fr-FR"/>
+          </a:p>
+        </p:txBody>
+      </p:sp>
+      <p:sp>
+        <p:nvSpPr>
+          <p:cNvPr id="8" name="Rectangle 7">
+            <a:extLst>
+              <a:ext uri="{FF2B5EF4-FFF2-40B4-BE49-F238E27FC236}">
+                <a16:creationId xmlns:a16="http://schemas.microsoft.com/office/drawing/2014/main" id="{99D6AB73-3556-6845-9EF8-9024C2407A0D}"/>
+              </a:ext>
+            </a:extLst>
+          </p:cNvPr>
+          <p:cNvSpPr/>
+          <p:nvPr/>
+        </p:nvSpPr>
+        <p:spPr>
+          <a:xfrm>
+            <a:off x="555710" y="1981138"/>
+            <a:ext cx="8032580" cy="4030702"/>
+          </a:xfrm>
+          <a:prstGeom prst="rect">
+            <a:avLst/>
+          </a:prstGeom>
+          <a:solidFill>
+            <a:srgbClr val="FEF6E3"/>
+          </a:solidFill>
+          <a:effectLst>
+            <a:outerShdw blurRad="50800" dist="38100" dir="2700000" algn="tl" rotWithShape="0">
+              <a:prstClr val="black">
+                <a:alpha val="40000"/>
+              </a:prstClr>
+            </a:outerShdw>
+          </a:effectLst>
+        </p:spPr>
+        <p:txBody>
+          <a:bodyPr vert="horz" lIns="91440" tIns="45720" rIns="91440" bIns="45720" rtlCol="0" anchor="ctr">
+            <a:normAutofit/>
+          </a:bodyPr>
+          <a:lstStyle/>
+          <a:p>
+            <a:pPr marL="47625" indent="0">
+              <a:buFont typeface="Brix Slab Bold" pitchFamily="50" charset="0"/>
+              <a:buNone/>
+            </a:pPr>
+            <a:r>
+              <a:rPr lang="fr-FR" dirty="0">
+                <a:solidFill>
+                  <a:srgbClr val="657B83"/>
+                </a:solidFill>
+                <a:latin typeface="Source Code Pro" panose="020B0509030403020204" pitchFamily="49" charset="0"/>
+                <a:ea typeface="Source Code Pro" panose="020B0509030403020204" pitchFamily="49" charset="0"/>
+              </a:rPr>
+              <a:t>&lt;!DOCTYPE html&gt;</a:t>
+            </a:r>
+          </a:p>
+          <a:p>
+            <a:pPr marL="47625" indent="0">
+              <a:buFont typeface="Brix Slab Bold" pitchFamily="50" charset="0"/>
+              <a:buNone/>
+            </a:pPr>
+            <a:r>
+              <a:rPr lang="fr-FR" dirty="0">
+                <a:solidFill>
+                  <a:srgbClr val="010080"/>
+                </a:solidFill>
+                <a:latin typeface="Source Code Pro" panose="020B0509030403020204" pitchFamily="49" charset="0"/>
+                <a:ea typeface="Source Code Pro" panose="020B0509030403020204" pitchFamily="49" charset="0"/>
+              </a:rPr>
+              <a:t>&lt;html </a:t>
+            </a:r>
+            <a:r>
+              <a:rPr lang="fr-FR" dirty="0" err="1">
+                <a:solidFill>
+                  <a:srgbClr val="008080"/>
+                </a:solidFill>
+                <a:latin typeface="Source Code Pro" panose="020B0509030403020204" pitchFamily="49" charset="0"/>
+                <a:ea typeface="Source Code Pro" panose="020B0509030403020204" pitchFamily="49" charset="0"/>
+              </a:rPr>
+              <a:t>lang</a:t>
+            </a:r>
+            <a:r>
+              <a:rPr lang="fr-FR" dirty="0">
+                <a:solidFill>
+                  <a:srgbClr val="010080"/>
+                </a:solidFill>
+                <a:latin typeface="Source Code Pro" panose="020B0509030403020204" pitchFamily="49" charset="0"/>
+                <a:ea typeface="Source Code Pro" panose="020B0509030403020204" pitchFamily="49" charset="0"/>
+              </a:rPr>
+              <a:t>="</a:t>
+            </a:r>
+            <a:r>
+              <a:rPr lang="fr-FR" dirty="0" err="1">
+                <a:solidFill>
+                  <a:srgbClr val="990000"/>
+                </a:solidFill>
+                <a:latin typeface="Source Code Pro" panose="020B0509030403020204" pitchFamily="49" charset="0"/>
+                <a:ea typeface="Source Code Pro" panose="020B0509030403020204" pitchFamily="49" charset="0"/>
+              </a:rPr>
+              <a:t>fr</a:t>
+            </a:r>
+            <a:r>
+              <a:rPr lang="fr-FR" dirty="0">
+                <a:solidFill>
+                  <a:srgbClr val="010080"/>
+                </a:solidFill>
+                <a:latin typeface="Source Code Pro" panose="020B0509030403020204" pitchFamily="49" charset="0"/>
+                <a:ea typeface="Source Code Pro" panose="020B0509030403020204" pitchFamily="49" charset="0"/>
+              </a:rPr>
+              <a:t>"&gt;</a:t>
+            </a:r>
+          </a:p>
+          <a:p>
+            <a:pPr marL="342900" lvl="1" indent="0">
+              <a:buNone/>
+            </a:pPr>
+            <a:r>
+              <a:rPr lang="fr-FR" dirty="0">
+                <a:solidFill>
+                  <a:srgbClr val="010080"/>
+                </a:solidFill>
+                <a:latin typeface="Source Code Pro" panose="020B0509030403020204" pitchFamily="49" charset="0"/>
+                <a:ea typeface="Source Code Pro" panose="020B0509030403020204" pitchFamily="49" charset="0"/>
+              </a:rPr>
+              <a:t>&lt;</a:t>
+            </a:r>
+            <a:r>
+              <a:rPr lang="fr-FR" dirty="0" err="1">
+                <a:solidFill>
+                  <a:srgbClr val="010080"/>
+                </a:solidFill>
+                <a:latin typeface="Source Code Pro" panose="020B0509030403020204" pitchFamily="49" charset="0"/>
+                <a:ea typeface="Source Code Pro" panose="020B0509030403020204" pitchFamily="49" charset="0"/>
+              </a:rPr>
+              <a:t>head</a:t>
+            </a:r>
+            <a:r>
+              <a:rPr lang="fr-FR" dirty="0">
+                <a:solidFill>
+                  <a:srgbClr val="010080"/>
+                </a:solidFill>
+                <a:latin typeface="Source Code Pro" panose="020B0509030403020204" pitchFamily="49" charset="0"/>
+                <a:ea typeface="Source Code Pro" panose="020B0509030403020204" pitchFamily="49" charset="0"/>
+              </a:rPr>
+              <a:t>&gt; </a:t>
+            </a:r>
+          </a:p>
+          <a:p>
+            <a:pPr marL="742950" lvl="2" indent="0">
+              <a:buNone/>
+            </a:pPr>
+            <a:r>
+              <a:rPr lang="fr-FR" dirty="0">
+                <a:solidFill>
+                  <a:srgbClr val="010080"/>
+                </a:solidFill>
+                <a:latin typeface="Source Code Pro" panose="020B0509030403020204" pitchFamily="49" charset="0"/>
+                <a:ea typeface="Source Code Pro" panose="020B0509030403020204" pitchFamily="49" charset="0"/>
+              </a:rPr>
+              <a:t>&lt;</a:t>
+            </a:r>
+            <a:r>
+              <a:rPr lang="fr-FR" dirty="0" err="1">
+                <a:solidFill>
+                  <a:srgbClr val="010080"/>
+                </a:solidFill>
+                <a:latin typeface="Source Code Pro" panose="020B0509030403020204" pitchFamily="49" charset="0"/>
+                <a:ea typeface="Source Code Pro" panose="020B0509030403020204" pitchFamily="49" charset="0"/>
+              </a:rPr>
+              <a:t>meta</a:t>
+            </a:r>
+            <a:r>
+              <a:rPr lang="fr-FR" dirty="0">
+                <a:solidFill>
+                  <a:srgbClr val="010080"/>
+                </a:solidFill>
+                <a:latin typeface="Source Code Pro" panose="020B0509030403020204" pitchFamily="49" charset="0"/>
+                <a:ea typeface="Source Code Pro" panose="020B0509030403020204" pitchFamily="49" charset="0"/>
+              </a:rPr>
+              <a:t> </a:t>
+            </a:r>
+            <a:r>
+              <a:rPr lang="fr-FR" dirty="0" err="1">
+                <a:solidFill>
+                  <a:srgbClr val="008080"/>
+                </a:solidFill>
+                <a:latin typeface="Source Code Pro" panose="020B0509030403020204" pitchFamily="49" charset="0"/>
+                <a:ea typeface="Source Code Pro" panose="020B0509030403020204" pitchFamily="49" charset="0"/>
+              </a:rPr>
+              <a:t>charset</a:t>
+            </a:r>
+            <a:r>
+              <a:rPr lang="fr-FR" dirty="0">
+                <a:solidFill>
+                  <a:srgbClr val="010080"/>
+                </a:solidFill>
+                <a:latin typeface="Source Code Pro" panose="020B0509030403020204" pitchFamily="49" charset="0"/>
+                <a:ea typeface="Source Code Pro" panose="020B0509030403020204" pitchFamily="49" charset="0"/>
+              </a:rPr>
+              <a:t>="</a:t>
+            </a:r>
+            <a:r>
+              <a:rPr lang="fr-FR" dirty="0">
+                <a:solidFill>
+                  <a:srgbClr val="990000"/>
+                </a:solidFill>
+                <a:latin typeface="Source Code Pro" panose="020B0509030403020204" pitchFamily="49" charset="0"/>
+                <a:ea typeface="Source Code Pro" panose="020B0509030403020204" pitchFamily="49" charset="0"/>
+              </a:rPr>
+              <a:t>utf-8</a:t>
+            </a:r>
+            <a:r>
+              <a:rPr lang="fr-FR" dirty="0">
+                <a:solidFill>
+                  <a:srgbClr val="010080"/>
+                </a:solidFill>
+                <a:latin typeface="Source Code Pro" panose="020B0509030403020204" pitchFamily="49" charset="0"/>
+                <a:ea typeface="Source Code Pro" panose="020B0509030403020204" pitchFamily="49" charset="0"/>
+              </a:rPr>
+              <a:t>" /&gt; </a:t>
+            </a:r>
+          </a:p>
+          <a:p>
+            <a:pPr marL="342900" lvl="1" indent="0">
+              <a:buNone/>
+            </a:pPr>
+            <a:r>
+              <a:rPr lang="fr-FR" dirty="0">
+                <a:solidFill>
+                  <a:srgbClr val="010080"/>
+                </a:solidFill>
+                <a:latin typeface="Source Code Pro" panose="020B0509030403020204" pitchFamily="49" charset="0"/>
+                <a:ea typeface="Source Code Pro" panose="020B0509030403020204" pitchFamily="49" charset="0"/>
+              </a:rPr>
+              <a:t>&lt;/</a:t>
+            </a:r>
+            <a:r>
+              <a:rPr lang="fr-FR" dirty="0" err="1">
+                <a:solidFill>
+                  <a:srgbClr val="010080"/>
+                </a:solidFill>
+                <a:latin typeface="Source Code Pro" panose="020B0509030403020204" pitchFamily="49" charset="0"/>
+                <a:ea typeface="Source Code Pro" panose="020B0509030403020204" pitchFamily="49" charset="0"/>
+              </a:rPr>
+              <a:t>head</a:t>
+            </a:r>
+            <a:r>
+              <a:rPr lang="fr-FR" dirty="0">
+                <a:solidFill>
+                  <a:srgbClr val="010080"/>
+                </a:solidFill>
+                <a:latin typeface="Source Code Pro" panose="020B0509030403020204" pitchFamily="49" charset="0"/>
+                <a:ea typeface="Source Code Pro" panose="020B0509030403020204" pitchFamily="49" charset="0"/>
+              </a:rPr>
+              <a:t>&gt;</a:t>
+            </a:r>
+          </a:p>
+          <a:p>
+            <a:pPr marL="342900" lvl="1" indent="0">
+              <a:buNone/>
+            </a:pPr>
+            <a:r>
+              <a:rPr lang="fr-FR" dirty="0">
+                <a:solidFill>
+                  <a:srgbClr val="010080"/>
+                </a:solidFill>
+                <a:latin typeface="Source Code Pro" panose="020B0509030403020204" pitchFamily="49" charset="0"/>
+                <a:ea typeface="Source Code Pro" panose="020B0509030403020204" pitchFamily="49" charset="0"/>
+              </a:rPr>
+              <a:t>&lt;body&gt;</a:t>
+            </a:r>
+          </a:p>
+          <a:p>
+            <a:pPr marL="760413" lvl="1">
+              <a:spcBef>
+                <a:spcPct val="20000"/>
+              </a:spcBef>
+              <a:buClr>
+                <a:schemeClr val="accent6"/>
+              </a:buClr>
+            </a:pPr>
+            <a:r>
+              <a:rPr lang="fr-FR" altLang="fr-FR" b="1" dirty="0">
+                <a:solidFill>
+                  <a:srgbClr val="010080"/>
+                </a:solidFill>
+                <a:latin typeface="Source Code Pro" panose="020B0509030403020204" pitchFamily="49" charset="0"/>
+                <a:ea typeface="Source Code Pro" panose="020B0509030403020204" pitchFamily="49" charset="0"/>
+              </a:rPr>
+              <a:t>&lt;script&gt;</a:t>
+            </a:r>
+          </a:p>
+          <a:p>
+            <a:pPr marL="962025" lvl="2">
+              <a:spcBef>
+                <a:spcPct val="20000"/>
+              </a:spcBef>
+              <a:buClr>
+                <a:schemeClr val="accent6"/>
+              </a:buClr>
+            </a:pPr>
+            <a:r>
+              <a:rPr lang="fr-FR" altLang="fr-FR" dirty="0" err="1">
+                <a:solidFill>
+                  <a:srgbClr val="010080"/>
+                </a:solidFill>
+                <a:latin typeface="Source Code Pro" panose="020B0509030403020204" pitchFamily="49" charset="0"/>
+                <a:ea typeface="Source Code Pro" panose="020B0509030403020204" pitchFamily="49" charset="0"/>
+              </a:rPr>
+              <a:t>window.addEventListener</a:t>
+            </a:r>
+            <a:r>
+              <a:rPr lang="fr-FR" altLang="fr-FR" dirty="0">
+                <a:solidFill>
+                  <a:srgbClr val="010080"/>
+                </a:solidFill>
+                <a:latin typeface="Source Code Pro" panose="020B0509030403020204" pitchFamily="49" charset="0"/>
+                <a:ea typeface="Source Code Pro" panose="020B0509030403020204" pitchFamily="49" charset="0"/>
+              </a:rPr>
+              <a:t>('</a:t>
+            </a:r>
+            <a:r>
+              <a:rPr lang="fr-FR" altLang="fr-FR" dirty="0" err="1">
+                <a:solidFill>
+                  <a:srgbClr val="010080"/>
+                </a:solidFill>
+                <a:latin typeface="Source Code Pro" panose="020B0509030403020204" pitchFamily="49" charset="0"/>
+                <a:ea typeface="Source Code Pro" panose="020B0509030403020204" pitchFamily="49" charset="0"/>
+              </a:rPr>
+              <a:t>load</a:t>
+            </a:r>
+            <a:r>
+              <a:rPr lang="fr-FR" altLang="fr-FR" dirty="0">
+                <a:solidFill>
+                  <a:srgbClr val="010080"/>
+                </a:solidFill>
+                <a:latin typeface="Source Code Pro" panose="020B0509030403020204" pitchFamily="49" charset="0"/>
+                <a:ea typeface="Source Code Pro" panose="020B0509030403020204" pitchFamily="49" charset="0"/>
+              </a:rPr>
+              <a:t>', </a:t>
+            </a:r>
+            <a:r>
+              <a:rPr lang="fr-FR" altLang="fr-FR" dirty="0" err="1">
+                <a:solidFill>
+                  <a:srgbClr val="00B050"/>
+                </a:solidFill>
+                <a:latin typeface="Source Code Pro" panose="020B0509030403020204"/>
+              </a:rPr>
+              <a:t>function</a:t>
+            </a:r>
+            <a:r>
+              <a:rPr lang="fr-FR" altLang="fr-FR" dirty="0">
+                <a:solidFill>
+                  <a:srgbClr val="010080"/>
+                </a:solidFill>
+                <a:latin typeface="Source Code Pro" panose="020B0509030403020204" pitchFamily="49" charset="0"/>
+                <a:ea typeface="Source Code Pro" panose="020B0509030403020204" pitchFamily="49" charset="0"/>
+              </a:rPr>
+              <a:t> () {     </a:t>
+            </a:r>
+          </a:p>
+          <a:p>
+            <a:pPr marL="962025" lvl="2">
+              <a:spcBef>
+                <a:spcPct val="20000"/>
+              </a:spcBef>
+              <a:buClr>
+                <a:schemeClr val="accent6"/>
+              </a:buClr>
+            </a:pPr>
+            <a:r>
+              <a:rPr lang="fr-FR" altLang="fr-FR" dirty="0" err="1">
+                <a:solidFill>
+                  <a:srgbClr val="6F42C1"/>
+                </a:solidFill>
+                <a:latin typeface="Source Code Pro" panose="020B0509030403020204"/>
+              </a:rPr>
+              <a:t>console</a:t>
+            </a:r>
+            <a:r>
+              <a:rPr lang="fr-FR" altLang="fr-FR" dirty="0" err="1">
+                <a:solidFill>
+                  <a:srgbClr val="010080"/>
+                </a:solidFill>
+                <a:latin typeface="Source Code Pro" panose="020B0509030403020204" pitchFamily="49" charset="0"/>
+                <a:ea typeface="Source Code Pro" panose="020B0509030403020204" pitchFamily="49" charset="0"/>
+              </a:rPr>
+              <a:t>.</a:t>
+            </a:r>
+            <a:r>
+              <a:rPr lang="fr-FR" altLang="fr-FR" dirty="0" err="1">
+                <a:solidFill>
+                  <a:srgbClr val="005CC5"/>
+                </a:solidFill>
+                <a:latin typeface="Source Code Pro" panose="020B0509030403020204"/>
+              </a:rPr>
+              <a:t>log</a:t>
+            </a:r>
+            <a:r>
+              <a:rPr lang="fr-FR" altLang="fr-FR" dirty="0">
+                <a:solidFill>
+                  <a:srgbClr val="010080"/>
+                </a:solidFill>
+                <a:latin typeface="Source Code Pro" panose="020B0509030403020204" pitchFamily="49" charset="0"/>
+                <a:ea typeface="Source Code Pro" panose="020B0509030403020204" pitchFamily="49" charset="0"/>
+              </a:rPr>
+              <a:t>(</a:t>
+            </a:r>
+            <a:r>
+              <a:rPr lang="fr-FR" altLang="fr-FR" dirty="0">
+                <a:solidFill>
+                  <a:srgbClr val="657B83"/>
+                </a:solidFill>
+                <a:latin typeface="Source Code Pro" panose="020B0509030403020204" pitchFamily="49" charset="0"/>
+                <a:ea typeface="Source Code Pro" panose="020B0509030403020204" pitchFamily="49" charset="0"/>
+              </a:rPr>
+              <a:t>'Cette fonction est exécutée une fois la page chargée.'</a:t>
+            </a:r>
+            <a:r>
+              <a:rPr lang="fr-FR" altLang="fr-FR" dirty="0">
+                <a:solidFill>
+                  <a:srgbClr val="010080"/>
+                </a:solidFill>
+                <a:latin typeface="Source Code Pro" panose="020B0509030403020204" pitchFamily="49" charset="0"/>
+                <a:ea typeface="Source Code Pro" panose="020B0509030403020204" pitchFamily="49" charset="0"/>
+              </a:rPr>
+              <a:t>); });  </a:t>
+            </a:r>
+          </a:p>
+          <a:p>
+            <a:pPr marL="760413" lvl="1">
+              <a:spcBef>
+                <a:spcPct val="20000"/>
+              </a:spcBef>
+              <a:buClr>
+                <a:schemeClr val="accent6"/>
+              </a:buClr>
+            </a:pPr>
+            <a:r>
+              <a:rPr lang="fr-FR" altLang="fr-FR" b="1" dirty="0">
+                <a:solidFill>
+                  <a:srgbClr val="010080"/>
+                </a:solidFill>
+                <a:latin typeface="Source Code Pro" panose="020B0509030403020204" pitchFamily="49" charset="0"/>
+                <a:ea typeface="Source Code Pro" panose="020B0509030403020204" pitchFamily="49" charset="0"/>
+              </a:rPr>
+              <a:t>&lt;/script&gt;</a:t>
+            </a:r>
+          </a:p>
+          <a:p>
+            <a:pPr marL="342900" lvl="1" indent="0">
+              <a:buNone/>
+            </a:pPr>
+            <a:r>
+              <a:rPr lang="fr-FR" dirty="0">
+                <a:solidFill>
+                  <a:srgbClr val="010080"/>
+                </a:solidFill>
+                <a:latin typeface="Source Code Pro" panose="020B0509030403020204" pitchFamily="49" charset="0"/>
+              </a:rPr>
+              <a:t>&lt;/body&gt;</a:t>
+            </a:r>
+          </a:p>
+          <a:p>
+            <a:pPr marL="47625" indent="0">
+              <a:buNone/>
+            </a:pPr>
+            <a:r>
+              <a:rPr lang="fr-FR" dirty="0">
+                <a:solidFill>
+                  <a:srgbClr val="010080"/>
+                </a:solidFill>
+                <a:latin typeface="Source Code Pro" panose="020B0509030403020204" pitchFamily="49" charset="0"/>
+              </a:rPr>
+              <a:t>&lt;/html&gt;</a:t>
+            </a:r>
+            <a:endParaRPr lang="en-US" dirty="0">
+              <a:solidFill>
+                <a:srgbClr val="657B83"/>
+              </a:solidFill>
+              <a:latin typeface="Source Code Pro" panose="020B0509030403020204" pitchFamily="49" charset="0"/>
+            </a:endParaRPr>
+          </a:p>
+        </p:txBody>
+      </p:sp>
+    </p:spTree>
+    <p:extLst>
+      <p:ext uri="{BB962C8B-B14F-4D97-AF65-F5344CB8AC3E}">
+        <p14:creationId xmlns:p14="http://schemas.microsoft.com/office/powerpoint/2010/main" val="472601625"/>
+      </p:ext>
+    </p:extLst>
+  </p:cSld>
+  <p:clrMapOvr>
+    <a:masterClrMapping/>
+  </p:clrMapOvr>
+</p:sld>
+</file>
+
+<file path=ppt/slides/slide11.xml><?xml version="1.0" encoding="utf-8"?>
+<p:sld xmlns:a="http://schemas.openxmlformats.org/drawingml/2006/main" xmlns:r="http://schemas.openxmlformats.org/officeDocument/2006/relationships" xmlns:p="http://schemas.openxmlformats.org/presentationml/2006/main">
+  <p:cSld>
+    <p:spTree>
+      <p:nvGrpSpPr>
+        <p:cNvPr id="1" name=""/>
+        <p:cNvGrpSpPr/>
+        <p:nvPr/>
+      </p:nvGrpSpPr>
+      <p:grpSpPr>
+        <a:xfrm>
+          <a:off x="0" y="0"/>
+          <a:ext cx="0" cy="0"/>
+          <a:chOff x="0" y="0"/>
+          <a:chExt cx="0" cy="0"/>
+        </a:xfrm>
+      </p:grpSpPr>
+      <p:sp>
+        <p:nvSpPr>
+          <p:cNvPr id="10" name="Espace réservé du contenu 2"/>
+          <p:cNvSpPr txBox="1">
+            <a:spLocks/>
+          </p:cNvSpPr>
+          <p:nvPr/>
+        </p:nvSpPr>
+        <p:spPr>
+          <a:xfrm>
+            <a:off x="228600" y="1058026"/>
+            <a:ext cx="8644466" cy="5569596"/>
+          </a:xfrm>
+          <a:prstGeom prst="rect">
+            <a:avLst/>
+          </a:prstGeom>
+        </p:spPr>
+        <p:txBody>
+          <a:bodyPr vert="horz" lIns="91440" tIns="45720" rIns="91440" bIns="45720" rtlCol="0">
+            <a:noAutofit/>
+          </a:bodyPr>
+          <a:lstStyle>
+            <a:lvl1pPr marL="342900" marR="0" indent="-342900" algn="l" defTabSz="457200" rtl="0" eaLnBrk="1" fontAlgn="auto" latinLnBrk="0" hangingPunct="1">
+              <a:lnSpc>
+                <a:spcPct val="100000"/>
+              </a:lnSpc>
+              <a:spcBef>
+                <a:spcPct val="20000"/>
+              </a:spcBef>
+              <a:spcAft>
+                <a:spcPts val="0"/>
+              </a:spcAft>
+              <a:buClr>
+                <a:schemeClr val="accent6"/>
+              </a:buClr>
+              <a:buSzTx/>
+              <a:buFont typeface="Lucida Grande"/>
+              <a:buChar char="➔"/>
+              <a:tabLst/>
+              <a:defRPr sz="2000" kern="1200">
+                <a:solidFill>
+                  <a:schemeClr val="tx1"/>
+                </a:solidFill>
+                <a:latin typeface="+mn-lt"/>
+                <a:ea typeface="+mn-ea"/>
+                <a:cs typeface="+mn-cs"/>
+              </a:defRPr>
+            </a:lvl1pPr>
+            <a:lvl2pPr marL="742950" marR="0" indent="-285750" algn="l" defTabSz="457200" rtl="0" eaLnBrk="1" fontAlgn="auto" latinLnBrk="0" hangingPunct="1">
+              <a:lnSpc>
+                <a:spcPct val="100000"/>
+              </a:lnSpc>
+              <a:spcBef>
+                <a:spcPct val="20000"/>
+              </a:spcBef>
+              <a:spcAft>
+                <a:spcPts val="0"/>
+              </a:spcAft>
+              <a:buClr>
+                <a:srgbClr val="009DE0"/>
+              </a:buClr>
+              <a:buSzTx/>
+              <a:buFont typeface="Arial"/>
+              <a:buChar char="›"/>
+              <a:tabLst/>
+              <a:defRPr sz="2800" kern="1200">
+                <a:solidFill>
+                  <a:schemeClr val="tx1"/>
+                </a:solidFill>
+                <a:latin typeface="+mn-lt"/>
+                <a:ea typeface="+mn-ea"/>
+                <a:cs typeface="+mn-cs"/>
+              </a:defRPr>
+            </a:lvl2pPr>
+            <a:lvl3pPr marL="1143000" marR="0" indent="-228600" algn="l" defTabSz="457200" rtl="0" eaLnBrk="1" fontAlgn="auto" latinLnBrk="0" hangingPunct="1">
+              <a:lnSpc>
+                <a:spcPct val="100000"/>
+              </a:lnSpc>
+              <a:spcBef>
+                <a:spcPct val="20000"/>
+              </a:spcBef>
+              <a:spcAft>
+                <a:spcPts val="0"/>
+              </a:spcAft>
+              <a:buClrTx/>
+              <a:buSzTx/>
+              <a:buFont typeface="Arial"/>
+              <a:buChar char="•"/>
+              <a:tabLst/>
+              <a:defRPr sz="2400" kern="1200">
+                <a:solidFill>
+                  <a:schemeClr val="tx1"/>
+                </a:solidFill>
+                <a:latin typeface="+mn-lt"/>
+                <a:ea typeface="+mn-ea"/>
+                <a:cs typeface="+mn-cs"/>
+              </a:defRPr>
+            </a:lvl3pPr>
+            <a:lvl4pPr marL="1600200" marR="0" indent="-228600" algn="l" defTabSz="457200" rtl="0" eaLnBrk="1" fontAlgn="auto" latinLnBrk="0" hangingPunct="1">
+              <a:lnSpc>
+                <a:spcPct val="100000"/>
+              </a:lnSpc>
+              <a:spcBef>
+                <a:spcPct val="20000"/>
+              </a:spcBef>
+              <a:spcAft>
+                <a:spcPts val="0"/>
+              </a:spcAft>
+              <a:buClrTx/>
+              <a:buSzTx/>
+              <a:buFont typeface="Arial"/>
+              <a:buChar char="–"/>
+              <a:tabLst/>
+              <a:defRPr sz="2000" kern="1200">
+                <a:solidFill>
+                  <a:schemeClr val="tx1"/>
+                </a:solidFill>
+                <a:latin typeface="+mn-lt"/>
+                <a:ea typeface="+mn-ea"/>
+                <a:cs typeface="+mn-cs"/>
+              </a:defRPr>
+            </a:lvl4pPr>
+            <a:lvl5pPr marL="2057400" marR="0" indent="-228600" algn="l" defTabSz="457200" rtl="0" eaLnBrk="1" fontAlgn="auto" latinLnBrk="0" hangingPunct="1">
+              <a:lnSpc>
+                <a:spcPct val="100000"/>
+              </a:lnSpc>
+              <a:spcBef>
+                <a:spcPct val="20000"/>
+              </a:spcBef>
+              <a:spcAft>
+                <a:spcPts val="0"/>
+              </a:spcAft>
+              <a:buClrTx/>
+              <a:buSzTx/>
+              <a:buFont typeface="Arial"/>
+              <a:buChar char="»"/>
+              <a:tabLst/>
+              <a:defRPr sz="2000" kern="1200">
+                <a:solidFill>
+                  <a:schemeClr val="tx1"/>
+                </a:solidFill>
+                <a:latin typeface="+mn-lt"/>
+                <a:ea typeface="+mn-ea"/>
+                <a:cs typeface="+mn-cs"/>
+              </a:defRPr>
+            </a:lvl5pPr>
+            <a:lvl6pPr marL="2514600" indent="-228600" algn="l" defTabSz="457200" rtl="0" eaLnBrk="1" latinLnBrk="0" hangingPunct="1">
+              <a:spcBef>
+                <a:spcPct val="20000"/>
+              </a:spcBef>
+              <a:buFont typeface="Arial"/>
+              <a:buChar char="•"/>
+              <a:defRPr sz="2000" kern="1200">
+                <a:solidFill>
+                  <a:schemeClr val="tx1"/>
+                </a:solidFill>
+                <a:latin typeface="+mn-lt"/>
+                <a:ea typeface="+mn-ea"/>
+                <a:cs typeface="+mn-cs"/>
+              </a:defRPr>
+            </a:lvl6pPr>
+            <a:lvl7pPr marL="2971800" indent="-228600" algn="l" defTabSz="457200" rtl="0" eaLnBrk="1" latinLnBrk="0" hangingPunct="1">
+              <a:spcBef>
+                <a:spcPct val="20000"/>
+              </a:spcBef>
+              <a:buFont typeface="Arial"/>
+              <a:buChar char="•"/>
+              <a:defRPr sz="2000" kern="1200">
+                <a:solidFill>
+                  <a:schemeClr val="tx1"/>
+                </a:solidFill>
+                <a:latin typeface="+mn-lt"/>
+                <a:ea typeface="+mn-ea"/>
+                <a:cs typeface="+mn-cs"/>
+              </a:defRPr>
+            </a:lvl7pPr>
+            <a:lvl8pPr marL="3429000" indent="-228600" algn="l" defTabSz="457200" rtl="0" eaLnBrk="1" latinLnBrk="0" hangingPunct="1">
+              <a:spcBef>
+                <a:spcPct val="20000"/>
+              </a:spcBef>
+              <a:buFont typeface="Arial"/>
+              <a:buChar char="•"/>
+              <a:defRPr sz="2000" kern="1200">
+                <a:solidFill>
+                  <a:schemeClr val="tx1"/>
+                </a:solidFill>
+                <a:latin typeface="+mn-lt"/>
+                <a:ea typeface="+mn-ea"/>
+                <a:cs typeface="+mn-cs"/>
+              </a:defRPr>
+            </a:lvl8pPr>
+            <a:lvl9pPr marL="3886200" indent="-228600" algn="l" defTabSz="457200" rtl="0" eaLnBrk="1" latinLnBrk="0" hangingPunct="1">
+              <a:spcBef>
+                <a:spcPct val="20000"/>
+              </a:spcBef>
+              <a:buFont typeface="Arial"/>
+              <a:buChar char="•"/>
+              <a:defRPr sz="2000" kern="1200">
+                <a:solidFill>
+                  <a:schemeClr val="tx1"/>
+                </a:solidFill>
+                <a:latin typeface="+mn-lt"/>
+                <a:ea typeface="+mn-ea"/>
+                <a:cs typeface="+mn-cs"/>
+              </a:defRPr>
+            </a:lvl9pPr>
+          </a:lstStyle>
+          <a:p>
+            <a:pPr marL="400050" indent="-400050"/>
+            <a:r>
+              <a:rPr lang="fr-FR" sz="2400" dirty="0"/>
+              <a:t>Mettre le code JavaScript  dans un fichier externe </a:t>
+            </a:r>
+            <a:r>
+              <a:rPr lang="fr-FR" dirty="0"/>
+              <a:t>(.</a:t>
+            </a:r>
+            <a:r>
+              <a:rPr lang="fr-FR" dirty="0" err="1"/>
+              <a:t>js</a:t>
+            </a:r>
+            <a:r>
+              <a:rPr lang="fr-FR" dirty="0"/>
+              <a:t>) </a:t>
+            </a:r>
+            <a:br>
+              <a:rPr lang="fr-FR" dirty="0"/>
+            </a:br>
+            <a:br>
+              <a:rPr lang="fr-FR" sz="2400" dirty="0"/>
+            </a:br>
+            <a:br>
+              <a:rPr lang="fr-FR" sz="2400" dirty="0"/>
+            </a:br>
+            <a:br>
+              <a:rPr lang="fr-FR" sz="2400" dirty="0"/>
+            </a:br>
+            <a:r>
+              <a:rPr lang="fr-FR" sz="2400" dirty="0"/>
+              <a:t>et pointer ce fichier depuis le HTML :</a:t>
+            </a:r>
+            <a:br>
+              <a:rPr lang="fr-FR" sz="2400" dirty="0"/>
+            </a:br>
+            <a:endParaRPr lang="fr-FR" sz="2400" dirty="0"/>
+          </a:p>
+        </p:txBody>
+      </p:sp>
+      <p:sp>
+        <p:nvSpPr>
+          <p:cNvPr id="2" name="Titre 1"/>
+          <p:cNvSpPr>
+            <a:spLocks noGrp="1"/>
+          </p:cNvSpPr>
+          <p:nvPr>
+            <p:ph type="title"/>
+          </p:nvPr>
+        </p:nvSpPr>
+        <p:spPr/>
+        <p:txBody>
+          <a:bodyPr>
+            <a:noAutofit/>
+          </a:bodyPr>
+          <a:lstStyle/>
+          <a:p>
+            <a:r>
+              <a:rPr lang="fr-FR" b="1" dirty="0"/>
+              <a:t>HTML et JavaScript (3/3)</a:t>
+            </a:r>
+          </a:p>
+        </p:txBody>
+      </p:sp>
+      <p:sp>
+        <p:nvSpPr>
+          <p:cNvPr id="4" name="Espace réservé de la date 3"/>
+          <p:cNvSpPr>
+            <a:spLocks noGrp="1"/>
+          </p:cNvSpPr>
+          <p:nvPr>
+            <p:ph type="dt" sz="half" idx="10"/>
+          </p:nvPr>
+        </p:nvSpPr>
+        <p:spPr/>
+        <p:txBody>
+          <a:bodyPr/>
+          <a:lstStyle/>
+          <a:p>
+            <a:fld id="{BB2FA04C-1355-4CE6-8050-4BD994E23BD5}" type="datetime4">
+              <a:rPr lang="fr-FR" smtClean="0"/>
+              <a:t>12 juin 2019</a:t>
+            </a:fld>
+            <a:endParaRPr lang="fr-FR" dirty="0"/>
+          </a:p>
+        </p:txBody>
+      </p:sp>
+      <p:sp>
+        <p:nvSpPr>
+          <p:cNvPr id="5" name="Espace réservé du pied de page 4"/>
+          <p:cNvSpPr>
+            <a:spLocks noGrp="1"/>
+          </p:cNvSpPr>
+          <p:nvPr>
+            <p:ph type="ftr" sz="quarter" idx="11"/>
+          </p:nvPr>
+        </p:nvSpPr>
+        <p:spPr/>
+        <p:txBody>
+          <a:bodyPr/>
+          <a:lstStyle/>
+          <a:p>
+            <a:r>
+              <a:rPr lang="fr-FR"/>
+              <a:t>DIU NSI</a:t>
+            </a:r>
+          </a:p>
+        </p:txBody>
+      </p:sp>
+      <p:sp>
+        <p:nvSpPr>
+          <p:cNvPr id="6" name="Espace réservé du numéro de diapositive 5"/>
+          <p:cNvSpPr>
+            <a:spLocks noGrp="1"/>
+          </p:cNvSpPr>
+          <p:nvPr>
+            <p:ph type="sldNum" sz="quarter" idx="12"/>
+          </p:nvPr>
+        </p:nvSpPr>
+        <p:spPr/>
+        <p:txBody>
+          <a:bodyPr/>
+          <a:lstStyle/>
+          <a:p>
+            <a:fld id="{DCE37727-CC04-7A46-938D-2CCFF056F773}" type="slidenum">
+              <a:rPr lang="fr-FR" smtClean="0"/>
+              <a:pPr/>
+              <a:t>11</a:t>
             </a:fld>
             <a:endParaRPr lang="fr-FR"/>
           </a:p>
@@ -6564,649 +7431,6 @@
     <p:extLst>
       <p:ext uri="{BB962C8B-B14F-4D97-AF65-F5344CB8AC3E}">
         <p14:creationId xmlns:p14="http://schemas.microsoft.com/office/powerpoint/2010/main" val="1858990063"/>
-      </p:ext>
-    </p:extLst>
-  </p:cSld>
-  <p:clrMapOvr>
-    <a:masterClrMapping/>
-  </p:clrMapOvr>
-</p:sld>
-</file>
-
-<file path=ppt/slides/slide11.xml><?xml version="1.0" encoding="utf-8"?>
-<p:sld xmlns:a="http://schemas.openxmlformats.org/drawingml/2006/main" xmlns:r="http://schemas.openxmlformats.org/officeDocument/2006/relationships" xmlns:p="http://schemas.openxmlformats.org/presentationml/2006/main">
-  <p:cSld>
-    <p:spTree>
-      <p:nvGrpSpPr>
-        <p:cNvPr id="1" name=""/>
-        <p:cNvGrpSpPr/>
-        <p:nvPr/>
-      </p:nvGrpSpPr>
-      <p:grpSpPr>
-        <a:xfrm>
-          <a:off x="0" y="0"/>
-          <a:ext cx="0" cy="0"/>
-          <a:chOff x="0" y="0"/>
-          <a:chExt cx="0" cy="0"/>
-        </a:xfrm>
-      </p:grpSpPr>
-      <p:sp>
-        <p:nvSpPr>
-          <p:cNvPr id="2" name="Titre 1"/>
-          <p:cNvSpPr>
-            <a:spLocks noGrp="1"/>
-          </p:cNvSpPr>
-          <p:nvPr>
-            <p:ph type="title"/>
-          </p:nvPr>
-        </p:nvSpPr>
-        <p:spPr/>
-        <p:txBody>
-          <a:bodyPr>
-            <a:normAutofit/>
-          </a:bodyPr>
-          <a:lstStyle/>
-          <a:p>
-            <a:r>
-              <a:rPr lang="fr-FR" b="1" dirty="0"/>
-              <a:t>DOM </a:t>
-            </a:r>
-            <a:r>
-              <a:rPr lang="fr-FR" b="1" dirty="0" err="1"/>
-              <a:t>Element</a:t>
-            </a:r>
-            <a:endParaRPr lang="fr-FR" b="1" dirty="0"/>
-          </a:p>
-        </p:txBody>
-      </p:sp>
-      <p:sp>
-        <p:nvSpPr>
-          <p:cNvPr id="3" name="Espace réservé du contenu 2"/>
-          <p:cNvSpPr>
-            <a:spLocks noGrp="1"/>
-          </p:cNvSpPr>
-          <p:nvPr>
-            <p:ph idx="1"/>
-          </p:nvPr>
-        </p:nvSpPr>
-        <p:spPr>
-          <a:xfrm>
-            <a:off x="91440" y="1243278"/>
-            <a:ext cx="9052560" cy="4890030"/>
-          </a:xfrm>
-        </p:spPr>
-        <p:txBody>
-          <a:bodyPr/>
-          <a:lstStyle/>
-          <a:p>
-            <a:pPr marL="400050" indent="-400050"/>
-            <a:r>
-              <a:rPr lang="fr-FR" sz="2400" dirty="0"/>
-              <a:t>Les éléments DOM sont des </a:t>
-            </a:r>
-            <a:r>
-              <a:rPr lang="fr-FR" sz="2400" b="1" dirty="0"/>
-              <a:t>objets</a:t>
-            </a:r>
-            <a:r>
-              <a:rPr lang="fr-FR" sz="2400" dirty="0"/>
-              <a:t> JavaScript (</a:t>
-            </a:r>
-            <a:r>
-              <a:rPr lang="fr-FR" sz="2400" dirty="0">
-                <a:hlinkClick r:id="rId2"/>
-              </a:rPr>
-              <a:t>API</a:t>
-            </a:r>
-            <a:r>
-              <a:rPr lang="fr-FR" sz="2400" dirty="0"/>
-              <a:t>)</a:t>
-            </a:r>
-            <a:endParaRPr lang="fr-FR" sz="2400" b="1" dirty="0">
-              <a:latin typeface="Source Code Pro" panose="020B0509030403020204" pitchFamily="49" charset="0"/>
-              <a:ea typeface="Source Code Pro" panose="020B0509030403020204" pitchFamily="49" charset="0"/>
-            </a:endParaRPr>
-          </a:p>
-          <a:p>
-            <a:pPr marL="400050" indent="-400050">
-              <a:spcBef>
-                <a:spcPts val="1200"/>
-              </a:spcBef>
-            </a:pPr>
-            <a:r>
-              <a:rPr lang="fr-FR" sz="2400" dirty="0"/>
-              <a:t>Pour manipuler un élément DOM, il faut :</a:t>
-            </a:r>
-          </a:p>
-          <a:p>
-            <a:pPr marL="758825" lvl="1" indent="-358775">
-              <a:spcBef>
-                <a:spcPts val="1200"/>
-              </a:spcBef>
-              <a:buFont typeface="+mj-lt"/>
-              <a:buAutoNum type="arabicPeriod"/>
-            </a:pPr>
-            <a:r>
-              <a:rPr lang="fr-FR" sz="2000" dirty="0"/>
-              <a:t>Le trouver dans le DOM </a:t>
-            </a:r>
-            <a:r>
-              <a:rPr lang="fr-FR" sz="2000" dirty="0" err="1"/>
-              <a:t>tree</a:t>
-            </a:r>
-            <a:r>
-              <a:rPr lang="fr-FR" sz="2000" dirty="0"/>
-              <a:t> par :</a:t>
-            </a:r>
-            <a:endParaRPr lang="fr-FR" sz="2000" dirty="0">
-              <a:latin typeface="Source Code Pro" panose="020B0509030403020204" pitchFamily="49" charset="0"/>
-              <a:ea typeface="Source Code Pro" panose="020B0509030403020204" pitchFamily="49" charset="0"/>
-            </a:endParaRPr>
-          </a:p>
-          <a:p>
-            <a:pPr lvl="2"/>
-            <a:r>
-              <a:rPr lang="en-US" sz="1800" dirty="0"/>
-              <a:t>id : </a:t>
-            </a:r>
-            <a:r>
-              <a:rPr lang="fr-FR" sz="1800" dirty="0" err="1">
-                <a:solidFill>
-                  <a:srgbClr val="005CC5"/>
-                </a:solidFill>
-                <a:latin typeface="Source Code Pro" panose="020B0509030403020204"/>
-              </a:rPr>
-              <a:t>getElementById</a:t>
-            </a:r>
-            <a:endParaRPr lang="en-US" sz="1800" dirty="0">
-              <a:solidFill>
-                <a:srgbClr val="005CC5"/>
-              </a:solidFill>
-              <a:latin typeface="Source Code Pro" panose="020B0509030403020204"/>
-            </a:endParaRPr>
-          </a:p>
-          <a:p>
-            <a:pPr lvl="2"/>
-            <a:r>
-              <a:rPr lang="fr-FR" sz="1800" dirty="0"/>
-              <a:t>nom de balise : </a:t>
-            </a:r>
-            <a:r>
-              <a:rPr lang="fr-FR" sz="1800" dirty="0" err="1">
-                <a:solidFill>
-                  <a:srgbClr val="005CC5"/>
-                </a:solidFill>
-                <a:latin typeface="Source Code Pro" panose="020B0509030403020204"/>
-              </a:rPr>
-              <a:t>getElementsByName</a:t>
-            </a:r>
-            <a:endParaRPr lang="fr-FR" sz="1800" dirty="0">
-              <a:solidFill>
-                <a:srgbClr val="005CC5"/>
-              </a:solidFill>
-              <a:latin typeface="Source Code Pro" panose="020B0509030403020204"/>
-            </a:endParaRPr>
-          </a:p>
-          <a:p>
-            <a:pPr lvl="2"/>
-            <a:r>
-              <a:rPr lang="fr-FR" sz="1800" dirty="0"/>
-              <a:t>nom de classe : </a:t>
-            </a:r>
-            <a:r>
-              <a:rPr lang="fr-FR" sz="1800" dirty="0" err="1">
-                <a:solidFill>
-                  <a:srgbClr val="005CC5"/>
-                </a:solidFill>
-                <a:latin typeface="Source Code Pro" panose="020B0509030403020204"/>
-              </a:rPr>
-              <a:t>getElementsByClassName</a:t>
-            </a:r>
-            <a:endParaRPr lang="fr-FR" sz="1800" dirty="0">
-              <a:solidFill>
-                <a:srgbClr val="005CC5"/>
-              </a:solidFill>
-              <a:latin typeface="Source Code Pro" panose="020B0509030403020204"/>
-            </a:endParaRPr>
-          </a:p>
-          <a:p>
-            <a:pPr lvl="2"/>
-            <a:r>
-              <a:rPr lang="fr-FR" sz="1800" dirty="0"/>
-              <a:t>sélecteurs CSS : </a:t>
-            </a:r>
-            <a:r>
-              <a:rPr lang="fr-FR" sz="1800" dirty="0" err="1">
-                <a:solidFill>
-                  <a:srgbClr val="005CC5"/>
-                </a:solidFill>
-                <a:latin typeface="Source Code Pro" panose="020B0509030403020204"/>
-              </a:rPr>
-              <a:t>querySelector</a:t>
-            </a:r>
-            <a:endParaRPr lang="fr-FR" sz="1800" dirty="0">
-              <a:solidFill>
-                <a:srgbClr val="005CC5"/>
-              </a:solidFill>
-              <a:latin typeface="Source Code Pro" panose="020B0509030403020204"/>
-            </a:endParaRPr>
-          </a:p>
-          <a:p>
-            <a:pPr marL="758825" lvl="1" indent="-301625">
-              <a:buFont typeface="+mj-lt"/>
-              <a:buAutoNum type="arabicPeriod"/>
-            </a:pPr>
-            <a:r>
-              <a:rPr lang="fr-FR" sz="2000" dirty="0">
-                <a:latin typeface="+mj-lt"/>
-                <a:ea typeface="Source Code Pro" panose="020B0509030403020204" pitchFamily="49" charset="0"/>
-              </a:rPr>
-              <a:t>Utiliser l’API pour le modifier, créer un nouvel élément, changer son style CSS, etc. </a:t>
-            </a:r>
-          </a:p>
-        </p:txBody>
-      </p:sp>
-      <p:sp>
-        <p:nvSpPr>
-          <p:cNvPr id="4" name="Espace réservé de la date 3"/>
-          <p:cNvSpPr>
-            <a:spLocks noGrp="1"/>
-          </p:cNvSpPr>
-          <p:nvPr>
-            <p:ph type="dt" sz="half" idx="10"/>
-          </p:nvPr>
-        </p:nvSpPr>
-        <p:spPr/>
-        <p:txBody>
-          <a:bodyPr/>
-          <a:lstStyle/>
-          <a:p>
-            <a:fld id="{BB2FA04C-1355-4CE6-8050-4BD994E23BD5}" type="datetime4">
-              <a:rPr lang="fr-FR" smtClean="0"/>
-              <a:t>12 juin 2019</a:t>
-            </a:fld>
-            <a:endParaRPr lang="fr-FR" dirty="0"/>
-          </a:p>
-        </p:txBody>
-      </p:sp>
-      <p:sp>
-        <p:nvSpPr>
-          <p:cNvPr id="5" name="Espace réservé du pied de page 4"/>
-          <p:cNvSpPr>
-            <a:spLocks noGrp="1"/>
-          </p:cNvSpPr>
-          <p:nvPr>
-            <p:ph type="ftr" sz="quarter" idx="11"/>
-          </p:nvPr>
-        </p:nvSpPr>
-        <p:spPr/>
-        <p:txBody>
-          <a:bodyPr/>
-          <a:lstStyle/>
-          <a:p>
-            <a:r>
-              <a:rPr lang="fr-FR"/>
-              <a:t>DIU NSI</a:t>
-            </a:r>
-          </a:p>
-        </p:txBody>
-      </p:sp>
-      <p:sp>
-        <p:nvSpPr>
-          <p:cNvPr id="6" name="Espace réservé du numéro de diapositive 5"/>
-          <p:cNvSpPr>
-            <a:spLocks noGrp="1"/>
-          </p:cNvSpPr>
-          <p:nvPr>
-            <p:ph type="sldNum" sz="quarter" idx="12"/>
-          </p:nvPr>
-        </p:nvSpPr>
-        <p:spPr/>
-        <p:txBody>
-          <a:bodyPr/>
-          <a:lstStyle/>
-          <a:p>
-            <a:fld id="{DCE37727-CC04-7A46-938D-2CCFF056F773}" type="slidenum">
-              <a:rPr lang="fr-FR" smtClean="0"/>
-              <a:pPr/>
-              <a:t>11</a:t>
-            </a:fld>
-            <a:endParaRPr lang="fr-FR"/>
-          </a:p>
-        </p:txBody>
-      </p:sp>
-      <p:sp>
-        <p:nvSpPr>
-          <p:cNvPr id="8" name="Rectangle 7">
-            <a:extLst>
-              <a:ext uri="{FF2B5EF4-FFF2-40B4-BE49-F238E27FC236}">
-                <a16:creationId xmlns:a16="http://schemas.microsoft.com/office/drawing/2014/main" id="{99D6AB73-3556-6845-9EF8-9024C2407A0D}"/>
-              </a:ext>
-            </a:extLst>
-          </p:cNvPr>
-          <p:cNvSpPr/>
-          <p:nvPr/>
-        </p:nvSpPr>
-        <p:spPr>
-          <a:xfrm>
-            <a:off x="1070283" y="4858043"/>
-            <a:ext cx="7003434" cy="1260913"/>
-          </a:xfrm>
-          <a:prstGeom prst="rect">
-            <a:avLst/>
-          </a:prstGeom>
-          <a:solidFill>
-            <a:srgbClr val="FEF6E3"/>
-          </a:solidFill>
-          <a:effectLst>
-            <a:outerShdw blurRad="50800" dist="38100" dir="2700000" algn="tl" rotWithShape="0">
-              <a:prstClr val="black">
-                <a:alpha val="40000"/>
-              </a:prstClr>
-            </a:outerShdw>
-          </a:effectLst>
-        </p:spPr>
-        <p:txBody>
-          <a:bodyPr vert="horz" lIns="91440" tIns="45720" rIns="91440" bIns="45720" rtlCol="0" anchor="ctr">
-            <a:normAutofit/>
-          </a:bodyPr>
-          <a:lstStyle/>
-          <a:p>
-            <a:pPr marL="47625"/>
-            <a:r>
-              <a:rPr lang="fr-FR" altLang="fr-FR" dirty="0">
-                <a:solidFill>
-                  <a:srgbClr val="00B050"/>
-                </a:solidFill>
-                <a:latin typeface="Source Code Pro" panose="020B0509030403020204"/>
-              </a:rPr>
-              <a:t>let</a:t>
-            </a:r>
-            <a:r>
-              <a:rPr lang="fr-FR" altLang="fr-FR" dirty="0">
-                <a:latin typeface="Source Code Pro" panose="020B0509030403020204" pitchFamily="49" charset="0"/>
-                <a:ea typeface="Source Code Pro" panose="020B0509030403020204" pitchFamily="49" charset="0"/>
-              </a:rPr>
-              <a:t> </a:t>
-            </a:r>
-            <a:r>
-              <a:rPr lang="fr-FR" altLang="fr-FR" dirty="0" err="1">
-                <a:latin typeface="Source Code Pro" panose="020B0509030403020204" pitchFamily="49" charset="0"/>
-                <a:ea typeface="Source Code Pro" panose="020B0509030403020204" pitchFamily="49" charset="0"/>
-              </a:rPr>
-              <a:t>target</a:t>
-            </a:r>
-            <a:r>
-              <a:rPr lang="fr-FR" altLang="fr-FR" dirty="0">
-                <a:latin typeface="Source Code Pro" panose="020B0509030403020204" pitchFamily="49" charset="0"/>
-                <a:ea typeface="Source Code Pro" panose="020B0509030403020204" pitchFamily="49" charset="0"/>
-              </a:rPr>
-              <a:t> = </a:t>
-            </a:r>
-            <a:r>
-              <a:rPr lang="fr-FR" altLang="fr-FR" dirty="0" err="1">
-                <a:latin typeface="Source Code Pro" panose="020B0509030403020204" pitchFamily="49" charset="0"/>
-                <a:ea typeface="Source Code Pro" panose="020B0509030403020204" pitchFamily="49" charset="0"/>
-              </a:rPr>
-              <a:t>document.</a:t>
-            </a:r>
-            <a:r>
-              <a:rPr lang="fr-FR" altLang="fr-FR" dirty="0" err="1">
-                <a:solidFill>
-                  <a:srgbClr val="005CC5"/>
-                </a:solidFill>
-                <a:latin typeface="Source Code Pro" panose="020B0509030403020204"/>
-              </a:rPr>
-              <a:t>getElementById</a:t>
-            </a:r>
-            <a:r>
-              <a:rPr lang="fr-FR" altLang="fr-FR" dirty="0">
-                <a:latin typeface="Source Code Pro" panose="020B0509030403020204" pitchFamily="49" charset="0"/>
-                <a:ea typeface="Source Code Pro" panose="020B0509030403020204" pitchFamily="49" charset="0"/>
-              </a:rPr>
-              <a:t>(</a:t>
-            </a:r>
-            <a:r>
-              <a:rPr lang="fr-FR" altLang="fr-FR" dirty="0">
-                <a:solidFill>
-                  <a:srgbClr val="657B83"/>
-                </a:solidFill>
-                <a:latin typeface="Source Code Pro" panose="020B0509030403020204" pitchFamily="49" charset="0"/>
-                <a:ea typeface="Source Code Pro" panose="020B0509030403020204" pitchFamily="49" charset="0"/>
-              </a:rPr>
-              <a:t>"</a:t>
-            </a:r>
-            <a:r>
-              <a:rPr lang="fr-FR" altLang="fr-FR" dirty="0" err="1">
-                <a:solidFill>
-                  <a:srgbClr val="657B83"/>
-                </a:solidFill>
-                <a:latin typeface="Source Code Pro" panose="020B0509030403020204" pitchFamily="49" charset="0"/>
-                <a:ea typeface="Source Code Pro" panose="020B0509030403020204" pitchFamily="49" charset="0"/>
-              </a:rPr>
-              <a:t>monId</a:t>
-            </a:r>
-            <a:r>
-              <a:rPr lang="fr-FR" altLang="fr-FR" dirty="0">
-                <a:solidFill>
-                  <a:srgbClr val="657B83"/>
-                </a:solidFill>
-                <a:latin typeface="Source Code Pro" panose="020B0509030403020204" pitchFamily="49" charset="0"/>
-                <a:ea typeface="Source Code Pro" panose="020B0509030403020204" pitchFamily="49" charset="0"/>
-              </a:rPr>
-              <a:t>"</a:t>
-            </a:r>
-            <a:r>
-              <a:rPr lang="fr-FR" altLang="fr-FR" dirty="0">
-                <a:latin typeface="Source Code Pro" panose="020B0509030403020204" pitchFamily="49" charset="0"/>
-                <a:ea typeface="Source Code Pro" panose="020B0509030403020204" pitchFamily="49" charset="0"/>
-              </a:rPr>
-              <a:t>); </a:t>
-            </a:r>
-          </a:p>
-          <a:p>
-            <a:pPr marL="47625"/>
-            <a:r>
-              <a:rPr lang="fr-FR" altLang="fr-FR" dirty="0">
-                <a:solidFill>
-                  <a:srgbClr val="00B050"/>
-                </a:solidFill>
-                <a:latin typeface="Source Code Pro" panose="020B0509030403020204"/>
-              </a:rPr>
-              <a:t>let</a:t>
-            </a:r>
-            <a:r>
-              <a:rPr lang="fr-FR" altLang="fr-FR" dirty="0">
-                <a:latin typeface="Source Code Pro" panose="020B0509030403020204" pitchFamily="49" charset="0"/>
-                <a:ea typeface="Source Code Pro" panose="020B0509030403020204" pitchFamily="49" charset="0"/>
-              </a:rPr>
-              <a:t> </a:t>
-            </a:r>
-            <a:r>
-              <a:rPr lang="fr-FR" altLang="fr-FR" dirty="0" err="1">
-                <a:latin typeface="Source Code Pro" panose="020B0509030403020204" pitchFamily="49" charset="0"/>
-                <a:ea typeface="Source Code Pro" panose="020B0509030403020204" pitchFamily="49" charset="0"/>
-              </a:rPr>
-              <a:t>img</a:t>
-            </a:r>
-            <a:r>
-              <a:rPr lang="fr-FR" altLang="fr-FR" dirty="0">
-                <a:latin typeface="Source Code Pro" panose="020B0509030403020204" pitchFamily="49" charset="0"/>
-                <a:ea typeface="Source Code Pro" panose="020B0509030403020204" pitchFamily="49" charset="0"/>
-              </a:rPr>
-              <a:t> = </a:t>
-            </a:r>
-            <a:r>
-              <a:rPr lang="fr-FR" altLang="fr-FR" dirty="0" err="1">
-                <a:latin typeface="Source Code Pro" panose="020B0509030403020204" pitchFamily="49" charset="0"/>
-                <a:ea typeface="Source Code Pro" panose="020B0509030403020204" pitchFamily="49" charset="0"/>
-              </a:rPr>
-              <a:t>document.</a:t>
-            </a:r>
-            <a:r>
-              <a:rPr lang="fr-FR" altLang="fr-FR" dirty="0" err="1">
-                <a:solidFill>
-                  <a:srgbClr val="005CC5"/>
-                </a:solidFill>
-                <a:latin typeface="Source Code Pro" panose="020B0509030403020204"/>
-              </a:rPr>
-              <a:t>createElement</a:t>
-            </a:r>
-            <a:r>
-              <a:rPr lang="fr-FR" altLang="fr-FR" dirty="0">
-                <a:latin typeface="Source Code Pro" panose="020B0509030403020204" pitchFamily="49" charset="0"/>
-                <a:ea typeface="Source Code Pro" panose="020B0509030403020204" pitchFamily="49" charset="0"/>
-              </a:rPr>
-              <a:t>(</a:t>
-            </a:r>
-            <a:r>
-              <a:rPr lang="fr-FR" altLang="fr-FR" dirty="0">
-                <a:solidFill>
-                  <a:srgbClr val="657B83"/>
-                </a:solidFill>
-                <a:latin typeface="Source Code Pro" panose="020B0509030403020204" pitchFamily="49" charset="0"/>
-                <a:ea typeface="Source Code Pro" panose="020B0509030403020204" pitchFamily="49" charset="0"/>
-              </a:rPr>
-              <a:t>'</a:t>
-            </a:r>
-            <a:r>
-              <a:rPr lang="fr-FR" altLang="fr-FR" dirty="0" err="1">
-                <a:solidFill>
-                  <a:srgbClr val="657B83"/>
-                </a:solidFill>
-                <a:latin typeface="Source Code Pro" panose="020B0509030403020204" pitchFamily="49" charset="0"/>
-                <a:ea typeface="Source Code Pro" panose="020B0509030403020204" pitchFamily="49" charset="0"/>
-              </a:rPr>
-              <a:t>img</a:t>
-            </a:r>
-            <a:r>
-              <a:rPr lang="fr-FR" altLang="fr-FR" dirty="0">
-                <a:solidFill>
-                  <a:srgbClr val="657B83"/>
-                </a:solidFill>
-                <a:latin typeface="Source Code Pro" panose="020B0509030403020204" pitchFamily="49" charset="0"/>
-                <a:ea typeface="Source Code Pro" panose="020B0509030403020204" pitchFamily="49" charset="0"/>
-              </a:rPr>
-              <a:t>'</a:t>
-            </a:r>
-            <a:r>
-              <a:rPr lang="fr-FR" altLang="fr-FR" dirty="0">
-                <a:latin typeface="Source Code Pro" panose="020B0509030403020204" pitchFamily="49" charset="0"/>
-                <a:ea typeface="Source Code Pro" panose="020B0509030403020204" pitchFamily="49" charset="0"/>
-              </a:rPr>
-              <a:t>); </a:t>
-            </a:r>
-          </a:p>
-          <a:p>
-            <a:pPr marL="47625"/>
-            <a:r>
-              <a:rPr lang="fr-FR" altLang="fr-FR" dirty="0" err="1">
-                <a:latin typeface="Source Code Pro" panose="020B0509030403020204" pitchFamily="49" charset="0"/>
-                <a:ea typeface="Source Code Pro" panose="020B0509030403020204" pitchFamily="49" charset="0"/>
-              </a:rPr>
-              <a:t>img.src</a:t>
-            </a:r>
-            <a:r>
-              <a:rPr lang="fr-FR" altLang="fr-FR" dirty="0">
-                <a:latin typeface="Source Code Pro" panose="020B0509030403020204" pitchFamily="49" charset="0"/>
-                <a:ea typeface="Source Code Pro" panose="020B0509030403020204" pitchFamily="49" charset="0"/>
-              </a:rPr>
-              <a:t> =</a:t>
-            </a:r>
-            <a:r>
-              <a:rPr lang="fr-FR" altLang="fr-FR" dirty="0">
-                <a:solidFill>
-                  <a:srgbClr val="657B83"/>
-                </a:solidFill>
-                <a:latin typeface="Source Code Pro" panose="020B0509030403020204" pitchFamily="49" charset="0"/>
-                <a:ea typeface="Source Code Pro" panose="020B0509030403020204" pitchFamily="49" charset="0"/>
-              </a:rPr>
-              <a:t> './</a:t>
-            </a:r>
-            <a:r>
-              <a:rPr lang="fr-FR" altLang="fr-FR" dirty="0" err="1">
-                <a:solidFill>
-                  <a:srgbClr val="657B83"/>
-                </a:solidFill>
-                <a:latin typeface="Source Code Pro" panose="020B0509030403020204" pitchFamily="49" charset="0"/>
-                <a:ea typeface="Source Code Pro" panose="020B0509030403020204" pitchFamily="49" charset="0"/>
-              </a:rPr>
-              <a:t>img</a:t>
-            </a:r>
-            <a:r>
-              <a:rPr lang="fr-FR" altLang="fr-FR" dirty="0">
-                <a:solidFill>
-                  <a:srgbClr val="657B83"/>
-                </a:solidFill>
-                <a:latin typeface="Source Code Pro" panose="020B0509030403020204" pitchFamily="49" charset="0"/>
-                <a:ea typeface="Source Code Pro" panose="020B0509030403020204" pitchFamily="49" charset="0"/>
-              </a:rPr>
-              <a:t>/02.BMP'</a:t>
-            </a:r>
-            <a:r>
-              <a:rPr lang="fr-FR" altLang="fr-FR" dirty="0">
-                <a:latin typeface="Source Code Pro" panose="020B0509030403020204" pitchFamily="49" charset="0"/>
-                <a:ea typeface="Source Code Pro" panose="020B0509030403020204" pitchFamily="49" charset="0"/>
-              </a:rPr>
-              <a:t>;</a:t>
-            </a:r>
-            <a:r>
-              <a:rPr lang="fr-FR" altLang="fr-FR" dirty="0">
-                <a:solidFill>
-                  <a:srgbClr val="657B83"/>
-                </a:solidFill>
-                <a:latin typeface="Source Code Pro" panose="020B0509030403020204" pitchFamily="49" charset="0"/>
-                <a:ea typeface="Source Code Pro" panose="020B0509030403020204" pitchFamily="49" charset="0"/>
-              </a:rPr>
-              <a:t> </a:t>
-            </a:r>
-          </a:p>
-          <a:p>
-            <a:pPr marL="47625"/>
-            <a:r>
-              <a:rPr lang="fr-FR" altLang="fr-FR" dirty="0" err="1">
-                <a:latin typeface="Source Code Pro" panose="020B0509030403020204" pitchFamily="49" charset="0"/>
-                <a:ea typeface="Source Code Pro" panose="020B0509030403020204" pitchFamily="49" charset="0"/>
-              </a:rPr>
-              <a:t>target.</a:t>
-            </a:r>
-            <a:r>
-              <a:rPr lang="fr-FR" altLang="fr-FR" dirty="0" err="1">
-                <a:solidFill>
-                  <a:srgbClr val="005CC5"/>
-                </a:solidFill>
-                <a:latin typeface="Source Code Pro" panose="020B0509030403020204"/>
-              </a:rPr>
-              <a:t>appendChild</a:t>
-            </a:r>
-            <a:r>
-              <a:rPr lang="fr-FR" altLang="fr-FR" dirty="0">
-                <a:latin typeface="Source Code Pro" panose="020B0509030403020204" pitchFamily="49" charset="0"/>
-                <a:ea typeface="Source Code Pro" panose="020B0509030403020204" pitchFamily="49" charset="0"/>
-              </a:rPr>
-              <a:t>(</a:t>
-            </a:r>
-            <a:r>
-              <a:rPr lang="fr-FR" altLang="fr-FR" dirty="0" err="1">
-                <a:latin typeface="Source Code Pro" panose="020B0509030403020204" pitchFamily="49" charset="0"/>
-                <a:ea typeface="Source Code Pro" panose="020B0509030403020204" pitchFamily="49" charset="0"/>
-              </a:rPr>
-              <a:t>img</a:t>
-            </a:r>
-            <a:r>
-              <a:rPr lang="fr-FR" altLang="fr-FR" dirty="0">
-                <a:latin typeface="Source Code Pro" panose="020B0509030403020204" pitchFamily="49" charset="0"/>
-                <a:ea typeface="Source Code Pro" panose="020B0509030403020204" pitchFamily="49" charset="0"/>
-              </a:rPr>
-              <a:t>); </a:t>
-            </a:r>
-          </a:p>
-        </p:txBody>
-      </p:sp>
-    </p:spTree>
-    <p:extLst>
-      <p:ext uri="{BB962C8B-B14F-4D97-AF65-F5344CB8AC3E}">
-        <p14:creationId xmlns:p14="http://schemas.microsoft.com/office/powerpoint/2010/main" val="3306125387"/>
       </p:ext>
     </p:extLst>
   </p:cSld>
@@ -7252,6 +7476,649 @@
           <a:p>
             <a:r>
               <a:rPr lang="fr-FR" b="1" dirty="0"/>
+              <a:t>DOM </a:t>
+            </a:r>
+            <a:r>
+              <a:rPr lang="fr-FR" b="1" dirty="0" err="1"/>
+              <a:t>Element</a:t>
+            </a:r>
+            <a:endParaRPr lang="fr-FR" b="1" dirty="0"/>
+          </a:p>
+        </p:txBody>
+      </p:sp>
+      <p:sp>
+        <p:nvSpPr>
+          <p:cNvPr id="3" name="Espace réservé du contenu 2"/>
+          <p:cNvSpPr>
+            <a:spLocks noGrp="1"/>
+          </p:cNvSpPr>
+          <p:nvPr>
+            <p:ph idx="1"/>
+          </p:nvPr>
+        </p:nvSpPr>
+        <p:spPr>
+          <a:xfrm>
+            <a:off x="91440" y="1243278"/>
+            <a:ext cx="9052560" cy="4890030"/>
+          </a:xfrm>
+        </p:spPr>
+        <p:txBody>
+          <a:bodyPr/>
+          <a:lstStyle/>
+          <a:p>
+            <a:pPr marL="400050" indent="-400050"/>
+            <a:r>
+              <a:rPr lang="fr-FR" sz="2400" dirty="0"/>
+              <a:t>Les éléments DOM sont des </a:t>
+            </a:r>
+            <a:r>
+              <a:rPr lang="fr-FR" sz="2400" b="1" dirty="0"/>
+              <a:t>objets</a:t>
+            </a:r>
+            <a:r>
+              <a:rPr lang="fr-FR" sz="2400" dirty="0"/>
+              <a:t> JavaScript (</a:t>
+            </a:r>
+            <a:r>
+              <a:rPr lang="fr-FR" sz="2400" dirty="0">
+                <a:hlinkClick r:id="rId2"/>
+              </a:rPr>
+              <a:t>API</a:t>
+            </a:r>
+            <a:r>
+              <a:rPr lang="fr-FR" sz="2400" dirty="0"/>
+              <a:t>)</a:t>
+            </a:r>
+            <a:endParaRPr lang="fr-FR" sz="2400" b="1" dirty="0">
+              <a:latin typeface="Source Code Pro" panose="020B0509030403020204" pitchFamily="49" charset="0"/>
+              <a:ea typeface="Source Code Pro" panose="020B0509030403020204" pitchFamily="49" charset="0"/>
+            </a:endParaRPr>
+          </a:p>
+          <a:p>
+            <a:pPr marL="400050" indent="-400050">
+              <a:spcBef>
+                <a:spcPts val="1200"/>
+              </a:spcBef>
+            </a:pPr>
+            <a:r>
+              <a:rPr lang="fr-FR" sz="2400" dirty="0"/>
+              <a:t>Pour manipuler un élément DOM, il faut :</a:t>
+            </a:r>
+          </a:p>
+          <a:p>
+            <a:pPr marL="758825" lvl="1" indent="-358775">
+              <a:spcBef>
+                <a:spcPts val="1200"/>
+              </a:spcBef>
+              <a:buFont typeface="+mj-lt"/>
+              <a:buAutoNum type="arabicPeriod"/>
+            </a:pPr>
+            <a:r>
+              <a:rPr lang="fr-FR" sz="2000" dirty="0"/>
+              <a:t>Le trouver dans le DOM </a:t>
+            </a:r>
+            <a:r>
+              <a:rPr lang="fr-FR" sz="2000" dirty="0" err="1"/>
+              <a:t>tree</a:t>
+            </a:r>
+            <a:r>
+              <a:rPr lang="fr-FR" sz="2000" dirty="0"/>
+              <a:t> par :</a:t>
+            </a:r>
+            <a:endParaRPr lang="fr-FR" sz="2000" dirty="0">
+              <a:latin typeface="Source Code Pro" panose="020B0509030403020204" pitchFamily="49" charset="0"/>
+              <a:ea typeface="Source Code Pro" panose="020B0509030403020204" pitchFamily="49" charset="0"/>
+            </a:endParaRPr>
+          </a:p>
+          <a:p>
+            <a:pPr lvl="2"/>
+            <a:r>
+              <a:rPr lang="en-US" sz="1800" dirty="0"/>
+              <a:t>id : </a:t>
+            </a:r>
+            <a:r>
+              <a:rPr lang="fr-FR" sz="1800" dirty="0" err="1">
+                <a:solidFill>
+                  <a:srgbClr val="005CC5"/>
+                </a:solidFill>
+                <a:latin typeface="Source Code Pro" panose="020B0509030403020204"/>
+              </a:rPr>
+              <a:t>getElementById</a:t>
+            </a:r>
+            <a:endParaRPr lang="en-US" sz="1800" dirty="0">
+              <a:solidFill>
+                <a:srgbClr val="005CC5"/>
+              </a:solidFill>
+              <a:latin typeface="Source Code Pro" panose="020B0509030403020204"/>
+            </a:endParaRPr>
+          </a:p>
+          <a:p>
+            <a:pPr lvl="2"/>
+            <a:r>
+              <a:rPr lang="fr-FR" sz="1800" dirty="0"/>
+              <a:t>nom de balise : </a:t>
+            </a:r>
+            <a:r>
+              <a:rPr lang="fr-FR" sz="1800" dirty="0" err="1">
+                <a:solidFill>
+                  <a:srgbClr val="005CC5"/>
+                </a:solidFill>
+                <a:latin typeface="Source Code Pro" panose="020B0509030403020204"/>
+              </a:rPr>
+              <a:t>getElementsByName</a:t>
+            </a:r>
+            <a:endParaRPr lang="fr-FR" sz="1800" dirty="0">
+              <a:solidFill>
+                <a:srgbClr val="005CC5"/>
+              </a:solidFill>
+              <a:latin typeface="Source Code Pro" panose="020B0509030403020204"/>
+            </a:endParaRPr>
+          </a:p>
+          <a:p>
+            <a:pPr lvl="2"/>
+            <a:r>
+              <a:rPr lang="fr-FR" sz="1800" dirty="0"/>
+              <a:t>nom de classe : </a:t>
+            </a:r>
+            <a:r>
+              <a:rPr lang="fr-FR" sz="1800" dirty="0" err="1">
+                <a:solidFill>
+                  <a:srgbClr val="005CC5"/>
+                </a:solidFill>
+                <a:latin typeface="Source Code Pro" panose="020B0509030403020204"/>
+              </a:rPr>
+              <a:t>getElementsByClassName</a:t>
+            </a:r>
+            <a:endParaRPr lang="fr-FR" sz="1800" dirty="0">
+              <a:solidFill>
+                <a:srgbClr val="005CC5"/>
+              </a:solidFill>
+              <a:latin typeface="Source Code Pro" panose="020B0509030403020204"/>
+            </a:endParaRPr>
+          </a:p>
+          <a:p>
+            <a:pPr lvl="2"/>
+            <a:r>
+              <a:rPr lang="fr-FR" sz="1800" dirty="0"/>
+              <a:t>sélecteurs CSS : </a:t>
+            </a:r>
+            <a:r>
+              <a:rPr lang="fr-FR" sz="1800" dirty="0" err="1">
+                <a:solidFill>
+                  <a:srgbClr val="005CC5"/>
+                </a:solidFill>
+                <a:latin typeface="Source Code Pro" panose="020B0509030403020204"/>
+              </a:rPr>
+              <a:t>querySelector</a:t>
+            </a:r>
+            <a:endParaRPr lang="fr-FR" sz="1800" dirty="0">
+              <a:solidFill>
+                <a:srgbClr val="005CC5"/>
+              </a:solidFill>
+              <a:latin typeface="Source Code Pro" panose="020B0509030403020204"/>
+            </a:endParaRPr>
+          </a:p>
+          <a:p>
+            <a:pPr marL="758825" lvl="1" indent="-301625">
+              <a:buFont typeface="+mj-lt"/>
+              <a:buAutoNum type="arabicPeriod"/>
+            </a:pPr>
+            <a:r>
+              <a:rPr lang="fr-FR" sz="2000" dirty="0">
+                <a:latin typeface="+mj-lt"/>
+                <a:ea typeface="Source Code Pro" panose="020B0509030403020204" pitchFamily="49" charset="0"/>
+              </a:rPr>
+              <a:t>Utiliser l’API pour le modifier, créer un nouvel élément, changer son style CSS, etc. </a:t>
+            </a:r>
+          </a:p>
+        </p:txBody>
+      </p:sp>
+      <p:sp>
+        <p:nvSpPr>
+          <p:cNvPr id="4" name="Espace réservé de la date 3"/>
+          <p:cNvSpPr>
+            <a:spLocks noGrp="1"/>
+          </p:cNvSpPr>
+          <p:nvPr>
+            <p:ph type="dt" sz="half" idx="10"/>
+          </p:nvPr>
+        </p:nvSpPr>
+        <p:spPr/>
+        <p:txBody>
+          <a:bodyPr/>
+          <a:lstStyle/>
+          <a:p>
+            <a:fld id="{BB2FA04C-1355-4CE6-8050-4BD994E23BD5}" type="datetime4">
+              <a:rPr lang="fr-FR" smtClean="0"/>
+              <a:t>12 juin 2019</a:t>
+            </a:fld>
+            <a:endParaRPr lang="fr-FR" dirty="0"/>
+          </a:p>
+        </p:txBody>
+      </p:sp>
+      <p:sp>
+        <p:nvSpPr>
+          <p:cNvPr id="5" name="Espace réservé du pied de page 4"/>
+          <p:cNvSpPr>
+            <a:spLocks noGrp="1"/>
+          </p:cNvSpPr>
+          <p:nvPr>
+            <p:ph type="ftr" sz="quarter" idx="11"/>
+          </p:nvPr>
+        </p:nvSpPr>
+        <p:spPr/>
+        <p:txBody>
+          <a:bodyPr/>
+          <a:lstStyle/>
+          <a:p>
+            <a:r>
+              <a:rPr lang="fr-FR"/>
+              <a:t>DIU NSI</a:t>
+            </a:r>
+          </a:p>
+        </p:txBody>
+      </p:sp>
+      <p:sp>
+        <p:nvSpPr>
+          <p:cNvPr id="6" name="Espace réservé du numéro de diapositive 5"/>
+          <p:cNvSpPr>
+            <a:spLocks noGrp="1"/>
+          </p:cNvSpPr>
+          <p:nvPr>
+            <p:ph type="sldNum" sz="quarter" idx="12"/>
+          </p:nvPr>
+        </p:nvSpPr>
+        <p:spPr/>
+        <p:txBody>
+          <a:bodyPr/>
+          <a:lstStyle/>
+          <a:p>
+            <a:fld id="{DCE37727-CC04-7A46-938D-2CCFF056F773}" type="slidenum">
+              <a:rPr lang="fr-FR" smtClean="0"/>
+              <a:pPr/>
+              <a:t>12</a:t>
+            </a:fld>
+            <a:endParaRPr lang="fr-FR"/>
+          </a:p>
+        </p:txBody>
+      </p:sp>
+      <p:sp>
+        <p:nvSpPr>
+          <p:cNvPr id="8" name="Rectangle 7">
+            <a:extLst>
+              <a:ext uri="{FF2B5EF4-FFF2-40B4-BE49-F238E27FC236}">
+                <a16:creationId xmlns:a16="http://schemas.microsoft.com/office/drawing/2014/main" id="{99D6AB73-3556-6845-9EF8-9024C2407A0D}"/>
+              </a:ext>
+            </a:extLst>
+          </p:cNvPr>
+          <p:cNvSpPr/>
+          <p:nvPr/>
+        </p:nvSpPr>
+        <p:spPr>
+          <a:xfrm>
+            <a:off x="1070283" y="4858043"/>
+            <a:ext cx="7003434" cy="1260913"/>
+          </a:xfrm>
+          <a:prstGeom prst="rect">
+            <a:avLst/>
+          </a:prstGeom>
+          <a:solidFill>
+            <a:srgbClr val="FEF6E3"/>
+          </a:solidFill>
+          <a:effectLst>
+            <a:outerShdw blurRad="50800" dist="38100" dir="2700000" algn="tl" rotWithShape="0">
+              <a:prstClr val="black">
+                <a:alpha val="40000"/>
+              </a:prstClr>
+            </a:outerShdw>
+          </a:effectLst>
+        </p:spPr>
+        <p:txBody>
+          <a:bodyPr vert="horz" lIns="91440" tIns="45720" rIns="91440" bIns="45720" rtlCol="0" anchor="ctr">
+            <a:normAutofit/>
+          </a:bodyPr>
+          <a:lstStyle/>
+          <a:p>
+            <a:pPr marL="47625"/>
+            <a:r>
+              <a:rPr lang="fr-FR" altLang="fr-FR" dirty="0">
+                <a:solidFill>
+                  <a:srgbClr val="00B050"/>
+                </a:solidFill>
+                <a:latin typeface="Source Code Pro" panose="020B0509030403020204"/>
+              </a:rPr>
+              <a:t>let</a:t>
+            </a:r>
+            <a:r>
+              <a:rPr lang="fr-FR" altLang="fr-FR" dirty="0">
+                <a:latin typeface="Source Code Pro" panose="020B0509030403020204" pitchFamily="49" charset="0"/>
+                <a:ea typeface="Source Code Pro" panose="020B0509030403020204" pitchFamily="49" charset="0"/>
+              </a:rPr>
+              <a:t> </a:t>
+            </a:r>
+            <a:r>
+              <a:rPr lang="fr-FR" altLang="fr-FR" dirty="0" err="1">
+                <a:latin typeface="Source Code Pro" panose="020B0509030403020204" pitchFamily="49" charset="0"/>
+                <a:ea typeface="Source Code Pro" panose="020B0509030403020204" pitchFamily="49" charset="0"/>
+              </a:rPr>
+              <a:t>target</a:t>
+            </a:r>
+            <a:r>
+              <a:rPr lang="fr-FR" altLang="fr-FR" dirty="0">
+                <a:latin typeface="Source Code Pro" panose="020B0509030403020204" pitchFamily="49" charset="0"/>
+                <a:ea typeface="Source Code Pro" panose="020B0509030403020204" pitchFamily="49" charset="0"/>
+              </a:rPr>
+              <a:t> = </a:t>
+            </a:r>
+            <a:r>
+              <a:rPr lang="fr-FR" altLang="fr-FR" dirty="0" err="1">
+                <a:latin typeface="Source Code Pro" panose="020B0509030403020204" pitchFamily="49" charset="0"/>
+                <a:ea typeface="Source Code Pro" panose="020B0509030403020204" pitchFamily="49" charset="0"/>
+              </a:rPr>
+              <a:t>document.</a:t>
+            </a:r>
+            <a:r>
+              <a:rPr lang="fr-FR" altLang="fr-FR" dirty="0" err="1">
+                <a:solidFill>
+                  <a:srgbClr val="005CC5"/>
+                </a:solidFill>
+                <a:latin typeface="Source Code Pro" panose="020B0509030403020204"/>
+              </a:rPr>
+              <a:t>getElementById</a:t>
+            </a:r>
+            <a:r>
+              <a:rPr lang="fr-FR" altLang="fr-FR" dirty="0">
+                <a:latin typeface="Source Code Pro" panose="020B0509030403020204" pitchFamily="49" charset="0"/>
+                <a:ea typeface="Source Code Pro" panose="020B0509030403020204" pitchFamily="49" charset="0"/>
+              </a:rPr>
+              <a:t>(</a:t>
+            </a:r>
+            <a:r>
+              <a:rPr lang="fr-FR" altLang="fr-FR" dirty="0">
+                <a:solidFill>
+                  <a:srgbClr val="657B83"/>
+                </a:solidFill>
+                <a:latin typeface="Source Code Pro" panose="020B0509030403020204" pitchFamily="49" charset="0"/>
+                <a:ea typeface="Source Code Pro" panose="020B0509030403020204" pitchFamily="49" charset="0"/>
+              </a:rPr>
+              <a:t>"</a:t>
+            </a:r>
+            <a:r>
+              <a:rPr lang="fr-FR" altLang="fr-FR" dirty="0" err="1">
+                <a:solidFill>
+                  <a:srgbClr val="657B83"/>
+                </a:solidFill>
+                <a:latin typeface="Source Code Pro" panose="020B0509030403020204" pitchFamily="49" charset="0"/>
+                <a:ea typeface="Source Code Pro" panose="020B0509030403020204" pitchFamily="49" charset="0"/>
+              </a:rPr>
+              <a:t>monId</a:t>
+            </a:r>
+            <a:r>
+              <a:rPr lang="fr-FR" altLang="fr-FR" dirty="0">
+                <a:solidFill>
+                  <a:srgbClr val="657B83"/>
+                </a:solidFill>
+                <a:latin typeface="Source Code Pro" panose="020B0509030403020204" pitchFamily="49" charset="0"/>
+                <a:ea typeface="Source Code Pro" panose="020B0509030403020204" pitchFamily="49" charset="0"/>
+              </a:rPr>
+              <a:t>"</a:t>
+            </a:r>
+            <a:r>
+              <a:rPr lang="fr-FR" altLang="fr-FR" dirty="0">
+                <a:latin typeface="Source Code Pro" panose="020B0509030403020204" pitchFamily="49" charset="0"/>
+                <a:ea typeface="Source Code Pro" panose="020B0509030403020204" pitchFamily="49" charset="0"/>
+              </a:rPr>
+              <a:t>); </a:t>
+            </a:r>
+          </a:p>
+          <a:p>
+            <a:pPr marL="47625"/>
+            <a:r>
+              <a:rPr lang="fr-FR" altLang="fr-FR" dirty="0">
+                <a:solidFill>
+                  <a:srgbClr val="00B050"/>
+                </a:solidFill>
+                <a:latin typeface="Source Code Pro" panose="020B0509030403020204"/>
+              </a:rPr>
+              <a:t>let</a:t>
+            </a:r>
+            <a:r>
+              <a:rPr lang="fr-FR" altLang="fr-FR" dirty="0">
+                <a:latin typeface="Source Code Pro" panose="020B0509030403020204" pitchFamily="49" charset="0"/>
+                <a:ea typeface="Source Code Pro" panose="020B0509030403020204" pitchFamily="49" charset="0"/>
+              </a:rPr>
+              <a:t> </a:t>
+            </a:r>
+            <a:r>
+              <a:rPr lang="fr-FR" altLang="fr-FR" dirty="0" err="1">
+                <a:latin typeface="Source Code Pro" panose="020B0509030403020204" pitchFamily="49" charset="0"/>
+                <a:ea typeface="Source Code Pro" panose="020B0509030403020204" pitchFamily="49" charset="0"/>
+              </a:rPr>
+              <a:t>img</a:t>
+            </a:r>
+            <a:r>
+              <a:rPr lang="fr-FR" altLang="fr-FR" dirty="0">
+                <a:latin typeface="Source Code Pro" panose="020B0509030403020204" pitchFamily="49" charset="0"/>
+                <a:ea typeface="Source Code Pro" panose="020B0509030403020204" pitchFamily="49" charset="0"/>
+              </a:rPr>
+              <a:t> = </a:t>
+            </a:r>
+            <a:r>
+              <a:rPr lang="fr-FR" altLang="fr-FR" dirty="0" err="1">
+                <a:latin typeface="Source Code Pro" panose="020B0509030403020204" pitchFamily="49" charset="0"/>
+                <a:ea typeface="Source Code Pro" panose="020B0509030403020204" pitchFamily="49" charset="0"/>
+              </a:rPr>
+              <a:t>document.</a:t>
+            </a:r>
+            <a:r>
+              <a:rPr lang="fr-FR" altLang="fr-FR" dirty="0" err="1">
+                <a:solidFill>
+                  <a:srgbClr val="005CC5"/>
+                </a:solidFill>
+                <a:latin typeface="Source Code Pro" panose="020B0509030403020204"/>
+              </a:rPr>
+              <a:t>createElement</a:t>
+            </a:r>
+            <a:r>
+              <a:rPr lang="fr-FR" altLang="fr-FR" dirty="0">
+                <a:latin typeface="Source Code Pro" panose="020B0509030403020204" pitchFamily="49" charset="0"/>
+                <a:ea typeface="Source Code Pro" panose="020B0509030403020204" pitchFamily="49" charset="0"/>
+              </a:rPr>
+              <a:t>(</a:t>
+            </a:r>
+            <a:r>
+              <a:rPr lang="fr-FR" altLang="fr-FR" dirty="0">
+                <a:solidFill>
+                  <a:srgbClr val="657B83"/>
+                </a:solidFill>
+                <a:latin typeface="Source Code Pro" panose="020B0509030403020204" pitchFamily="49" charset="0"/>
+                <a:ea typeface="Source Code Pro" panose="020B0509030403020204" pitchFamily="49" charset="0"/>
+              </a:rPr>
+              <a:t>'</a:t>
+            </a:r>
+            <a:r>
+              <a:rPr lang="fr-FR" altLang="fr-FR" dirty="0" err="1">
+                <a:solidFill>
+                  <a:srgbClr val="657B83"/>
+                </a:solidFill>
+                <a:latin typeface="Source Code Pro" panose="020B0509030403020204" pitchFamily="49" charset="0"/>
+                <a:ea typeface="Source Code Pro" panose="020B0509030403020204" pitchFamily="49" charset="0"/>
+              </a:rPr>
+              <a:t>img</a:t>
+            </a:r>
+            <a:r>
+              <a:rPr lang="fr-FR" altLang="fr-FR" dirty="0">
+                <a:solidFill>
+                  <a:srgbClr val="657B83"/>
+                </a:solidFill>
+                <a:latin typeface="Source Code Pro" panose="020B0509030403020204" pitchFamily="49" charset="0"/>
+                <a:ea typeface="Source Code Pro" panose="020B0509030403020204" pitchFamily="49" charset="0"/>
+              </a:rPr>
+              <a:t>'</a:t>
+            </a:r>
+            <a:r>
+              <a:rPr lang="fr-FR" altLang="fr-FR" dirty="0">
+                <a:latin typeface="Source Code Pro" panose="020B0509030403020204" pitchFamily="49" charset="0"/>
+                <a:ea typeface="Source Code Pro" panose="020B0509030403020204" pitchFamily="49" charset="0"/>
+              </a:rPr>
+              <a:t>); </a:t>
+            </a:r>
+          </a:p>
+          <a:p>
+            <a:pPr marL="47625"/>
+            <a:r>
+              <a:rPr lang="fr-FR" altLang="fr-FR" dirty="0" err="1">
+                <a:latin typeface="Source Code Pro" panose="020B0509030403020204" pitchFamily="49" charset="0"/>
+                <a:ea typeface="Source Code Pro" panose="020B0509030403020204" pitchFamily="49" charset="0"/>
+              </a:rPr>
+              <a:t>img.src</a:t>
+            </a:r>
+            <a:r>
+              <a:rPr lang="fr-FR" altLang="fr-FR" dirty="0">
+                <a:latin typeface="Source Code Pro" panose="020B0509030403020204" pitchFamily="49" charset="0"/>
+                <a:ea typeface="Source Code Pro" panose="020B0509030403020204" pitchFamily="49" charset="0"/>
+              </a:rPr>
+              <a:t> =</a:t>
+            </a:r>
+            <a:r>
+              <a:rPr lang="fr-FR" altLang="fr-FR" dirty="0">
+                <a:solidFill>
+                  <a:srgbClr val="657B83"/>
+                </a:solidFill>
+                <a:latin typeface="Source Code Pro" panose="020B0509030403020204" pitchFamily="49" charset="0"/>
+                <a:ea typeface="Source Code Pro" panose="020B0509030403020204" pitchFamily="49" charset="0"/>
+              </a:rPr>
+              <a:t> './</a:t>
+            </a:r>
+            <a:r>
+              <a:rPr lang="fr-FR" altLang="fr-FR" dirty="0" err="1">
+                <a:solidFill>
+                  <a:srgbClr val="657B83"/>
+                </a:solidFill>
+                <a:latin typeface="Source Code Pro" panose="020B0509030403020204" pitchFamily="49" charset="0"/>
+                <a:ea typeface="Source Code Pro" panose="020B0509030403020204" pitchFamily="49" charset="0"/>
+              </a:rPr>
+              <a:t>img</a:t>
+            </a:r>
+            <a:r>
+              <a:rPr lang="fr-FR" altLang="fr-FR" dirty="0">
+                <a:solidFill>
+                  <a:srgbClr val="657B83"/>
+                </a:solidFill>
+                <a:latin typeface="Source Code Pro" panose="020B0509030403020204" pitchFamily="49" charset="0"/>
+                <a:ea typeface="Source Code Pro" panose="020B0509030403020204" pitchFamily="49" charset="0"/>
+              </a:rPr>
+              <a:t>/02.BMP'</a:t>
+            </a:r>
+            <a:r>
+              <a:rPr lang="fr-FR" altLang="fr-FR" dirty="0">
+                <a:latin typeface="Source Code Pro" panose="020B0509030403020204" pitchFamily="49" charset="0"/>
+                <a:ea typeface="Source Code Pro" panose="020B0509030403020204" pitchFamily="49" charset="0"/>
+              </a:rPr>
+              <a:t>;</a:t>
+            </a:r>
+            <a:r>
+              <a:rPr lang="fr-FR" altLang="fr-FR" dirty="0">
+                <a:solidFill>
+                  <a:srgbClr val="657B83"/>
+                </a:solidFill>
+                <a:latin typeface="Source Code Pro" panose="020B0509030403020204" pitchFamily="49" charset="0"/>
+                <a:ea typeface="Source Code Pro" panose="020B0509030403020204" pitchFamily="49" charset="0"/>
+              </a:rPr>
+              <a:t> </a:t>
+            </a:r>
+          </a:p>
+          <a:p>
+            <a:pPr marL="47625"/>
+            <a:r>
+              <a:rPr lang="fr-FR" altLang="fr-FR" dirty="0" err="1">
+                <a:latin typeface="Source Code Pro" panose="020B0509030403020204" pitchFamily="49" charset="0"/>
+                <a:ea typeface="Source Code Pro" panose="020B0509030403020204" pitchFamily="49" charset="0"/>
+              </a:rPr>
+              <a:t>target.</a:t>
+            </a:r>
+            <a:r>
+              <a:rPr lang="fr-FR" altLang="fr-FR" dirty="0" err="1">
+                <a:solidFill>
+                  <a:srgbClr val="005CC5"/>
+                </a:solidFill>
+                <a:latin typeface="Source Code Pro" panose="020B0509030403020204"/>
+              </a:rPr>
+              <a:t>appendChild</a:t>
+            </a:r>
+            <a:r>
+              <a:rPr lang="fr-FR" altLang="fr-FR" dirty="0">
+                <a:latin typeface="Source Code Pro" panose="020B0509030403020204" pitchFamily="49" charset="0"/>
+                <a:ea typeface="Source Code Pro" panose="020B0509030403020204" pitchFamily="49" charset="0"/>
+              </a:rPr>
+              <a:t>(</a:t>
+            </a:r>
+            <a:r>
+              <a:rPr lang="fr-FR" altLang="fr-FR" dirty="0" err="1">
+                <a:latin typeface="Source Code Pro" panose="020B0509030403020204" pitchFamily="49" charset="0"/>
+                <a:ea typeface="Source Code Pro" panose="020B0509030403020204" pitchFamily="49" charset="0"/>
+              </a:rPr>
+              <a:t>img</a:t>
+            </a:r>
+            <a:r>
+              <a:rPr lang="fr-FR" altLang="fr-FR" dirty="0">
+                <a:latin typeface="Source Code Pro" panose="020B0509030403020204" pitchFamily="49" charset="0"/>
+                <a:ea typeface="Source Code Pro" panose="020B0509030403020204" pitchFamily="49" charset="0"/>
+              </a:rPr>
+              <a:t>); </a:t>
+            </a:r>
+          </a:p>
+        </p:txBody>
+      </p:sp>
+    </p:spTree>
+    <p:extLst>
+      <p:ext uri="{BB962C8B-B14F-4D97-AF65-F5344CB8AC3E}">
+        <p14:creationId xmlns:p14="http://schemas.microsoft.com/office/powerpoint/2010/main" val="3306125387"/>
+      </p:ext>
+    </p:extLst>
+  </p:cSld>
+  <p:clrMapOvr>
+    <a:masterClrMapping/>
+  </p:clrMapOvr>
+</p:sld>
+</file>
+
+<file path=ppt/slides/slide13.xml><?xml version="1.0" encoding="utf-8"?>
+<p:sld xmlns:a="http://schemas.openxmlformats.org/drawingml/2006/main" xmlns:r="http://schemas.openxmlformats.org/officeDocument/2006/relationships" xmlns:p="http://schemas.openxmlformats.org/presentationml/2006/main">
+  <p:cSld>
+    <p:spTree>
+      <p:nvGrpSpPr>
+        <p:cNvPr id="1" name=""/>
+        <p:cNvGrpSpPr/>
+        <p:nvPr/>
+      </p:nvGrpSpPr>
+      <p:grpSpPr>
+        <a:xfrm>
+          <a:off x="0" y="0"/>
+          <a:ext cx="0" cy="0"/>
+          <a:chOff x="0" y="0"/>
+          <a:chExt cx="0" cy="0"/>
+        </a:xfrm>
+      </p:grpSpPr>
+      <p:sp>
+        <p:nvSpPr>
+          <p:cNvPr id="2" name="Titre 1"/>
+          <p:cNvSpPr>
+            <a:spLocks noGrp="1"/>
+          </p:cNvSpPr>
+          <p:nvPr>
+            <p:ph type="title"/>
+          </p:nvPr>
+        </p:nvSpPr>
+        <p:spPr/>
+        <p:txBody>
+          <a:bodyPr>
+            <a:normAutofit/>
+          </a:bodyPr>
+          <a:lstStyle/>
+          <a:p>
+            <a:r>
+              <a:rPr lang="fr-FR" b="1" dirty="0"/>
               <a:t>DOM Event (1/2)</a:t>
             </a:r>
           </a:p>
@@ -7346,7 +8213,7 @@
             <a:fld id="{DCE37727-CC04-7A46-938D-2CCFF056F773}" type="slidenum">
               <a:rPr lang="fr-FR" smtClean="0"/>
               <a:pPr/>
-              <a:t>12</a:t>
+              <a:t>13</a:t>
             </a:fld>
             <a:endParaRPr lang="fr-FR"/>
           </a:p>
@@ -7718,7 +8585,7 @@
 </p:sld>
 </file>
 
-<file path=ppt/slides/slide13.xml><?xml version="1.0" encoding="utf-8"?>
+<file path=ppt/slides/slide14.xml><?xml version="1.0" encoding="utf-8"?>
 <p:sld xmlns:a="http://schemas.openxmlformats.org/drawingml/2006/main" xmlns:r="http://schemas.openxmlformats.org/officeDocument/2006/relationships" xmlns:p="http://schemas.openxmlformats.org/presentationml/2006/main">
   <p:cSld>
     <p:spTree>
@@ -7848,7 +8715,7 @@
             <a:fld id="{DCE37727-CC04-7A46-938D-2CCFF056F773}" type="slidenum">
               <a:rPr lang="fr-FR" smtClean="0"/>
               <a:pPr/>
-              <a:t>13</a:t>
+              <a:t>14</a:t>
             </a:fld>
             <a:endParaRPr lang="fr-FR"/>
           </a:p>
@@ -8759,7 +9626,7 @@
 </p:sld>
 </file>
 
-<file path=ppt/slides/slide14.xml><?xml version="1.0" encoding="utf-8"?>
+<file path=ppt/slides/slide15.xml><?xml version="1.0" encoding="utf-8"?>
 <p:sld xmlns:a="http://schemas.openxmlformats.org/drawingml/2006/main" xmlns:r="http://schemas.openxmlformats.org/officeDocument/2006/relationships" xmlns:p="http://schemas.openxmlformats.org/presentationml/2006/main">
   <p:cSld>
     <p:spTree>
@@ -8861,7 +9728,7 @@
             <a:fld id="{DCE37727-CC04-7A46-938D-2CCFF056F773}" type="slidenum">
               <a:rPr lang="fr-FR" smtClean="0"/>
               <a:pPr/>
-              <a:t>14</a:t>
+              <a:t>15</a:t>
             </a:fld>
             <a:endParaRPr lang="fr-FR"/>
           </a:p>
@@ -8995,7 +9862,7 @@
 </p:sld>
 </file>
 
-<file path=ppt/slides/slide15.xml><?xml version="1.0" encoding="utf-8"?>
+<file path=ppt/slides/slide16.xml><?xml version="1.0" encoding="utf-8"?>
 <p:sld xmlns:a="http://schemas.openxmlformats.org/drawingml/2006/main" xmlns:r="http://schemas.openxmlformats.org/officeDocument/2006/relationships" xmlns:p="http://schemas.openxmlformats.org/presentationml/2006/main">
   <p:cSld>
     <p:spTree>
@@ -9108,7 +9975,7 @@
             <a:fld id="{DCE37727-CC04-7A46-938D-2CCFF056F773}" type="slidenum">
               <a:rPr lang="fr-FR" smtClean="0"/>
               <a:pPr/>
-              <a:t>15</a:t>
+              <a:t>16</a:t>
             </a:fld>
             <a:endParaRPr lang="fr-FR"/>
           </a:p>
@@ -10006,7 +10873,7 @@
 </p:sld>
 </file>
 
-<file path=ppt/slides/slide16.xml><?xml version="1.0" encoding="utf-8"?>
+<file path=ppt/slides/slide17.xml><?xml version="1.0" encoding="utf-8"?>
 <p:sld xmlns:a="http://schemas.openxmlformats.org/drawingml/2006/main" xmlns:r="http://schemas.openxmlformats.org/officeDocument/2006/relationships" xmlns:p="http://schemas.openxmlformats.org/presentationml/2006/main">
   <p:cSld>
     <p:spTree>
@@ -10117,7 +10984,7 @@
             <a:fld id="{DCE37727-CC04-7A46-938D-2CCFF056F773}" type="slidenum">
               <a:rPr lang="fr-FR" smtClean="0"/>
               <a:pPr/>
-              <a:t>16</a:t>
+              <a:t>17</a:t>
             </a:fld>
             <a:endParaRPr lang="fr-FR"/>
           </a:p>
@@ -12367,7 +13234,7 @@
           <a:p>
             <a:r>
               <a:rPr lang="fr-FR" b="1" dirty="0"/>
-              <a:t>Bases du langage (1/4)</a:t>
+              <a:t>Bases du langage (1/5)</a:t>
             </a:r>
           </a:p>
         </p:txBody>
@@ -12446,7 +13313,7 @@
           <a:p>
             <a:fld id="{BB2FA04C-1355-4CE6-8050-4BD994E23BD5}" type="datetime4">
               <a:rPr lang="fr-FR" smtClean="0"/>
-              <a:t>12 juin 2019</a:t>
+              <a:t>13 juin 2019</a:t>
             </a:fld>
             <a:endParaRPr lang="fr-FR" dirty="0"/>
           </a:p>
@@ -12524,8 +13391,8 @@
         </p:nvSpPr>
         <p:spPr>
           <a:xfrm>
-            <a:off x="1099916" y="2614062"/>
-            <a:ext cx="7003434" cy="2134173"/>
+            <a:off x="749745" y="2614062"/>
+            <a:ext cx="7703777" cy="2134173"/>
           </a:xfrm>
           <a:prstGeom prst="rect">
             <a:avLst/>
@@ -12543,7 +13410,7 @@
         </p:spPr>
         <p:txBody>
           <a:bodyPr vert="horz" lIns="91440" tIns="45720" rIns="91440" bIns="45720" rtlCol="0" anchor="ctr">
-            <a:normAutofit lnSpcReduction="10000"/>
+            <a:normAutofit/>
           </a:bodyPr>
           <a:lstStyle/>
           <a:p>
@@ -12648,7 +13515,7 @@
                 <a:latin typeface="Source Code Pro" panose="020B0509030403020204" pitchFamily="49" charset="0"/>
                 <a:ea typeface="Source Code Pro" panose="020B0509030403020204" pitchFamily="49" charset="0"/>
               </a:rPr>
-              <a:t>'5’</a:t>
+              <a:t>'5'</a:t>
             </a:r>
             <a:r>
               <a:rPr lang="fr-FR" altLang="fr-FR" dirty="0">
@@ -12849,7 +13716,7 @@
           <a:p>
             <a:r>
               <a:rPr lang="fr-FR" b="1" dirty="0"/>
-              <a:t>Bases du langage (2/4)</a:t>
+              <a:t>Bases du langage (2/5)</a:t>
             </a:r>
           </a:p>
         </p:txBody>
@@ -13211,7 +14078,7 @@
           <a:p>
             <a:r>
               <a:rPr lang="fr-FR" b="1" dirty="0"/>
-              <a:t>Bases du langage (3/4)</a:t>
+              <a:t>Bases du langage (3/5)</a:t>
             </a:r>
           </a:p>
         </p:txBody>
@@ -13693,7 +14560,7 @@
           <a:p>
             <a:r>
               <a:rPr lang="fr-FR" b="1" dirty="0"/>
-              <a:t>Bases du langage (4/4)</a:t>
+              <a:t>Bases du langage (4/5)</a:t>
             </a:r>
           </a:p>
         </p:txBody>
@@ -14234,6 +15101,648 @@
       </p:grpSpPr>
       <p:sp>
         <p:nvSpPr>
+          <p:cNvPr id="2" name="Title 1">
+            <a:extLst>
+              <a:ext uri="{FF2B5EF4-FFF2-40B4-BE49-F238E27FC236}">
+                <a16:creationId xmlns:a16="http://schemas.microsoft.com/office/drawing/2014/main" id="{197F391B-D1BC-1E4C-B310-969ADCAC9C86}"/>
+              </a:ext>
+            </a:extLst>
+          </p:cNvPr>
+          <p:cNvSpPr>
+            <a:spLocks noGrp="1"/>
+          </p:cNvSpPr>
+          <p:nvPr>
+            <p:ph type="title"/>
+          </p:nvPr>
+        </p:nvSpPr>
+        <p:spPr/>
+        <p:txBody>
+          <a:bodyPr/>
+          <a:lstStyle/>
+          <a:p>
+            <a:r>
+              <a:rPr lang="fr-FR" b="1" dirty="0"/>
+              <a:t>Bases du langage (5/5)</a:t>
+            </a:r>
+          </a:p>
+        </p:txBody>
+      </p:sp>
+      <p:sp>
+        <p:nvSpPr>
+          <p:cNvPr id="3" name="Content Placeholder 2">
+            <a:extLst>
+              <a:ext uri="{FF2B5EF4-FFF2-40B4-BE49-F238E27FC236}">
+                <a16:creationId xmlns:a16="http://schemas.microsoft.com/office/drawing/2014/main" id="{793FEC66-363B-3545-8E61-92AAFF0AFF62}"/>
+              </a:ext>
+            </a:extLst>
+          </p:cNvPr>
+          <p:cNvSpPr>
+            <a:spLocks noGrp="1"/>
+          </p:cNvSpPr>
+          <p:nvPr>
+            <p:ph idx="1"/>
+          </p:nvPr>
+        </p:nvSpPr>
+        <p:spPr/>
+        <p:txBody>
+          <a:bodyPr/>
+          <a:lstStyle/>
+          <a:p>
+            <a:r>
+              <a:rPr lang="fr-FR" sz="2400" dirty="0"/>
+              <a:t>Langage </a:t>
+            </a:r>
+            <a:r>
+              <a:rPr lang="fr-FR" sz="2400" b="1" dirty="0"/>
+              <a:t>objet </a:t>
+            </a:r>
+            <a:r>
+              <a:rPr lang="fr-FR" dirty="0"/>
+              <a:t>(orientée prototype)</a:t>
+            </a:r>
+            <a:endParaRPr lang="fr-FR" sz="2400" b="1" dirty="0"/>
+          </a:p>
+          <a:p>
+            <a:pPr lvl="1"/>
+            <a:r>
+              <a:rPr lang="fr-FR" sz="2000" dirty="0"/>
+              <a:t>constructeur</a:t>
+            </a:r>
+          </a:p>
+          <a:p>
+            <a:pPr lvl="1"/>
+            <a:r>
+              <a:rPr lang="fr-FR" sz="2000" dirty="0"/>
+              <a:t>instanciation avec </a:t>
+            </a:r>
+            <a:r>
+              <a:rPr lang="fr-FR" sz="2000" b="1" dirty="0">
+                <a:latin typeface="Source Code Pro" panose="020B0509030403020204"/>
+              </a:rPr>
+              <a:t>new</a:t>
+            </a:r>
+            <a:r>
+              <a:rPr lang="fr-FR" sz="2000" dirty="0"/>
+              <a:t> </a:t>
+            </a:r>
+          </a:p>
+          <a:p>
+            <a:pPr lvl="1"/>
+            <a:endParaRPr lang="fr-FR" sz="2000" dirty="0"/>
+          </a:p>
+          <a:p>
+            <a:pPr lvl="1"/>
+            <a:endParaRPr lang="fr-FR" sz="2000" dirty="0"/>
+          </a:p>
+          <a:p>
+            <a:pPr lvl="1"/>
+            <a:endParaRPr lang="fr-FR" sz="2000" dirty="0"/>
+          </a:p>
+        </p:txBody>
+      </p:sp>
+      <p:sp>
+        <p:nvSpPr>
+          <p:cNvPr id="4" name="Date Placeholder 3">
+            <a:extLst>
+              <a:ext uri="{FF2B5EF4-FFF2-40B4-BE49-F238E27FC236}">
+                <a16:creationId xmlns:a16="http://schemas.microsoft.com/office/drawing/2014/main" id="{8C2262F1-3C28-E94C-B574-356F02FF4906}"/>
+              </a:ext>
+            </a:extLst>
+          </p:cNvPr>
+          <p:cNvSpPr>
+            <a:spLocks noGrp="1"/>
+          </p:cNvSpPr>
+          <p:nvPr>
+            <p:ph type="dt" sz="half" idx="10"/>
+          </p:nvPr>
+        </p:nvSpPr>
+        <p:spPr/>
+        <p:txBody>
+          <a:bodyPr/>
+          <a:lstStyle/>
+          <a:p>
+            <a:fld id="{BB2FA04C-1355-4CE6-8050-4BD994E23BD5}" type="datetime4">
+              <a:rPr lang="fr-FR" smtClean="0"/>
+              <a:t>13 juin 2019</a:t>
+            </a:fld>
+            <a:endParaRPr lang="fr-FR" dirty="0"/>
+          </a:p>
+        </p:txBody>
+      </p:sp>
+      <p:sp>
+        <p:nvSpPr>
+          <p:cNvPr id="5" name="Footer Placeholder 4">
+            <a:extLst>
+              <a:ext uri="{FF2B5EF4-FFF2-40B4-BE49-F238E27FC236}">
+                <a16:creationId xmlns:a16="http://schemas.microsoft.com/office/drawing/2014/main" id="{770F343B-DF3F-094C-B705-4F41FD53029B}"/>
+              </a:ext>
+            </a:extLst>
+          </p:cNvPr>
+          <p:cNvSpPr>
+            <a:spLocks noGrp="1"/>
+          </p:cNvSpPr>
+          <p:nvPr>
+            <p:ph type="ftr" sz="quarter" idx="11"/>
+          </p:nvPr>
+        </p:nvSpPr>
+        <p:spPr/>
+        <p:txBody>
+          <a:bodyPr/>
+          <a:lstStyle/>
+          <a:p>
+            <a:r>
+              <a:rPr lang="fr-FR"/>
+              <a:t>DIU NSI</a:t>
+            </a:r>
+          </a:p>
+        </p:txBody>
+      </p:sp>
+      <p:sp>
+        <p:nvSpPr>
+          <p:cNvPr id="6" name="Slide Number Placeholder 5">
+            <a:extLst>
+              <a:ext uri="{FF2B5EF4-FFF2-40B4-BE49-F238E27FC236}">
+                <a16:creationId xmlns:a16="http://schemas.microsoft.com/office/drawing/2014/main" id="{127D60BA-7D2C-1548-8CB9-81CA238BB53C}"/>
+              </a:ext>
+            </a:extLst>
+          </p:cNvPr>
+          <p:cNvSpPr>
+            <a:spLocks noGrp="1"/>
+          </p:cNvSpPr>
+          <p:nvPr>
+            <p:ph type="sldNum" sz="quarter" idx="12"/>
+          </p:nvPr>
+        </p:nvSpPr>
+        <p:spPr/>
+        <p:txBody>
+          <a:bodyPr/>
+          <a:lstStyle/>
+          <a:p>
+            <a:fld id="{DCE37727-CC04-7A46-938D-2CCFF056F773}" type="slidenum">
+              <a:rPr lang="fr-FR" smtClean="0"/>
+              <a:pPr/>
+              <a:t>8</a:t>
+            </a:fld>
+            <a:endParaRPr lang="fr-FR"/>
+          </a:p>
+        </p:txBody>
+      </p:sp>
+      <p:sp>
+        <p:nvSpPr>
+          <p:cNvPr id="8" name="Rectangle 7">
+            <a:extLst>
+              <a:ext uri="{FF2B5EF4-FFF2-40B4-BE49-F238E27FC236}">
+                <a16:creationId xmlns:a16="http://schemas.microsoft.com/office/drawing/2014/main" id="{D45207C1-55BB-DB4B-990B-7E41DAF9E310}"/>
+              </a:ext>
+            </a:extLst>
+          </p:cNvPr>
+          <p:cNvSpPr/>
+          <p:nvPr/>
+        </p:nvSpPr>
+        <p:spPr>
+          <a:xfrm>
+            <a:off x="1532665" y="2963389"/>
+            <a:ext cx="5621470" cy="3256316"/>
+          </a:xfrm>
+          <a:prstGeom prst="rect">
+            <a:avLst/>
+          </a:prstGeom>
+          <a:solidFill>
+            <a:srgbClr val="FEF6E3"/>
+          </a:solidFill>
+          <a:effectLst>
+            <a:outerShdw blurRad="50800" dist="38100" dir="2700000" algn="tl" rotWithShape="0">
+              <a:prstClr val="black">
+                <a:alpha val="40000"/>
+              </a:prstClr>
+            </a:outerShdw>
+          </a:effectLst>
+        </p:spPr>
+        <p:txBody>
+          <a:bodyPr vert="horz" lIns="91440" tIns="45720" rIns="91440" bIns="45720" rtlCol="0" anchor="ctr">
+            <a:normAutofit/>
+          </a:bodyPr>
+          <a:lstStyle/>
+          <a:p>
+            <a:pPr marL="47625"/>
+            <a:r>
+              <a:rPr lang="fr-FR" altLang="fr-FR" dirty="0" err="1">
+                <a:solidFill>
+                  <a:srgbClr val="6F42C1"/>
+                </a:solidFill>
+                <a:latin typeface="Source Code Pro" panose="020B0509030403020204" pitchFamily="49" charset="0"/>
+                <a:ea typeface="Source Code Pro" panose="020B0509030403020204" pitchFamily="49" charset="0"/>
+              </a:rPr>
+              <a:t>function</a:t>
+            </a:r>
+            <a:r>
+              <a:rPr lang="fr-FR" altLang="fr-FR" dirty="0">
+                <a:solidFill>
+                  <a:srgbClr val="00B050"/>
+                </a:solidFill>
+                <a:latin typeface="Source Code Pro" panose="020B0509030403020204"/>
+              </a:rPr>
+              <a:t> Person</a:t>
+            </a:r>
+            <a:r>
+              <a:rPr lang="fr-FR" altLang="fr-FR" dirty="0">
+                <a:latin typeface="Source Code Pro" panose="020B0509030403020204"/>
+              </a:rPr>
+              <a:t>(first, last) { </a:t>
+            </a:r>
+          </a:p>
+          <a:p>
+            <a:pPr marL="47625"/>
+            <a:r>
+              <a:rPr lang="fr-FR" altLang="fr-FR" dirty="0">
+                <a:latin typeface="Source Code Pro" panose="020B0509030403020204"/>
+              </a:rPr>
+              <a:t>	</a:t>
+            </a:r>
+            <a:r>
+              <a:rPr lang="fr-FR" altLang="fr-FR" b="1" dirty="0" err="1">
+                <a:latin typeface="Source Code Pro" panose="020B0509030403020204"/>
+              </a:rPr>
+              <a:t>this</a:t>
+            </a:r>
+            <a:r>
+              <a:rPr lang="fr-FR" altLang="fr-FR" dirty="0" err="1">
+                <a:latin typeface="Source Code Pro" panose="020B0509030403020204"/>
+              </a:rPr>
+              <a:t>.</a:t>
+            </a:r>
+            <a:r>
+              <a:rPr lang="fr-FR" altLang="fr-FR" dirty="0" err="1">
+                <a:solidFill>
+                  <a:srgbClr val="00B0F0"/>
+                </a:solidFill>
+                <a:latin typeface="Source Code Pro" panose="020B0509030403020204"/>
+              </a:rPr>
+              <a:t>first</a:t>
+            </a:r>
+            <a:r>
+              <a:rPr lang="fr-FR" altLang="fr-FR" dirty="0">
+                <a:latin typeface="Source Code Pro" panose="020B0509030403020204"/>
+              </a:rPr>
+              <a:t> = first, </a:t>
+            </a:r>
+          </a:p>
+          <a:p>
+            <a:pPr marL="47625"/>
+            <a:r>
+              <a:rPr lang="fr-FR" altLang="fr-FR" dirty="0">
+                <a:latin typeface="Source Code Pro" panose="020B0509030403020204"/>
+              </a:rPr>
+              <a:t>	</a:t>
+            </a:r>
+            <a:r>
+              <a:rPr lang="fr-FR" altLang="fr-FR" b="1" dirty="0" err="1">
+                <a:latin typeface="Source Code Pro" panose="020B0509030403020204"/>
+              </a:rPr>
+              <a:t>this</a:t>
+            </a:r>
+            <a:r>
+              <a:rPr lang="fr-FR" altLang="fr-FR" dirty="0" err="1">
+                <a:latin typeface="Source Code Pro" panose="020B0509030403020204"/>
+              </a:rPr>
+              <a:t>.</a:t>
+            </a:r>
+            <a:r>
+              <a:rPr lang="fr-FR" altLang="fr-FR" dirty="0" err="1">
+                <a:solidFill>
+                  <a:srgbClr val="00B0F0"/>
+                </a:solidFill>
+                <a:latin typeface="Source Code Pro" panose="020B0509030403020204"/>
+              </a:rPr>
+              <a:t>last</a:t>
+            </a:r>
+            <a:r>
+              <a:rPr lang="fr-FR" altLang="fr-FR" dirty="0">
+                <a:latin typeface="Source Code Pro" panose="020B0509030403020204"/>
+              </a:rPr>
+              <a:t> = last, </a:t>
+            </a:r>
+          </a:p>
+          <a:p>
+            <a:pPr marL="47625"/>
+            <a:r>
+              <a:rPr lang="fr-FR" altLang="fr-FR" dirty="0">
+                <a:latin typeface="Source Code Pro" panose="020B0509030403020204"/>
+              </a:rPr>
+              <a:t>	</a:t>
+            </a:r>
+            <a:r>
+              <a:rPr lang="fr-FR" altLang="fr-FR" b="1" dirty="0" err="1">
+                <a:latin typeface="Source Code Pro" panose="020B0509030403020204"/>
+              </a:rPr>
+              <a:t>this</a:t>
+            </a:r>
+            <a:r>
+              <a:rPr lang="fr-FR" altLang="fr-FR" dirty="0" err="1">
+                <a:latin typeface="Source Code Pro" panose="020B0509030403020204"/>
+              </a:rPr>
+              <a:t>.</a:t>
+            </a:r>
+            <a:r>
+              <a:rPr lang="fr-FR" altLang="fr-FR" dirty="0" err="1">
+                <a:solidFill>
+                  <a:srgbClr val="00B0F0"/>
+                </a:solidFill>
+                <a:latin typeface="Source Code Pro" panose="020B0509030403020204"/>
+              </a:rPr>
+              <a:t>isAlive</a:t>
+            </a:r>
+            <a:r>
+              <a:rPr lang="fr-FR" altLang="fr-FR" dirty="0">
+                <a:latin typeface="Source Code Pro" panose="020B0509030403020204"/>
+              </a:rPr>
+              <a:t> = </a:t>
+            </a:r>
+            <a:r>
+              <a:rPr lang="fr-FR" altLang="fr-FR" dirty="0" err="1">
+                <a:solidFill>
+                  <a:srgbClr val="6F42C1"/>
+                </a:solidFill>
+                <a:latin typeface="Source Code Pro" panose="020B0509030403020204" pitchFamily="49" charset="0"/>
+                <a:ea typeface="Source Code Pro" panose="020B0509030403020204" pitchFamily="49" charset="0"/>
+              </a:rPr>
+              <a:t>undefined</a:t>
+            </a:r>
+            <a:r>
+              <a:rPr lang="fr-FR" altLang="fr-FR" dirty="0">
+                <a:solidFill>
+                  <a:srgbClr val="6F42C1"/>
+                </a:solidFill>
+                <a:latin typeface="Source Code Pro" panose="020B0509030403020204"/>
+                <a:ea typeface="Source Code Pro" panose="020B0509030403020204" pitchFamily="49" charset="0"/>
+              </a:rPr>
+              <a:t>,</a:t>
+            </a:r>
+          </a:p>
+          <a:p>
+            <a:pPr marL="47625"/>
+            <a:r>
+              <a:rPr lang="fr-FR" altLang="fr-FR" dirty="0">
+                <a:latin typeface="Source Code Pro" panose="020B0509030403020204"/>
+              </a:rPr>
+              <a:t>	</a:t>
+            </a:r>
+            <a:r>
+              <a:rPr lang="fr-FR" altLang="fr-FR" b="1" dirty="0" err="1">
+                <a:latin typeface="Source Code Pro" panose="020B0509030403020204"/>
+              </a:rPr>
+              <a:t>this</a:t>
+            </a:r>
+            <a:r>
+              <a:rPr lang="fr-FR" altLang="fr-FR" dirty="0" err="1">
+                <a:latin typeface="Source Code Pro" panose="020B0509030403020204"/>
+              </a:rPr>
+              <a:t>.</a:t>
+            </a:r>
+            <a:r>
+              <a:rPr lang="fr-FR" altLang="fr-FR" dirty="0" err="1">
+                <a:solidFill>
+                  <a:srgbClr val="00B0F0"/>
+                </a:solidFill>
+                <a:latin typeface="Source Code Pro" panose="020B0509030403020204"/>
+              </a:rPr>
+              <a:t>resurrect</a:t>
+            </a:r>
+            <a:r>
+              <a:rPr lang="fr-FR" altLang="fr-FR" dirty="0">
+                <a:latin typeface="Source Code Pro" panose="020B0509030403020204"/>
+              </a:rPr>
+              <a:t> = </a:t>
+            </a:r>
+            <a:r>
+              <a:rPr lang="fr-FR" altLang="fr-FR" dirty="0" err="1">
+                <a:solidFill>
+                  <a:srgbClr val="6F42C1"/>
+                </a:solidFill>
+                <a:latin typeface="Source Code Pro" panose="020B0509030403020204" pitchFamily="49" charset="0"/>
+                <a:ea typeface="Source Code Pro" panose="020B0509030403020204" pitchFamily="49" charset="0"/>
+              </a:rPr>
+              <a:t>function</a:t>
+            </a:r>
+            <a:r>
+              <a:rPr lang="fr-FR" altLang="fr-FR" dirty="0">
+                <a:latin typeface="Source Code Pro" panose="020B0509030403020204"/>
+              </a:rPr>
+              <a:t>() { 				</a:t>
+            </a:r>
+            <a:r>
+              <a:rPr lang="fr-FR" altLang="fr-FR" b="1" dirty="0" err="1">
+                <a:latin typeface="Source Code Pro" panose="020B0509030403020204"/>
+              </a:rPr>
+              <a:t>this</a:t>
+            </a:r>
+            <a:r>
+              <a:rPr lang="fr-FR" altLang="fr-FR" dirty="0" err="1">
+                <a:latin typeface="Source Code Pro" panose="020B0509030403020204"/>
+              </a:rPr>
+              <a:t>.isAlive</a:t>
+            </a:r>
+            <a:r>
+              <a:rPr lang="fr-FR" altLang="fr-FR" dirty="0">
+                <a:latin typeface="Source Code Pro" panose="020B0509030403020204"/>
+              </a:rPr>
+              <a:t> = </a:t>
+            </a:r>
+            <a:r>
+              <a:rPr lang="fr-FR" altLang="fr-FR" dirty="0" err="1">
+                <a:latin typeface="Source Code Pro" panose="020B0509030403020204"/>
+              </a:rPr>
+              <a:t>true</a:t>
+            </a:r>
+            <a:r>
+              <a:rPr lang="fr-FR" altLang="fr-FR" dirty="0">
+                <a:latin typeface="Source Code Pro" panose="020B0509030403020204"/>
+              </a:rPr>
+              <a:t>; </a:t>
+            </a:r>
+          </a:p>
+          <a:p>
+            <a:pPr marL="47625"/>
+            <a:r>
+              <a:rPr lang="fr-FR" altLang="fr-FR" dirty="0">
+                <a:latin typeface="Source Code Pro" panose="020B0509030403020204"/>
+              </a:rPr>
+              <a:t>	} </a:t>
+            </a:r>
+          </a:p>
+          <a:p>
+            <a:pPr marL="47625"/>
+            <a:r>
+              <a:rPr lang="fr-FR" altLang="fr-FR" dirty="0">
+                <a:latin typeface="Source Code Pro" panose="020B0509030403020204"/>
+              </a:rPr>
+              <a:t>} </a:t>
+            </a:r>
+          </a:p>
+          <a:p>
+            <a:pPr marL="47625"/>
+            <a:endParaRPr lang="fr-FR" altLang="fr-FR" dirty="0">
+              <a:latin typeface="Source Code Pro" panose="020B0509030403020204"/>
+            </a:endParaRPr>
+          </a:p>
+          <a:p>
+            <a:pPr marL="47625"/>
+            <a:r>
+              <a:rPr lang="fr-FR" altLang="fr-FR" dirty="0">
+                <a:solidFill>
+                  <a:srgbClr val="00B050"/>
+                </a:solidFill>
+                <a:latin typeface="Source Code Pro" panose="020B0509030403020204"/>
+              </a:rPr>
+              <a:t>let </a:t>
+            </a:r>
+            <a:r>
+              <a:rPr lang="fr-FR" altLang="fr-FR" dirty="0" err="1">
+                <a:latin typeface="Source Code Pro" panose="020B0509030403020204"/>
+              </a:rPr>
+              <a:t>jonSnow</a:t>
+            </a:r>
+            <a:r>
+              <a:rPr lang="fr-FR" altLang="fr-FR" dirty="0">
+                <a:latin typeface="Source Code Pro" panose="020B0509030403020204"/>
+              </a:rPr>
+              <a:t> = </a:t>
+            </a:r>
+            <a:r>
+              <a:rPr lang="fr-FR" altLang="fr-FR" b="1" dirty="0">
+                <a:latin typeface="Source Code Pro" panose="020B0509030403020204"/>
+              </a:rPr>
+              <a:t>new</a:t>
+            </a:r>
+            <a:r>
+              <a:rPr lang="fr-FR" altLang="fr-FR" dirty="0">
+                <a:latin typeface="Source Code Pro" panose="020B0509030403020204"/>
+              </a:rPr>
+              <a:t> </a:t>
+            </a:r>
+            <a:r>
+              <a:rPr lang="fr-FR" altLang="fr-FR" dirty="0">
+                <a:solidFill>
+                  <a:srgbClr val="00B050"/>
+                </a:solidFill>
+                <a:latin typeface="Source Code Pro" panose="020B0509030403020204"/>
+              </a:rPr>
+              <a:t>Person</a:t>
+            </a:r>
+            <a:r>
+              <a:rPr lang="fr-FR" altLang="fr-FR" dirty="0">
+                <a:latin typeface="Source Code Pro" panose="020B0509030403020204" pitchFamily="49" charset="0"/>
+                <a:ea typeface="Source Code Pro" panose="020B0509030403020204" pitchFamily="49" charset="0"/>
+              </a:rPr>
+              <a:t>(</a:t>
+            </a:r>
+            <a:r>
+              <a:rPr lang="fr-FR" altLang="fr-FR" dirty="0">
+                <a:solidFill>
+                  <a:srgbClr val="C00000"/>
+                </a:solidFill>
+                <a:latin typeface="Source Code Pro" panose="020B0509030403020204"/>
+              </a:rPr>
+              <a:t>'</a:t>
+            </a:r>
+            <a:r>
+              <a:rPr lang="fr-FR" altLang="fr-FR" dirty="0" err="1">
+                <a:solidFill>
+                  <a:srgbClr val="C00000"/>
+                </a:solidFill>
+                <a:latin typeface="Source Code Pro" panose="020B0509030403020204"/>
+              </a:rPr>
+              <a:t>Jon'</a:t>
+            </a:r>
+            <a:r>
+              <a:rPr lang="fr-FR" altLang="fr-FR" dirty="0" err="1">
+                <a:latin typeface="Source Code Pro" panose="020B0509030403020204"/>
+              </a:rPr>
+              <a:t>,</a:t>
+            </a:r>
+            <a:r>
+              <a:rPr lang="fr-FR" altLang="fr-FR" dirty="0" err="1">
+                <a:solidFill>
+                  <a:srgbClr val="C00000"/>
+                </a:solidFill>
+                <a:latin typeface="Source Code Pro" panose="020B0509030403020204"/>
+              </a:rPr>
+              <a:t>'Snow</a:t>
+            </a:r>
+            <a:r>
+              <a:rPr lang="fr-FR" altLang="fr-FR" dirty="0">
+                <a:solidFill>
+                  <a:srgbClr val="C00000"/>
+                </a:solidFill>
+                <a:latin typeface="Source Code Pro" panose="020B0509030403020204"/>
+              </a:rPr>
+              <a:t>'</a:t>
+            </a:r>
+            <a:r>
+              <a:rPr lang="fr-FR" altLang="fr-FR" dirty="0">
+                <a:latin typeface="Source Code Pro" panose="020B0509030403020204" pitchFamily="49" charset="0"/>
+                <a:ea typeface="Source Code Pro" panose="020B0509030403020204" pitchFamily="49" charset="0"/>
+              </a:rPr>
+              <a:t>)</a:t>
+            </a:r>
+            <a:r>
+              <a:rPr lang="fr-FR" altLang="fr-FR" dirty="0">
+                <a:latin typeface="Source Code Pro" panose="020B0509030403020204"/>
+              </a:rPr>
+              <a:t>;</a:t>
+            </a:r>
+          </a:p>
+          <a:p>
+            <a:pPr marL="47625"/>
+            <a:r>
+              <a:rPr lang="fr-FR" altLang="fr-FR" dirty="0" err="1">
+                <a:latin typeface="Source Code Pro" panose="020B0509030403020204" pitchFamily="49" charset="0"/>
+                <a:ea typeface="Source Code Pro" panose="020B0509030403020204" pitchFamily="49" charset="0"/>
+              </a:rPr>
+              <a:t>jonSnow.resurrect</a:t>
+            </a:r>
+            <a:r>
+              <a:rPr lang="fr-FR" altLang="fr-FR" dirty="0">
+                <a:latin typeface="Source Code Pro" panose="020B0509030403020204" pitchFamily="49" charset="0"/>
+                <a:ea typeface="Source Code Pro" panose="020B0509030403020204" pitchFamily="49" charset="0"/>
+              </a:rPr>
+              <a:t>();</a:t>
+            </a:r>
+          </a:p>
+        </p:txBody>
+      </p:sp>
+    </p:spTree>
+    <p:extLst>
+      <p:ext uri="{BB962C8B-B14F-4D97-AF65-F5344CB8AC3E}">
+        <p14:creationId xmlns:p14="http://schemas.microsoft.com/office/powerpoint/2010/main" val="4235800663"/>
+      </p:ext>
+    </p:extLst>
+  </p:cSld>
+  <p:clrMapOvr>
+    <a:masterClrMapping/>
+  </p:clrMapOvr>
+</p:sld>
+</file>
+
+<file path=ppt/slides/slide9.xml><?xml version="1.0" encoding="utf-8"?>
+<p:sld xmlns:a="http://schemas.openxmlformats.org/drawingml/2006/main" xmlns:r="http://schemas.openxmlformats.org/officeDocument/2006/relationships" xmlns:p="http://schemas.openxmlformats.org/presentationml/2006/main">
+  <p:cSld>
+    <p:spTree>
+      <p:nvGrpSpPr>
+        <p:cNvPr id="1" name=""/>
+        <p:cNvGrpSpPr/>
+        <p:nvPr/>
+      </p:nvGrpSpPr>
+      <p:grpSpPr>
+        <a:xfrm>
+          <a:off x="0" y="0"/>
+          <a:ext cx="0" cy="0"/>
+          <a:chOff x="0" y="0"/>
+          <a:chExt cx="0" cy="0"/>
+        </a:xfrm>
+      </p:grpSpPr>
+      <p:sp>
+        <p:nvSpPr>
           <p:cNvPr id="2" name="Titre 1"/>
           <p:cNvSpPr>
             <a:spLocks noGrp="1"/>
@@ -14319,7 +15828,7 @@
             <a:fld id="{DCE37727-CC04-7A46-938D-2CCFF056F773}" type="slidenum">
               <a:rPr lang="fr-FR" smtClean="0"/>
               <a:pPr/>
-              <a:t>8</a:t>
+              <a:t>9</a:t>
             </a:fld>
             <a:endParaRPr lang="fr-FR"/>
           </a:p>
@@ -14720,880 +16229,6 @@
   <p:transition spd="slow">
     <p:wipe/>
   </p:transition>
-</p:sld>
-</file>
-
-<file path=ppt/slides/slide9.xml><?xml version="1.0" encoding="utf-8"?>
-<p:sld xmlns:a="http://schemas.openxmlformats.org/drawingml/2006/main" xmlns:r="http://schemas.openxmlformats.org/officeDocument/2006/relationships" xmlns:p="http://schemas.openxmlformats.org/presentationml/2006/main">
-  <p:cSld>
-    <p:spTree>
-      <p:nvGrpSpPr>
-        <p:cNvPr id="1" name=""/>
-        <p:cNvGrpSpPr/>
-        <p:nvPr/>
-      </p:nvGrpSpPr>
-      <p:grpSpPr>
-        <a:xfrm>
-          <a:off x="0" y="0"/>
-          <a:ext cx="0" cy="0"/>
-          <a:chOff x="0" y="0"/>
-          <a:chExt cx="0" cy="0"/>
-        </a:xfrm>
-      </p:grpSpPr>
-      <p:sp>
-        <p:nvSpPr>
-          <p:cNvPr id="10" name="Espace réservé du contenu 2"/>
-          <p:cNvSpPr txBox="1">
-            <a:spLocks/>
-          </p:cNvSpPr>
-          <p:nvPr/>
-        </p:nvSpPr>
-        <p:spPr>
-          <a:xfrm>
-            <a:off x="228600" y="1058026"/>
-            <a:ext cx="8644466" cy="5569596"/>
-          </a:xfrm>
-          <a:prstGeom prst="rect">
-            <a:avLst/>
-          </a:prstGeom>
-        </p:spPr>
-        <p:txBody>
-          <a:bodyPr vert="horz" lIns="91440" tIns="45720" rIns="91440" bIns="45720" rtlCol="0">
-            <a:noAutofit/>
-          </a:bodyPr>
-          <a:lstStyle>
-            <a:lvl1pPr marL="342900" marR="0" indent="-342900" algn="l" defTabSz="457200" rtl="0" eaLnBrk="1" fontAlgn="auto" latinLnBrk="0" hangingPunct="1">
-              <a:lnSpc>
-                <a:spcPct val="100000"/>
-              </a:lnSpc>
-              <a:spcBef>
-                <a:spcPct val="20000"/>
-              </a:spcBef>
-              <a:spcAft>
-                <a:spcPts val="0"/>
-              </a:spcAft>
-              <a:buClr>
-                <a:schemeClr val="accent6"/>
-              </a:buClr>
-              <a:buSzTx/>
-              <a:buFont typeface="Lucida Grande"/>
-              <a:buChar char="➔"/>
-              <a:tabLst/>
-              <a:defRPr sz="2000" kern="1200">
-                <a:solidFill>
-                  <a:schemeClr val="tx1"/>
-                </a:solidFill>
-                <a:latin typeface="+mn-lt"/>
-                <a:ea typeface="+mn-ea"/>
-                <a:cs typeface="+mn-cs"/>
-              </a:defRPr>
-            </a:lvl1pPr>
-            <a:lvl2pPr marL="742950" marR="0" indent="-285750" algn="l" defTabSz="457200" rtl="0" eaLnBrk="1" fontAlgn="auto" latinLnBrk="0" hangingPunct="1">
-              <a:lnSpc>
-                <a:spcPct val="100000"/>
-              </a:lnSpc>
-              <a:spcBef>
-                <a:spcPct val="20000"/>
-              </a:spcBef>
-              <a:spcAft>
-                <a:spcPts val="0"/>
-              </a:spcAft>
-              <a:buClr>
-                <a:srgbClr val="009DE0"/>
-              </a:buClr>
-              <a:buSzTx/>
-              <a:buFont typeface="Arial"/>
-              <a:buChar char="›"/>
-              <a:tabLst/>
-              <a:defRPr sz="2800" kern="1200">
-                <a:solidFill>
-                  <a:schemeClr val="tx1"/>
-                </a:solidFill>
-                <a:latin typeface="+mn-lt"/>
-                <a:ea typeface="+mn-ea"/>
-                <a:cs typeface="+mn-cs"/>
-              </a:defRPr>
-            </a:lvl2pPr>
-            <a:lvl3pPr marL="1143000" marR="0" indent="-228600" algn="l" defTabSz="457200" rtl="0" eaLnBrk="1" fontAlgn="auto" latinLnBrk="0" hangingPunct="1">
-              <a:lnSpc>
-                <a:spcPct val="100000"/>
-              </a:lnSpc>
-              <a:spcBef>
-                <a:spcPct val="20000"/>
-              </a:spcBef>
-              <a:spcAft>
-                <a:spcPts val="0"/>
-              </a:spcAft>
-              <a:buClrTx/>
-              <a:buSzTx/>
-              <a:buFont typeface="Arial"/>
-              <a:buChar char="•"/>
-              <a:tabLst/>
-              <a:defRPr sz="2400" kern="1200">
-                <a:solidFill>
-                  <a:schemeClr val="tx1"/>
-                </a:solidFill>
-                <a:latin typeface="+mn-lt"/>
-                <a:ea typeface="+mn-ea"/>
-                <a:cs typeface="+mn-cs"/>
-              </a:defRPr>
-            </a:lvl3pPr>
-            <a:lvl4pPr marL="1600200" marR="0" indent="-228600" algn="l" defTabSz="457200" rtl="0" eaLnBrk="1" fontAlgn="auto" latinLnBrk="0" hangingPunct="1">
-              <a:lnSpc>
-                <a:spcPct val="100000"/>
-              </a:lnSpc>
-              <a:spcBef>
-                <a:spcPct val="20000"/>
-              </a:spcBef>
-              <a:spcAft>
-                <a:spcPts val="0"/>
-              </a:spcAft>
-              <a:buClrTx/>
-              <a:buSzTx/>
-              <a:buFont typeface="Arial"/>
-              <a:buChar char="–"/>
-              <a:tabLst/>
-              <a:defRPr sz="2000" kern="1200">
-                <a:solidFill>
-                  <a:schemeClr val="tx1"/>
-                </a:solidFill>
-                <a:latin typeface="+mn-lt"/>
-                <a:ea typeface="+mn-ea"/>
-                <a:cs typeface="+mn-cs"/>
-              </a:defRPr>
-            </a:lvl4pPr>
-            <a:lvl5pPr marL="2057400" marR="0" indent="-228600" algn="l" defTabSz="457200" rtl="0" eaLnBrk="1" fontAlgn="auto" latinLnBrk="0" hangingPunct="1">
-              <a:lnSpc>
-                <a:spcPct val="100000"/>
-              </a:lnSpc>
-              <a:spcBef>
-                <a:spcPct val="20000"/>
-              </a:spcBef>
-              <a:spcAft>
-                <a:spcPts val="0"/>
-              </a:spcAft>
-              <a:buClrTx/>
-              <a:buSzTx/>
-              <a:buFont typeface="Arial"/>
-              <a:buChar char="»"/>
-              <a:tabLst/>
-              <a:defRPr sz="2000" kern="1200">
-                <a:solidFill>
-                  <a:schemeClr val="tx1"/>
-                </a:solidFill>
-                <a:latin typeface="+mn-lt"/>
-                <a:ea typeface="+mn-ea"/>
-                <a:cs typeface="+mn-cs"/>
-              </a:defRPr>
-            </a:lvl5pPr>
-            <a:lvl6pPr marL="2514600" indent="-228600" algn="l" defTabSz="457200" rtl="0" eaLnBrk="1" latinLnBrk="0" hangingPunct="1">
-              <a:spcBef>
-                <a:spcPct val="20000"/>
-              </a:spcBef>
-              <a:buFont typeface="Arial"/>
-              <a:buChar char="•"/>
-              <a:defRPr sz="2000" kern="1200">
-                <a:solidFill>
-                  <a:schemeClr val="tx1"/>
-                </a:solidFill>
-                <a:latin typeface="+mn-lt"/>
-                <a:ea typeface="+mn-ea"/>
-                <a:cs typeface="+mn-cs"/>
-              </a:defRPr>
-            </a:lvl6pPr>
-            <a:lvl7pPr marL="2971800" indent="-228600" algn="l" defTabSz="457200" rtl="0" eaLnBrk="1" latinLnBrk="0" hangingPunct="1">
-              <a:spcBef>
-                <a:spcPct val="20000"/>
-              </a:spcBef>
-              <a:buFont typeface="Arial"/>
-              <a:buChar char="•"/>
-              <a:defRPr sz="2000" kern="1200">
-                <a:solidFill>
-                  <a:schemeClr val="tx1"/>
-                </a:solidFill>
-                <a:latin typeface="+mn-lt"/>
-                <a:ea typeface="+mn-ea"/>
-                <a:cs typeface="+mn-cs"/>
-              </a:defRPr>
-            </a:lvl7pPr>
-            <a:lvl8pPr marL="3429000" indent="-228600" algn="l" defTabSz="457200" rtl="0" eaLnBrk="1" latinLnBrk="0" hangingPunct="1">
-              <a:spcBef>
-                <a:spcPct val="20000"/>
-              </a:spcBef>
-              <a:buFont typeface="Arial"/>
-              <a:buChar char="•"/>
-              <a:defRPr sz="2000" kern="1200">
-                <a:solidFill>
-                  <a:schemeClr val="tx1"/>
-                </a:solidFill>
-                <a:latin typeface="+mn-lt"/>
-                <a:ea typeface="+mn-ea"/>
-                <a:cs typeface="+mn-cs"/>
-              </a:defRPr>
-            </a:lvl8pPr>
-            <a:lvl9pPr marL="3886200" indent="-228600" algn="l" defTabSz="457200" rtl="0" eaLnBrk="1" latinLnBrk="0" hangingPunct="1">
-              <a:spcBef>
-                <a:spcPct val="20000"/>
-              </a:spcBef>
-              <a:buFont typeface="Arial"/>
-              <a:buChar char="•"/>
-              <a:defRPr sz="2000" kern="1200">
-                <a:solidFill>
-                  <a:schemeClr val="tx1"/>
-                </a:solidFill>
-                <a:latin typeface="+mn-lt"/>
-                <a:ea typeface="+mn-ea"/>
-                <a:cs typeface="+mn-cs"/>
-              </a:defRPr>
-            </a:lvl9pPr>
-          </a:lstStyle>
-          <a:p>
-            <a:pPr marL="400050" indent="-400050"/>
-            <a:r>
-              <a:rPr lang="fr-FR" sz="2400" dirty="0"/>
-              <a:t>Ajouter le code JavaScript dans la page HTML </a:t>
-            </a:r>
-            <a:br>
-              <a:rPr lang="fr-FR" sz="2400" dirty="0"/>
-            </a:br>
-            <a:r>
-              <a:rPr lang="fr-FR" sz="2400" dirty="0"/>
-              <a:t>à l'intérieur d'une balise </a:t>
-            </a:r>
-            <a:r>
-              <a:rPr lang="fr-FR" sz="2400" dirty="0">
-                <a:solidFill>
-                  <a:srgbClr val="990000"/>
-                </a:solidFill>
-                <a:latin typeface="Source Code Pro" panose="020B0509030403020204" pitchFamily="49" charset="0"/>
-                <a:ea typeface="Source Code Pro" panose="020B0509030403020204" pitchFamily="49" charset="0"/>
-              </a:rPr>
-              <a:t>&lt;script&gt;</a:t>
-            </a:r>
-            <a:r>
-              <a:rPr lang="fr-FR" sz="2400" b="1" dirty="0">
-                <a:solidFill>
-                  <a:srgbClr val="990000"/>
-                </a:solidFill>
-                <a:latin typeface="+mj-lt"/>
-                <a:ea typeface="Source Code Pro" panose="020B0509030403020204" pitchFamily="49" charset="0"/>
-              </a:rPr>
-              <a:t> </a:t>
-            </a:r>
-            <a:r>
-              <a:rPr lang="fr-FR" sz="2400" dirty="0">
-                <a:latin typeface="+mj-lt"/>
-              </a:rPr>
-              <a:t>:</a:t>
-            </a:r>
-          </a:p>
-          <a:p>
-            <a:pPr marL="400050" indent="-400050"/>
-            <a:endParaRPr lang="fr-FR" sz="2400" dirty="0"/>
-          </a:p>
-          <a:p>
-            <a:pPr marL="400050" indent="-400050"/>
-            <a:endParaRPr lang="fr-FR" sz="2400" dirty="0"/>
-          </a:p>
-          <a:p>
-            <a:pPr marL="400050" indent="-400050"/>
-            <a:endParaRPr lang="fr-FR" sz="2400" dirty="0"/>
-          </a:p>
-          <a:p>
-            <a:pPr marL="0" indent="0">
-              <a:buNone/>
-            </a:pPr>
-            <a:br>
-              <a:rPr lang="fr-FR" sz="2400" dirty="0"/>
-            </a:br>
-            <a:endParaRPr lang="fr-FR" sz="2400" dirty="0"/>
-          </a:p>
-        </p:txBody>
-      </p:sp>
-      <p:sp>
-        <p:nvSpPr>
-          <p:cNvPr id="2" name="Titre 1"/>
-          <p:cNvSpPr>
-            <a:spLocks noGrp="1"/>
-          </p:cNvSpPr>
-          <p:nvPr>
-            <p:ph type="title"/>
-          </p:nvPr>
-        </p:nvSpPr>
-        <p:spPr/>
-        <p:txBody>
-          <a:bodyPr>
-            <a:noAutofit/>
-          </a:bodyPr>
-          <a:lstStyle/>
-          <a:p>
-            <a:r>
-              <a:rPr lang="fr-FR" b="1" dirty="0"/>
-              <a:t>HTML et JavaScript (2/3)</a:t>
-            </a:r>
-          </a:p>
-        </p:txBody>
-      </p:sp>
-      <p:sp>
-        <p:nvSpPr>
-          <p:cNvPr id="4" name="Espace réservé de la date 3"/>
-          <p:cNvSpPr>
-            <a:spLocks noGrp="1"/>
-          </p:cNvSpPr>
-          <p:nvPr>
-            <p:ph type="dt" sz="half" idx="10"/>
-          </p:nvPr>
-        </p:nvSpPr>
-        <p:spPr/>
-        <p:txBody>
-          <a:bodyPr/>
-          <a:lstStyle/>
-          <a:p>
-            <a:fld id="{BB2FA04C-1355-4CE6-8050-4BD994E23BD5}" type="datetime4">
-              <a:rPr lang="fr-FR" smtClean="0"/>
-              <a:t>12 juin 2019</a:t>
-            </a:fld>
-            <a:endParaRPr lang="fr-FR" dirty="0"/>
-          </a:p>
-        </p:txBody>
-      </p:sp>
-      <p:sp>
-        <p:nvSpPr>
-          <p:cNvPr id="5" name="Espace réservé du pied de page 4"/>
-          <p:cNvSpPr>
-            <a:spLocks noGrp="1"/>
-          </p:cNvSpPr>
-          <p:nvPr>
-            <p:ph type="ftr" sz="quarter" idx="11"/>
-          </p:nvPr>
-        </p:nvSpPr>
-        <p:spPr/>
-        <p:txBody>
-          <a:bodyPr/>
-          <a:lstStyle/>
-          <a:p>
-            <a:r>
-              <a:rPr lang="fr-FR"/>
-              <a:t>DIU NSI</a:t>
-            </a:r>
-          </a:p>
-        </p:txBody>
-      </p:sp>
-      <p:sp>
-        <p:nvSpPr>
-          <p:cNvPr id="6" name="Espace réservé du numéro de diapositive 5"/>
-          <p:cNvSpPr>
-            <a:spLocks noGrp="1"/>
-          </p:cNvSpPr>
-          <p:nvPr>
-            <p:ph type="sldNum" sz="quarter" idx="12"/>
-          </p:nvPr>
-        </p:nvSpPr>
-        <p:spPr/>
-        <p:txBody>
-          <a:bodyPr/>
-          <a:lstStyle/>
-          <a:p>
-            <a:fld id="{DCE37727-CC04-7A46-938D-2CCFF056F773}" type="slidenum">
-              <a:rPr lang="fr-FR" smtClean="0"/>
-              <a:pPr/>
-              <a:t>9</a:t>
-            </a:fld>
-            <a:endParaRPr lang="fr-FR"/>
-          </a:p>
-        </p:txBody>
-      </p:sp>
-      <p:sp>
-        <p:nvSpPr>
-          <p:cNvPr id="8" name="Rectangle 7">
-            <a:extLst>
-              <a:ext uri="{FF2B5EF4-FFF2-40B4-BE49-F238E27FC236}">
-                <a16:creationId xmlns:a16="http://schemas.microsoft.com/office/drawing/2014/main" id="{99D6AB73-3556-6845-9EF8-9024C2407A0D}"/>
-              </a:ext>
-            </a:extLst>
-          </p:cNvPr>
-          <p:cNvSpPr/>
-          <p:nvPr/>
-        </p:nvSpPr>
-        <p:spPr>
-          <a:xfrm>
-            <a:off x="555710" y="1981138"/>
-            <a:ext cx="8032580" cy="4030702"/>
-          </a:xfrm>
-          <a:prstGeom prst="rect">
-            <a:avLst/>
-          </a:prstGeom>
-          <a:solidFill>
-            <a:srgbClr val="FEF6E3"/>
-          </a:solidFill>
-          <a:effectLst>
-            <a:outerShdw blurRad="50800" dist="38100" dir="2700000" algn="tl" rotWithShape="0">
-              <a:prstClr val="black">
-                <a:alpha val="40000"/>
-              </a:prstClr>
-            </a:outerShdw>
-          </a:effectLst>
-        </p:spPr>
-        <p:txBody>
-          <a:bodyPr vert="horz" lIns="91440" tIns="45720" rIns="91440" bIns="45720" rtlCol="0" anchor="ctr">
-            <a:normAutofit/>
-          </a:bodyPr>
-          <a:lstStyle/>
-          <a:p>
-            <a:pPr marL="47625" indent="0">
-              <a:buFont typeface="Brix Slab Bold" pitchFamily="50" charset="0"/>
-              <a:buNone/>
-            </a:pPr>
-            <a:r>
-              <a:rPr lang="fr-FR" dirty="0">
-                <a:solidFill>
-                  <a:srgbClr val="657B83"/>
-                </a:solidFill>
-                <a:latin typeface="Source Code Pro" panose="020B0509030403020204" pitchFamily="49" charset="0"/>
-                <a:ea typeface="Source Code Pro" panose="020B0509030403020204" pitchFamily="49" charset="0"/>
-              </a:rPr>
-              <a:t>&lt;!DOCTYPE html&gt;</a:t>
-            </a:r>
-          </a:p>
-          <a:p>
-            <a:pPr marL="47625" indent="0">
-              <a:buFont typeface="Brix Slab Bold" pitchFamily="50" charset="0"/>
-              <a:buNone/>
-            </a:pPr>
-            <a:r>
-              <a:rPr lang="fr-FR" dirty="0">
-                <a:solidFill>
-                  <a:srgbClr val="010080"/>
-                </a:solidFill>
-                <a:latin typeface="Source Code Pro" panose="020B0509030403020204" pitchFamily="49" charset="0"/>
-                <a:ea typeface="Source Code Pro" panose="020B0509030403020204" pitchFamily="49" charset="0"/>
-              </a:rPr>
-              <a:t>&lt;html </a:t>
-            </a:r>
-            <a:r>
-              <a:rPr lang="fr-FR" dirty="0" err="1">
-                <a:solidFill>
-                  <a:srgbClr val="008080"/>
-                </a:solidFill>
-                <a:latin typeface="Source Code Pro" panose="020B0509030403020204" pitchFamily="49" charset="0"/>
-                <a:ea typeface="Source Code Pro" panose="020B0509030403020204" pitchFamily="49" charset="0"/>
-              </a:rPr>
-              <a:t>lang</a:t>
-            </a:r>
-            <a:r>
-              <a:rPr lang="fr-FR" dirty="0">
-                <a:solidFill>
-                  <a:srgbClr val="010080"/>
-                </a:solidFill>
-                <a:latin typeface="Source Code Pro" panose="020B0509030403020204" pitchFamily="49" charset="0"/>
-                <a:ea typeface="Source Code Pro" panose="020B0509030403020204" pitchFamily="49" charset="0"/>
-              </a:rPr>
-              <a:t>="</a:t>
-            </a:r>
-            <a:r>
-              <a:rPr lang="fr-FR" dirty="0" err="1">
-                <a:solidFill>
-                  <a:srgbClr val="990000"/>
-                </a:solidFill>
-                <a:latin typeface="Source Code Pro" panose="020B0509030403020204" pitchFamily="49" charset="0"/>
-                <a:ea typeface="Source Code Pro" panose="020B0509030403020204" pitchFamily="49" charset="0"/>
-              </a:rPr>
-              <a:t>fr</a:t>
-            </a:r>
-            <a:r>
-              <a:rPr lang="fr-FR" dirty="0">
-                <a:solidFill>
-                  <a:srgbClr val="010080"/>
-                </a:solidFill>
-                <a:latin typeface="Source Code Pro" panose="020B0509030403020204" pitchFamily="49" charset="0"/>
-                <a:ea typeface="Source Code Pro" panose="020B0509030403020204" pitchFamily="49" charset="0"/>
-              </a:rPr>
-              <a:t>"&gt;</a:t>
-            </a:r>
-          </a:p>
-          <a:p>
-            <a:pPr marL="342900" lvl="1" indent="0">
-              <a:buNone/>
-            </a:pPr>
-            <a:r>
-              <a:rPr lang="fr-FR" dirty="0">
-                <a:solidFill>
-                  <a:srgbClr val="010080"/>
-                </a:solidFill>
-                <a:latin typeface="Source Code Pro" panose="020B0509030403020204" pitchFamily="49" charset="0"/>
-                <a:ea typeface="Source Code Pro" panose="020B0509030403020204" pitchFamily="49" charset="0"/>
-              </a:rPr>
-              <a:t>&lt;</a:t>
-            </a:r>
-            <a:r>
-              <a:rPr lang="fr-FR" dirty="0" err="1">
-                <a:solidFill>
-                  <a:srgbClr val="010080"/>
-                </a:solidFill>
-                <a:latin typeface="Source Code Pro" panose="020B0509030403020204" pitchFamily="49" charset="0"/>
-                <a:ea typeface="Source Code Pro" panose="020B0509030403020204" pitchFamily="49" charset="0"/>
-              </a:rPr>
-              <a:t>head</a:t>
-            </a:r>
-            <a:r>
-              <a:rPr lang="fr-FR" dirty="0">
-                <a:solidFill>
-                  <a:srgbClr val="010080"/>
-                </a:solidFill>
-                <a:latin typeface="Source Code Pro" panose="020B0509030403020204" pitchFamily="49" charset="0"/>
-                <a:ea typeface="Source Code Pro" panose="020B0509030403020204" pitchFamily="49" charset="0"/>
-              </a:rPr>
-              <a:t>&gt; </a:t>
-            </a:r>
-          </a:p>
-          <a:p>
-            <a:pPr marL="742950" lvl="2" indent="0">
-              <a:buNone/>
-            </a:pPr>
-            <a:r>
-              <a:rPr lang="fr-FR" dirty="0">
-                <a:solidFill>
-                  <a:srgbClr val="010080"/>
-                </a:solidFill>
-                <a:latin typeface="Source Code Pro" panose="020B0509030403020204" pitchFamily="49" charset="0"/>
-                <a:ea typeface="Source Code Pro" panose="020B0509030403020204" pitchFamily="49" charset="0"/>
-              </a:rPr>
-              <a:t>&lt;</a:t>
-            </a:r>
-            <a:r>
-              <a:rPr lang="fr-FR" dirty="0" err="1">
-                <a:solidFill>
-                  <a:srgbClr val="010080"/>
-                </a:solidFill>
-                <a:latin typeface="Source Code Pro" panose="020B0509030403020204" pitchFamily="49" charset="0"/>
-                <a:ea typeface="Source Code Pro" panose="020B0509030403020204" pitchFamily="49" charset="0"/>
-              </a:rPr>
-              <a:t>meta</a:t>
-            </a:r>
-            <a:r>
-              <a:rPr lang="fr-FR" dirty="0">
-                <a:solidFill>
-                  <a:srgbClr val="010080"/>
-                </a:solidFill>
-                <a:latin typeface="Source Code Pro" panose="020B0509030403020204" pitchFamily="49" charset="0"/>
-                <a:ea typeface="Source Code Pro" panose="020B0509030403020204" pitchFamily="49" charset="0"/>
-              </a:rPr>
-              <a:t> </a:t>
-            </a:r>
-            <a:r>
-              <a:rPr lang="fr-FR" dirty="0" err="1">
-                <a:solidFill>
-                  <a:srgbClr val="008080"/>
-                </a:solidFill>
-                <a:latin typeface="Source Code Pro" panose="020B0509030403020204" pitchFamily="49" charset="0"/>
-                <a:ea typeface="Source Code Pro" panose="020B0509030403020204" pitchFamily="49" charset="0"/>
-              </a:rPr>
-              <a:t>charset</a:t>
-            </a:r>
-            <a:r>
-              <a:rPr lang="fr-FR" dirty="0">
-                <a:solidFill>
-                  <a:srgbClr val="010080"/>
-                </a:solidFill>
-                <a:latin typeface="Source Code Pro" panose="020B0509030403020204" pitchFamily="49" charset="0"/>
-                <a:ea typeface="Source Code Pro" panose="020B0509030403020204" pitchFamily="49" charset="0"/>
-              </a:rPr>
-              <a:t>="</a:t>
-            </a:r>
-            <a:r>
-              <a:rPr lang="fr-FR" dirty="0">
-                <a:solidFill>
-                  <a:srgbClr val="990000"/>
-                </a:solidFill>
-                <a:latin typeface="Source Code Pro" panose="020B0509030403020204" pitchFamily="49" charset="0"/>
-                <a:ea typeface="Source Code Pro" panose="020B0509030403020204" pitchFamily="49" charset="0"/>
-              </a:rPr>
-              <a:t>utf-8</a:t>
-            </a:r>
-            <a:r>
-              <a:rPr lang="fr-FR" dirty="0">
-                <a:solidFill>
-                  <a:srgbClr val="010080"/>
-                </a:solidFill>
-                <a:latin typeface="Source Code Pro" panose="020B0509030403020204" pitchFamily="49" charset="0"/>
-                <a:ea typeface="Source Code Pro" panose="020B0509030403020204" pitchFamily="49" charset="0"/>
-              </a:rPr>
-              <a:t>" /&gt; </a:t>
-            </a:r>
-          </a:p>
-          <a:p>
-            <a:pPr marL="342900" lvl="1" indent="0">
-              <a:buNone/>
-            </a:pPr>
-            <a:r>
-              <a:rPr lang="fr-FR" dirty="0">
-                <a:solidFill>
-                  <a:srgbClr val="010080"/>
-                </a:solidFill>
-                <a:latin typeface="Source Code Pro" panose="020B0509030403020204" pitchFamily="49" charset="0"/>
-                <a:ea typeface="Source Code Pro" panose="020B0509030403020204" pitchFamily="49" charset="0"/>
-              </a:rPr>
-              <a:t>&lt;/</a:t>
-            </a:r>
-            <a:r>
-              <a:rPr lang="fr-FR" dirty="0" err="1">
-                <a:solidFill>
-                  <a:srgbClr val="010080"/>
-                </a:solidFill>
-                <a:latin typeface="Source Code Pro" panose="020B0509030403020204" pitchFamily="49" charset="0"/>
-                <a:ea typeface="Source Code Pro" panose="020B0509030403020204" pitchFamily="49" charset="0"/>
-              </a:rPr>
-              <a:t>head</a:t>
-            </a:r>
-            <a:r>
-              <a:rPr lang="fr-FR" dirty="0">
-                <a:solidFill>
-                  <a:srgbClr val="010080"/>
-                </a:solidFill>
-                <a:latin typeface="Source Code Pro" panose="020B0509030403020204" pitchFamily="49" charset="0"/>
-                <a:ea typeface="Source Code Pro" panose="020B0509030403020204" pitchFamily="49" charset="0"/>
-              </a:rPr>
-              <a:t>&gt;</a:t>
-            </a:r>
-          </a:p>
-          <a:p>
-            <a:pPr marL="342900" lvl="1" indent="0">
-              <a:buNone/>
-            </a:pPr>
-            <a:r>
-              <a:rPr lang="fr-FR" dirty="0">
-                <a:solidFill>
-                  <a:srgbClr val="010080"/>
-                </a:solidFill>
-                <a:latin typeface="Source Code Pro" panose="020B0509030403020204" pitchFamily="49" charset="0"/>
-                <a:ea typeface="Source Code Pro" panose="020B0509030403020204" pitchFamily="49" charset="0"/>
-              </a:rPr>
-              <a:t>&lt;body&gt;</a:t>
-            </a:r>
-          </a:p>
-          <a:p>
-            <a:pPr marL="760413" lvl="1">
-              <a:spcBef>
-                <a:spcPct val="20000"/>
-              </a:spcBef>
-              <a:buClr>
-                <a:schemeClr val="accent6"/>
-              </a:buClr>
-            </a:pPr>
-            <a:r>
-              <a:rPr lang="fr-FR" altLang="fr-FR" b="1" dirty="0">
-                <a:solidFill>
-                  <a:srgbClr val="010080"/>
-                </a:solidFill>
-                <a:latin typeface="Source Code Pro" panose="020B0509030403020204" pitchFamily="49" charset="0"/>
-                <a:ea typeface="Source Code Pro" panose="020B0509030403020204" pitchFamily="49" charset="0"/>
-              </a:rPr>
-              <a:t>&lt;script&gt;</a:t>
-            </a:r>
-          </a:p>
-          <a:p>
-            <a:pPr marL="962025" lvl="2">
-              <a:spcBef>
-                <a:spcPct val="20000"/>
-              </a:spcBef>
-              <a:buClr>
-                <a:schemeClr val="accent6"/>
-              </a:buClr>
-            </a:pPr>
-            <a:r>
-              <a:rPr lang="fr-FR" altLang="fr-FR" dirty="0" err="1">
-                <a:solidFill>
-                  <a:srgbClr val="010080"/>
-                </a:solidFill>
-                <a:latin typeface="Source Code Pro" panose="020B0509030403020204" pitchFamily="49" charset="0"/>
-                <a:ea typeface="Source Code Pro" panose="020B0509030403020204" pitchFamily="49" charset="0"/>
-              </a:rPr>
-              <a:t>window.addEventListener</a:t>
-            </a:r>
-            <a:r>
-              <a:rPr lang="fr-FR" altLang="fr-FR" dirty="0">
-                <a:solidFill>
-                  <a:srgbClr val="010080"/>
-                </a:solidFill>
-                <a:latin typeface="Source Code Pro" panose="020B0509030403020204" pitchFamily="49" charset="0"/>
-                <a:ea typeface="Source Code Pro" panose="020B0509030403020204" pitchFamily="49" charset="0"/>
-              </a:rPr>
-              <a:t>('</a:t>
-            </a:r>
-            <a:r>
-              <a:rPr lang="fr-FR" altLang="fr-FR" dirty="0" err="1">
-                <a:solidFill>
-                  <a:srgbClr val="010080"/>
-                </a:solidFill>
-                <a:latin typeface="Source Code Pro" panose="020B0509030403020204" pitchFamily="49" charset="0"/>
-                <a:ea typeface="Source Code Pro" panose="020B0509030403020204" pitchFamily="49" charset="0"/>
-              </a:rPr>
-              <a:t>load</a:t>
-            </a:r>
-            <a:r>
-              <a:rPr lang="fr-FR" altLang="fr-FR" dirty="0">
-                <a:solidFill>
-                  <a:srgbClr val="010080"/>
-                </a:solidFill>
-                <a:latin typeface="Source Code Pro" panose="020B0509030403020204" pitchFamily="49" charset="0"/>
-                <a:ea typeface="Source Code Pro" panose="020B0509030403020204" pitchFamily="49" charset="0"/>
-              </a:rPr>
-              <a:t>', </a:t>
-            </a:r>
-            <a:r>
-              <a:rPr lang="fr-FR" altLang="fr-FR" dirty="0" err="1">
-                <a:solidFill>
-                  <a:srgbClr val="00B050"/>
-                </a:solidFill>
-                <a:latin typeface="Source Code Pro" panose="020B0509030403020204"/>
-              </a:rPr>
-              <a:t>function</a:t>
-            </a:r>
-            <a:r>
-              <a:rPr lang="fr-FR" altLang="fr-FR" dirty="0">
-                <a:solidFill>
-                  <a:srgbClr val="010080"/>
-                </a:solidFill>
-                <a:latin typeface="Source Code Pro" panose="020B0509030403020204" pitchFamily="49" charset="0"/>
-                <a:ea typeface="Source Code Pro" panose="020B0509030403020204" pitchFamily="49" charset="0"/>
-              </a:rPr>
-              <a:t> () {     </a:t>
-            </a:r>
-          </a:p>
-          <a:p>
-            <a:pPr marL="962025" lvl="2">
-              <a:spcBef>
-                <a:spcPct val="20000"/>
-              </a:spcBef>
-              <a:buClr>
-                <a:schemeClr val="accent6"/>
-              </a:buClr>
-            </a:pPr>
-            <a:r>
-              <a:rPr lang="fr-FR" altLang="fr-FR" dirty="0" err="1">
-                <a:solidFill>
-                  <a:srgbClr val="6F42C1"/>
-                </a:solidFill>
-                <a:latin typeface="Source Code Pro" panose="020B0509030403020204"/>
-              </a:rPr>
-              <a:t>console</a:t>
-            </a:r>
-            <a:r>
-              <a:rPr lang="fr-FR" altLang="fr-FR" dirty="0" err="1">
-                <a:solidFill>
-                  <a:srgbClr val="010080"/>
-                </a:solidFill>
-                <a:latin typeface="Source Code Pro" panose="020B0509030403020204" pitchFamily="49" charset="0"/>
-                <a:ea typeface="Source Code Pro" panose="020B0509030403020204" pitchFamily="49" charset="0"/>
-              </a:rPr>
-              <a:t>.</a:t>
-            </a:r>
-            <a:r>
-              <a:rPr lang="fr-FR" altLang="fr-FR" dirty="0" err="1">
-                <a:solidFill>
-                  <a:srgbClr val="005CC5"/>
-                </a:solidFill>
-                <a:latin typeface="Source Code Pro" panose="020B0509030403020204"/>
-              </a:rPr>
-              <a:t>log</a:t>
-            </a:r>
-            <a:r>
-              <a:rPr lang="fr-FR" altLang="fr-FR" dirty="0">
-                <a:solidFill>
-                  <a:srgbClr val="010080"/>
-                </a:solidFill>
-                <a:latin typeface="Source Code Pro" panose="020B0509030403020204" pitchFamily="49" charset="0"/>
-                <a:ea typeface="Source Code Pro" panose="020B0509030403020204" pitchFamily="49" charset="0"/>
-              </a:rPr>
-              <a:t>(</a:t>
-            </a:r>
-            <a:r>
-              <a:rPr lang="fr-FR" altLang="fr-FR" dirty="0">
-                <a:solidFill>
-                  <a:srgbClr val="657B83"/>
-                </a:solidFill>
-                <a:latin typeface="Source Code Pro" panose="020B0509030403020204" pitchFamily="49" charset="0"/>
-                <a:ea typeface="Source Code Pro" panose="020B0509030403020204" pitchFamily="49" charset="0"/>
-              </a:rPr>
-              <a:t>'Cette fonction est exécutée une fois la page chargée.'</a:t>
-            </a:r>
-            <a:r>
-              <a:rPr lang="fr-FR" altLang="fr-FR" dirty="0">
-                <a:solidFill>
-                  <a:srgbClr val="010080"/>
-                </a:solidFill>
-                <a:latin typeface="Source Code Pro" panose="020B0509030403020204" pitchFamily="49" charset="0"/>
-                <a:ea typeface="Source Code Pro" panose="020B0509030403020204" pitchFamily="49" charset="0"/>
-              </a:rPr>
-              <a:t>); });  </a:t>
-            </a:r>
-          </a:p>
-          <a:p>
-            <a:pPr marL="760413" lvl="1">
-              <a:spcBef>
-                <a:spcPct val="20000"/>
-              </a:spcBef>
-              <a:buClr>
-                <a:schemeClr val="accent6"/>
-              </a:buClr>
-            </a:pPr>
-            <a:r>
-              <a:rPr lang="fr-FR" altLang="fr-FR" b="1" dirty="0">
-                <a:solidFill>
-                  <a:srgbClr val="010080"/>
-                </a:solidFill>
-                <a:latin typeface="Source Code Pro" panose="020B0509030403020204" pitchFamily="49" charset="0"/>
-                <a:ea typeface="Source Code Pro" panose="020B0509030403020204" pitchFamily="49" charset="0"/>
-              </a:rPr>
-              <a:t>&lt;/script&gt;</a:t>
-            </a:r>
-          </a:p>
-          <a:p>
-            <a:pPr marL="342900" lvl="1" indent="0">
-              <a:buNone/>
-            </a:pPr>
-            <a:r>
-              <a:rPr lang="fr-FR" dirty="0">
-                <a:solidFill>
-                  <a:srgbClr val="010080"/>
-                </a:solidFill>
-                <a:latin typeface="Source Code Pro" panose="020B0509030403020204" pitchFamily="49" charset="0"/>
-              </a:rPr>
-              <a:t>&lt;/body&gt;</a:t>
-            </a:r>
-          </a:p>
-          <a:p>
-            <a:pPr marL="47625" indent="0">
-              <a:buNone/>
-            </a:pPr>
-            <a:r>
-              <a:rPr lang="fr-FR" dirty="0">
-                <a:solidFill>
-                  <a:srgbClr val="010080"/>
-                </a:solidFill>
-                <a:latin typeface="Source Code Pro" panose="020B0509030403020204" pitchFamily="49" charset="0"/>
-              </a:rPr>
-              <a:t>&lt;/html&gt;</a:t>
-            </a:r>
-            <a:endParaRPr lang="en-US" dirty="0">
-              <a:solidFill>
-                <a:srgbClr val="657B83"/>
-              </a:solidFill>
-              <a:latin typeface="Source Code Pro" panose="020B0509030403020204" pitchFamily="49" charset="0"/>
-            </a:endParaRPr>
-          </a:p>
-        </p:txBody>
-      </p:sp>
-    </p:spTree>
-    <p:extLst>
-      <p:ext uri="{BB962C8B-B14F-4D97-AF65-F5344CB8AC3E}">
-        <p14:creationId xmlns:p14="http://schemas.microsoft.com/office/powerpoint/2010/main" val="472601625"/>
-      </p:ext>
-    </p:extLst>
-  </p:cSld>
-  <p:clrMapOvr>
-    <a:masterClrMapping/>
-  </p:clrMapOvr>
 </p:sld>
 </file>
 

</xml_diff>

<commit_message>
Web : mise de page
</commit_message>
<xml_diff>
--- a/web/4-JS/JavaScript.pptx
+++ b/web/4-JS/JavaScript.pptx
@@ -7498,8 +7498,8 @@
         </p:nvSpPr>
         <p:spPr>
           <a:xfrm>
-            <a:off x="91440" y="1243278"/>
-            <a:ext cx="9052560" cy="4890030"/>
+            <a:off x="228600" y="1051560"/>
+            <a:ext cx="8915400" cy="5090892"/>
           </a:xfrm>
         </p:spPr>
         <p:txBody>
@@ -7668,7 +7668,20 @@
                 <a:latin typeface="+mj-lt"/>
                 <a:ea typeface="Source Code Pro" panose="020B0509030403020204" pitchFamily="49" charset="0"/>
               </a:rPr>
-              <a:t>Utiliser l’API pour le modifier, créer un nouvel élément, changer son style CSS, etc. </a:t>
+              <a:t>Utiliser l’API pour le modifier, créer un nouvel élément, </a:t>
+            </a:r>
+            <a:br>
+              <a:rPr lang="fr-FR" sz="2000" dirty="0">
+                <a:latin typeface="+mj-lt"/>
+                <a:ea typeface="Source Code Pro" panose="020B0509030403020204" pitchFamily="49" charset="0"/>
+              </a:rPr>
+            </a:br>
+            <a:r>
+              <a:rPr lang="fr-FR" sz="2000" dirty="0">
+                <a:latin typeface="+mj-lt"/>
+                <a:ea typeface="Source Code Pro" panose="020B0509030403020204" pitchFamily="49" charset="0"/>
+              </a:rPr>
+              <a:t>changer son style CSS, etc. </a:t>
             </a:r>
           </a:p>
         </p:txBody>
@@ -7756,7 +7769,7 @@
         </p:nvSpPr>
         <p:spPr>
           <a:xfrm>
-            <a:off x="1070283" y="4858043"/>
+            <a:off x="1070283" y="4666019"/>
             <a:ext cx="7003434" cy="1260913"/>
           </a:xfrm>
           <a:prstGeom prst="rect">
@@ -9667,6 +9680,101 @@
       </p:sp>
       <p:sp>
         <p:nvSpPr>
+          <p:cNvPr id="7" name="Espace réservé du contenu 2"/>
+          <p:cNvSpPr>
+            <a:spLocks noGrp="1"/>
+          </p:cNvSpPr>
+          <p:nvPr>
+            <p:ph idx="1"/>
+          </p:nvPr>
+        </p:nvSpPr>
+        <p:spPr/>
+        <p:txBody>
+          <a:bodyPr/>
+          <a:lstStyle/>
+          <a:p>
+            <a:r>
+              <a:rPr lang="fr-FR" sz="2400" dirty="0"/>
+              <a:t>JavaScript est un langage </a:t>
+            </a:r>
+            <a:r>
+              <a:rPr lang="fr-FR" sz="2400" b="1" dirty="0"/>
+              <a:t>fonctionnel</a:t>
+            </a:r>
+            <a:r>
+              <a:rPr lang="fr-FR" sz="2400" dirty="0"/>
+              <a:t>, </a:t>
+            </a:r>
+            <a:r>
+              <a:rPr lang="fr-FR" sz="2400" b="1" dirty="0"/>
+              <a:t>interprété</a:t>
+            </a:r>
+            <a:r>
+              <a:rPr lang="fr-FR" sz="2400" dirty="0"/>
+              <a:t> et </a:t>
+            </a:r>
+            <a:r>
+              <a:rPr lang="fr-FR" sz="2400" b="1" dirty="0"/>
+              <a:t>asynchrone</a:t>
+            </a:r>
+            <a:br>
+              <a:rPr lang="fr-FR" sz="2400" dirty="0"/>
+            </a:br>
+            <a:endParaRPr lang="fr-FR" sz="2400" dirty="0"/>
+          </a:p>
+          <a:p>
+            <a:r>
+              <a:rPr lang="fr-FR" sz="2400" dirty="0"/>
+              <a:t>JavaScript s'exécute sur l’</a:t>
+            </a:r>
+            <a:r>
+              <a:rPr lang="fr-FR" sz="2400" b="1" dirty="0"/>
+              <a:t>arbre d’éléments HTML </a:t>
+            </a:r>
+            <a:br>
+              <a:rPr lang="fr-FR" sz="2400" dirty="0"/>
+            </a:br>
+            <a:r>
+              <a:rPr lang="fr-FR" sz="2400" dirty="0"/>
+              <a:t>(DOM </a:t>
+            </a:r>
+            <a:r>
+              <a:rPr lang="fr-FR" sz="2400" dirty="0" err="1"/>
+              <a:t>tree</a:t>
+            </a:r>
+            <a:r>
+              <a:rPr lang="fr-FR" sz="2400" dirty="0"/>
+              <a:t>) créé par le navigateur</a:t>
+            </a:r>
+          </a:p>
+          <a:p>
+            <a:endParaRPr lang="fr-FR" sz="2400" dirty="0"/>
+          </a:p>
+          <a:p>
+            <a:r>
+              <a:rPr lang="fr-FR" sz="2400" dirty="0"/>
+              <a:t>Permet de </a:t>
+            </a:r>
+            <a:r>
+              <a:rPr lang="fr-FR" sz="2400" b="1" dirty="0"/>
+              <a:t>manipuler dynamiquement </a:t>
+            </a:r>
+            <a:r>
+              <a:rPr lang="fr-FR" sz="2400" dirty="0"/>
+              <a:t>le comportement </a:t>
+            </a:r>
+            <a:br>
+              <a:rPr lang="fr-FR" sz="2400" dirty="0"/>
+            </a:br>
+            <a:r>
+              <a:rPr lang="fr-FR" sz="2400" dirty="0"/>
+              <a:t>des pages web</a:t>
+            </a:r>
+          </a:p>
+        </p:txBody>
+      </p:sp>
+      <p:sp>
+        <p:nvSpPr>
           <p:cNvPr id="4" name="Espace réservé de la date 3"/>
           <p:cNvSpPr>
             <a:spLocks noGrp="1"/>
@@ -9682,6 +9790,7 @@
           <a:p>
             <a:fld id="{BB2FA04C-1355-4CE6-8050-4BD994E23BD5}" type="datetime4">
               <a:rPr lang="fr-FR" smtClean="0"/>
+              <a:pPr/>
               <a:t>12 juin 2019</a:t>
             </a:fld>
             <a:endParaRPr lang="fr-FR" dirty="0"/>
@@ -9731,121 +9840,6 @@
               <a:t>15</a:t>
             </a:fld>
             <a:endParaRPr lang="fr-FR"/>
-          </a:p>
-        </p:txBody>
-      </p:sp>
-      <p:sp>
-        <p:nvSpPr>
-          <p:cNvPr id="7" name="Espace réservé du contenu 2"/>
-          <p:cNvSpPr>
-            <a:spLocks noGrp="1"/>
-          </p:cNvSpPr>
-          <p:nvPr>
-            <p:ph idx="4294967295"/>
-          </p:nvPr>
-        </p:nvSpPr>
-        <p:spPr>
-          <a:xfrm>
-            <a:off x="279400" y="1236134"/>
-            <a:ext cx="8644466" cy="4890030"/>
-          </a:xfrm>
-        </p:spPr>
-        <p:txBody>
-          <a:bodyPr/>
-          <a:lstStyle/>
-          <a:p>
-            <a:pPr marL="400050" indent="-400050"/>
-            <a:r>
-              <a:rPr lang="fr-FR" sz="2400" dirty="0"/>
-              <a:t>JavaScript est un </a:t>
-            </a:r>
-            <a:r>
-              <a:rPr lang="fr-FR" sz="2400" b="1" dirty="0"/>
-              <a:t>langage fonctionnel</a:t>
-            </a:r>
-            <a:r>
-              <a:rPr lang="fr-FR" sz="2400" dirty="0"/>
-              <a:t>,</a:t>
-            </a:r>
-            <a:r>
-              <a:rPr lang="fr-FR" sz="2400" b="1" dirty="0"/>
-              <a:t> interprété</a:t>
-            </a:r>
-            <a:r>
-              <a:rPr lang="fr-FR" sz="2400" dirty="0"/>
-              <a:t> et</a:t>
-            </a:r>
-            <a:r>
-              <a:rPr lang="fr-FR" sz="2400" b="1" dirty="0"/>
-              <a:t> asynchrone</a:t>
-            </a:r>
-            <a:br>
-              <a:rPr lang="fr-FR" sz="2400" dirty="0"/>
-            </a:br>
-            <a:endParaRPr lang="fr-FR" sz="2400" dirty="0"/>
-          </a:p>
-          <a:p>
-            <a:pPr marL="400050" indent="-400050"/>
-            <a:r>
-              <a:rPr lang="fr-FR" sz="2400" dirty="0"/>
-              <a:t>JavaScript s'exécute sur l’</a:t>
-            </a:r>
-            <a:r>
-              <a:rPr lang="fr-FR" sz="2400" b="1" dirty="0"/>
-              <a:t>arbre d’éléments </a:t>
-            </a:r>
-            <a:r>
-              <a:rPr lang="fr-FR" sz="2400" dirty="0"/>
-              <a:t>HTML</a:t>
-            </a:r>
-            <a:r>
-              <a:rPr lang="fr-FR" sz="2400" b="1" dirty="0"/>
-              <a:t> </a:t>
-            </a:r>
-            <a:br>
-              <a:rPr lang="fr-FR" sz="2400" b="1" dirty="0"/>
-            </a:br>
-            <a:r>
-              <a:rPr lang="fr-FR" sz="2400" dirty="0"/>
-              <a:t>(DOM </a:t>
-            </a:r>
-            <a:r>
-              <a:rPr lang="fr-FR" sz="2400" dirty="0" err="1"/>
-              <a:t>tree</a:t>
-            </a:r>
-            <a:r>
-              <a:rPr lang="fr-FR" sz="2400" dirty="0"/>
-              <a:t>) créé par le navigateur</a:t>
-            </a:r>
-          </a:p>
-          <a:p>
-            <a:pPr marL="400050" indent="-400050"/>
-            <a:endParaRPr lang="fr-FR" sz="2400" dirty="0"/>
-          </a:p>
-          <a:p>
-            <a:pPr marL="400050" indent="-400050"/>
-            <a:r>
-              <a:rPr lang="fr-FR" sz="2400" dirty="0"/>
-              <a:t>Permet de manipuler dynamiquement le comportement </a:t>
-            </a:r>
-            <a:br>
-              <a:rPr lang="fr-FR" sz="2400" dirty="0"/>
-            </a:br>
-            <a:r>
-              <a:rPr lang="fr-FR" sz="2400" dirty="0"/>
-              <a:t>des pages web</a:t>
-            </a:r>
-          </a:p>
-          <a:p>
-            <a:pPr marL="400050" indent="-400050"/>
-            <a:endParaRPr lang="fr-FR" sz="2400" dirty="0"/>
-          </a:p>
-          <a:p>
-            <a:pPr marL="400050" indent="-400050"/>
-            <a:endParaRPr lang="fr-FR" sz="2400" dirty="0"/>
-          </a:p>
-          <a:p>
-            <a:endParaRPr lang="fr-FR" dirty="0"/>
           </a:p>
         </p:txBody>
       </p:sp>

</xml_diff>